<commit_message>
Mise à jour selon commentaires viarouge
</commit_message>
<xml_diff>
--- a/Remise/Remise 2/Presentation1_corrigee_DT.pptx
+++ b/Remise/Remise 2/Presentation1_corrigee_DT.pptx
@@ -14,6 +14,13 @@
     <p:sldId id="263" r:id="rId8"/>
     <p:sldId id="264" r:id="rId9"/>
     <p:sldId id="265" r:id="rId10"/>
+    <p:sldId id="266" r:id="rId11"/>
+    <p:sldId id="267" r:id="rId12"/>
+    <p:sldId id="269" r:id="rId13"/>
+    <p:sldId id="270" r:id="rId14"/>
+    <p:sldId id="271" r:id="rId15"/>
+    <p:sldId id="272" r:id="rId16"/>
+    <p:sldId id="273" r:id="rId17"/>
   </p:sldIdLst>
   <p:sldSz cx="9144000" cy="6858000" type="screen4x3"/>
   <p:notesSz cx="6858000" cy="9144000"/>
@@ -907,7 +914,7 @@
                 <a:latin typeface="Trebuchet MS"/>
               </a:rPr>
               <a:pPr/>
-              <a:t>‹N°›</a:t>
+              <a:t>‹#›</a:t>
             </a:fld>
             <a:endParaRPr lang="en-US">
               <a:solidFill>
@@ -1203,7 +1210,7 @@
                 <a:latin typeface="Trebuchet MS"/>
               </a:rPr>
               <a:pPr/>
-              <a:t>‹N°›</a:t>
+              <a:t>‹#›</a:t>
             </a:fld>
             <a:endParaRPr lang="en-US">
               <a:solidFill>
@@ -1487,7 +1494,7 @@
                 <a:latin typeface="Trebuchet MS"/>
               </a:rPr>
               <a:pPr/>
-              <a:t>‹N°›</a:t>
+              <a:t>‹#›</a:t>
             </a:fld>
             <a:endParaRPr lang="en-US">
               <a:solidFill>
@@ -1834,7 +1841,7 @@
                 <a:latin typeface="Trebuchet MS"/>
               </a:rPr>
               <a:pPr/>
-              <a:t>‹N°›</a:t>
+              <a:t>‹#›</a:t>
             </a:fld>
             <a:endParaRPr lang="en-US">
               <a:solidFill>
@@ -2207,7 +2214,7 @@
                 <a:latin typeface="Trebuchet MS"/>
               </a:rPr>
               <a:pPr/>
-              <a:t>‹N°›</a:t>
+              <a:t>‹#›</a:t>
             </a:fld>
             <a:endParaRPr lang="en-US">
               <a:solidFill>
@@ -2554,7 +2561,7 @@
                 <a:latin typeface="Trebuchet MS"/>
               </a:rPr>
               <a:pPr/>
-              <a:t>‹N°›</a:t>
+              <a:t>‹#›</a:t>
             </a:fld>
             <a:endParaRPr lang="en-US">
               <a:solidFill>
@@ -2978,7 +2985,7 @@
                 <a:latin typeface="Trebuchet MS"/>
               </a:rPr>
               <a:pPr/>
-              <a:t>‹N°›</a:t>
+              <a:t>‹#›</a:t>
             </a:fld>
             <a:endParaRPr lang="en-US">
               <a:solidFill>
@@ -3181,7 +3188,7 @@
                 <a:latin typeface="Trebuchet MS"/>
               </a:rPr>
               <a:pPr/>
-              <a:t>‹N°›</a:t>
+              <a:t>‹#›</a:t>
             </a:fld>
             <a:endParaRPr lang="en-US">
               <a:solidFill>
@@ -3394,7 +3401,7 @@
                 <a:latin typeface="Trebuchet MS"/>
               </a:rPr>
               <a:pPr/>
-              <a:t>‹N°›</a:t>
+              <a:t>‹#›</a:t>
             </a:fld>
             <a:endParaRPr lang="en-US">
               <a:solidFill>
@@ -3684,7 +3691,7 @@
                 <a:latin typeface="Trebuchet MS"/>
               </a:rPr>
               <a:pPr/>
-              <a:t>‹N°›</a:t>
+              <a:t>‹#›</a:t>
             </a:fld>
             <a:endParaRPr lang="en-US" dirty="0">
               <a:solidFill>
@@ -3893,7 +3900,7 @@
                 <a:latin typeface="Trebuchet MS"/>
               </a:rPr>
               <a:pPr/>
-              <a:t>‹N°›</a:t>
+              <a:t>‹#›</a:t>
             </a:fld>
             <a:endParaRPr lang="en-US">
               <a:solidFill>
@@ -4173,7 +4180,7 @@
                 <a:latin typeface="Trebuchet MS"/>
               </a:rPr>
               <a:pPr/>
-              <a:t>‹N°›</a:t>
+              <a:t>‹#›</a:t>
             </a:fld>
             <a:endParaRPr lang="en-US">
               <a:solidFill>
@@ -4438,7 +4445,7 @@
                 <a:latin typeface="Trebuchet MS"/>
               </a:rPr>
               <a:pPr/>
-              <a:t>‹N°›</a:t>
+              <a:t>‹#›</a:t>
             </a:fld>
             <a:endParaRPr lang="en-US">
               <a:solidFill>
@@ -4845,7 +4852,7 @@
                 <a:latin typeface="Trebuchet MS"/>
               </a:rPr>
               <a:pPr/>
-              <a:t>‹N°›</a:t>
+              <a:t>‹#›</a:t>
             </a:fld>
             <a:endParaRPr lang="en-US">
               <a:solidFill>
@@ -5001,7 +5008,7 @@
                 <a:latin typeface="Trebuchet MS"/>
               </a:rPr>
               <a:pPr/>
-              <a:t>‹N°›</a:t>
+              <a:t>‹#›</a:t>
             </a:fld>
             <a:endParaRPr lang="en-US">
               <a:solidFill>
@@ -5129,7 +5136,7 @@
                 <a:latin typeface="Trebuchet MS"/>
               </a:rPr>
               <a:pPr/>
-              <a:t>‹N°›</a:t>
+              <a:t>‹#›</a:t>
             </a:fld>
             <a:endParaRPr lang="en-US">
               <a:solidFill>
@@ -5272,7 +5279,7 @@
                 <a:latin typeface="Trebuchet MS"/>
               </a:rPr>
               <a:pPr/>
-              <a:t>‹N°›</a:t>
+              <a:t>‹#›</a:t>
             </a:fld>
             <a:endParaRPr lang="en-US">
               <a:solidFill>
@@ -6090,7 +6097,7 @@
                 <a:latin typeface="Trebuchet MS"/>
               </a:rPr>
               <a:pPr/>
-              <a:t>‹N°›</a:t>
+              <a:t>‹#›</a:t>
             </a:fld>
             <a:endParaRPr lang="en-US">
               <a:solidFill>
@@ -6922,7 +6929,7 @@
                 <a:latin typeface="Trebuchet MS"/>
               </a:rPr>
               <a:pPr defTabSz="914400"/>
-              <a:t>‹N°›</a:t>
+              <a:t>‹#›</a:t>
             </a:fld>
             <a:endParaRPr lang="en-US">
               <a:solidFill>
@@ -7472,10 +7479,1060 @@
   <p:timing>
     <p:tnLst>
       <p:par>
-        <p:cTn id="1" dur="indefinite" restart="never" nodeType="tmRoot"/>
+        <p:cTn xmlns:p14="http://schemas.microsoft.com/office/powerpoint/2010/main" id="1" dur="indefinite" restart="never" nodeType="tmRoot"/>
       </p:par>
     </p:tnLst>
   </p:timing>
+</p:sld>
+</file>
+
+<file path=ppt/slides/slide10.xml><?xml version="1.0" encoding="utf-8"?>
+<p:sld xmlns:a="http://schemas.openxmlformats.org/drawingml/2006/main" xmlns:r="http://schemas.openxmlformats.org/officeDocument/2006/relationships" xmlns:p="http://schemas.openxmlformats.org/presentationml/2006/main">
+  <p:cSld>
+    <p:spTree>
+      <p:nvGrpSpPr>
+        <p:cNvPr id="1" name=""/>
+        <p:cNvGrpSpPr/>
+        <p:nvPr/>
+      </p:nvGrpSpPr>
+      <p:grpSpPr>
+        <a:xfrm>
+          <a:off x="0" y="0"/>
+          <a:ext cx="0" cy="0"/>
+          <a:chOff x="0" y="0"/>
+          <a:chExt cx="0" cy="0"/>
+        </a:xfrm>
+      </p:grpSpPr>
+      <p:sp>
+        <p:nvSpPr>
+          <p:cNvPr id="2" name="Title 1"/>
+          <p:cNvSpPr>
+            <a:spLocks noGrp="1"/>
+          </p:cNvSpPr>
+          <p:nvPr>
+            <p:ph type="title"/>
+          </p:nvPr>
+        </p:nvSpPr>
+        <p:spPr>
+          <a:xfrm>
+            <a:off x="508001" y="97370"/>
+            <a:ext cx="6447501" cy="1320800"/>
+          </a:xfrm>
+        </p:spPr>
+        <p:txBody>
+          <a:bodyPr/>
+          <a:lstStyle/>
+          <a:p>
+            <a:r>
+              <a:rPr lang="en-US" dirty="0" smtClean="0"/>
+              <a:t>Implantation </a:t>
+            </a:r>
+            <a:r>
+              <a:rPr lang="en-US" dirty="0" err="1" smtClean="0"/>
+              <a:t>dans</a:t>
+            </a:r>
+            <a:r>
+              <a:rPr lang="en-US" dirty="0" smtClean="0"/>
+              <a:t> Opal-RT</a:t>
+            </a:r>
+            <a:endParaRPr lang="en-US" dirty="0"/>
+          </a:p>
+        </p:txBody>
+      </p:sp>
+      <p:pic>
+        <p:nvPicPr>
+          <p:cNvPr id="6" name="Picture 5"/>
+          <p:cNvPicPr>
+            <a:picLocks noChangeAspect="1"/>
+          </p:cNvPicPr>
+          <p:nvPr/>
+        </p:nvPicPr>
+        <p:blipFill>
+          <a:blip r:embed="rId2"/>
+          <a:stretch>
+            <a:fillRect/>
+          </a:stretch>
+        </p:blipFill>
+        <p:spPr>
+          <a:xfrm>
+            <a:off x="1947334" y="757770"/>
+            <a:ext cx="4047066" cy="2519299"/>
+          </a:xfrm>
+          <a:prstGeom prst="rect">
+            <a:avLst/>
+          </a:prstGeom>
+        </p:spPr>
+      </p:pic>
+      <p:sp>
+        <p:nvSpPr>
+          <p:cNvPr id="7" name="TextBox 6"/>
+          <p:cNvSpPr txBox="1"/>
+          <p:nvPr/>
+        </p:nvSpPr>
+        <p:spPr>
+          <a:xfrm>
+            <a:off x="169334" y="3277069"/>
+            <a:ext cx="8246534" cy="4339650"/>
+          </a:xfrm>
+          <a:prstGeom prst="rect">
+            <a:avLst/>
+          </a:prstGeom>
+          <a:noFill/>
+        </p:spPr>
+        <p:txBody>
+          <a:bodyPr wrap="square" rtlCol="0">
+            <a:spAutoFit/>
+          </a:bodyPr>
+          <a:lstStyle/>
+          <a:p>
+            <a:pPr marL="285750" indent="-285750">
+              <a:buFont typeface="Arial"/>
+              <a:buChar char="•"/>
+            </a:pPr>
+            <a:r>
+              <a:rPr lang="fr-CA" sz="1600" dirty="0" smtClean="0"/>
+              <a:t>Afin d’implanter le modèle dans le simulateur temps réel d’</a:t>
+            </a:r>
+            <a:r>
+              <a:rPr lang="fr-CA" sz="1600" dirty="0" err="1" smtClean="0"/>
+              <a:t>Opal</a:t>
+            </a:r>
+            <a:r>
+              <a:rPr lang="fr-CA" sz="1600" dirty="0" smtClean="0"/>
+              <a:t>-RT, il est nécessaire d’adapter le circuit de puissance avec les interrupteurs selon la nomenclature d’</a:t>
+            </a:r>
+            <a:r>
+              <a:rPr lang="fr-CA" sz="1600" dirty="0" err="1" smtClean="0"/>
+              <a:t>Opal</a:t>
+            </a:r>
+            <a:r>
+              <a:rPr lang="fr-CA" sz="1600" dirty="0" smtClean="0"/>
+              <a:t>-RT.</a:t>
+            </a:r>
+          </a:p>
+          <a:p>
+            <a:pPr marL="285750" indent="-285750">
+              <a:buFont typeface="Arial"/>
+              <a:buChar char="•"/>
+            </a:pPr>
+            <a:r>
+              <a:rPr lang="fr-CA" sz="1600" dirty="0" smtClean="0"/>
+              <a:t>Un outil spécialisé d’</a:t>
+            </a:r>
+            <a:r>
+              <a:rPr lang="fr-CA" sz="1600" dirty="0" err="1" smtClean="0"/>
+              <a:t>Opal</a:t>
+            </a:r>
+            <a:r>
+              <a:rPr lang="fr-CA" sz="1600" dirty="0" smtClean="0"/>
+              <a:t>-RT permet la conversion vers un </a:t>
+            </a:r>
+            <a:r>
+              <a:rPr lang="fr-CA" sz="1600" dirty="0" err="1" smtClean="0"/>
+              <a:t>sous-sytème</a:t>
+            </a:r>
+            <a:r>
+              <a:rPr lang="fr-CA" sz="1600" dirty="0" smtClean="0"/>
+              <a:t> implantable dans les FPGA (4 FPGA dont chacun est limité à 24 interrupteurs).</a:t>
+            </a:r>
+          </a:p>
+          <a:p>
+            <a:pPr marL="285750" indent="-285750">
+              <a:buFont typeface="Arial"/>
+              <a:buChar char="•"/>
+            </a:pPr>
+            <a:r>
+              <a:rPr lang="fr-CA" sz="1600" dirty="0" smtClean="0"/>
+              <a:t>Le sous-système est intégré dans un diagramme SPS qui permet d’inclure la logique et la commande préétablies, lesquelles tournent dans l’un des processeurs de l’appareil.</a:t>
+            </a:r>
+          </a:p>
+          <a:p>
+            <a:pPr marL="285750" indent="-285750">
+              <a:buFont typeface="Arial"/>
+              <a:buChar char="•"/>
+            </a:pPr>
+            <a:r>
+              <a:rPr lang="fr-CA" sz="1600" dirty="0" smtClean="0"/>
+              <a:t>Le tout est ensuite compilé dans le simulateur temps réel.</a:t>
+            </a:r>
+          </a:p>
+          <a:p>
+            <a:pPr marL="285750" indent="-285750">
+              <a:buFont typeface="Arial"/>
+              <a:buChar char="•"/>
+            </a:pPr>
+            <a:r>
+              <a:rPr lang="fr-CA" sz="1600" dirty="0" smtClean="0"/>
+              <a:t>Il est par la suite possible de lancer la simulation temps réel et d’optimiser les paramètres de discrétisation (</a:t>
+            </a:r>
+            <a:r>
+              <a:rPr lang="fr-CA" sz="1600" dirty="0" err="1" smtClean="0"/>
+              <a:t>Gs</a:t>
+            </a:r>
+            <a:r>
+              <a:rPr lang="fr-CA" sz="1600" dirty="0" smtClean="0"/>
+              <a:t>) utilisés par </a:t>
+            </a:r>
+            <a:r>
+              <a:rPr lang="fr-CA" sz="1600" dirty="0" err="1" smtClean="0"/>
+              <a:t>Opal</a:t>
+            </a:r>
+            <a:r>
+              <a:rPr lang="fr-CA" sz="1600" dirty="0" smtClean="0"/>
+              <a:t>-RT. Il existe aussi un script qui le fait de manière autonome.</a:t>
+            </a:r>
+          </a:p>
+          <a:p>
+            <a:pPr marL="285750" indent="-285750">
+              <a:buFont typeface="Arial"/>
+              <a:buChar char="•"/>
+            </a:pPr>
+            <a:r>
+              <a:rPr lang="fr-CA" sz="1600" dirty="0" smtClean="0"/>
+              <a:t>Les paramètres n’impliquant pas l’ajout de blocs ou des modifications importantes peuvent </a:t>
+            </a:r>
+            <a:r>
+              <a:rPr lang="fr-CA" sz="1600" dirty="0" smtClean="0"/>
+              <a:t>être changés pendant que la simulation tourne.</a:t>
+            </a:r>
+            <a:endParaRPr lang="fr-CA" sz="1600" dirty="0"/>
+          </a:p>
+          <a:p>
+            <a:pPr marL="285750" indent="-285750">
+              <a:buFont typeface="Arial"/>
+              <a:buChar char="•"/>
+            </a:pPr>
+            <a:endParaRPr lang="en-US" sz="1600" dirty="0" smtClean="0"/>
+          </a:p>
+          <a:p>
+            <a:endParaRPr lang="en-US" dirty="0"/>
+          </a:p>
+          <a:p>
+            <a:r>
+              <a:rPr lang="en-US" dirty="0" smtClean="0"/>
+              <a:t> </a:t>
+            </a:r>
+            <a:endParaRPr lang="en-US" dirty="0"/>
+          </a:p>
+        </p:txBody>
+      </p:sp>
+    </p:spTree>
+    <p:extLst>
+      <p:ext uri="{BB962C8B-B14F-4D97-AF65-F5344CB8AC3E}">
+        <p14:creationId xmlns:p14="http://schemas.microsoft.com/office/powerpoint/2010/main" val="3414079969"/>
+      </p:ext>
+    </p:extLst>
+  </p:cSld>
+  <p:clrMapOvr>
+    <a:masterClrMapping/>
+  </p:clrMapOvr>
+</p:sld>
+</file>
+
+<file path=ppt/slides/slide11.xml><?xml version="1.0" encoding="utf-8"?>
+<p:sld xmlns:a="http://schemas.openxmlformats.org/drawingml/2006/main" xmlns:r="http://schemas.openxmlformats.org/officeDocument/2006/relationships" xmlns:p="http://schemas.openxmlformats.org/presentationml/2006/main">
+  <p:cSld>
+    <p:spTree>
+      <p:nvGrpSpPr>
+        <p:cNvPr id="1" name=""/>
+        <p:cNvGrpSpPr/>
+        <p:nvPr/>
+      </p:nvGrpSpPr>
+      <p:grpSpPr>
+        <a:xfrm>
+          <a:off x="0" y="0"/>
+          <a:ext cx="0" cy="0"/>
+          <a:chOff x="0" y="0"/>
+          <a:chExt cx="0" cy="0"/>
+        </a:xfrm>
+      </p:grpSpPr>
+      <p:sp>
+        <p:nvSpPr>
+          <p:cNvPr id="2" name="Title 1"/>
+          <p:cNvSpPr>
+            <a:spLocks noGrp="1"/>
+          </p:cNvSpPr>
+          <p:nvPr>
+            <p:ph type="title"/>
+          </p:nvPr>
+        </p:nvSpPr>
+        <p:spPr>
+          <a:xfrm>
+            <a:off x="0" y="0"/>
+            <a:ext cx="8111067" cy="1202267"/>
+          </a:xfrm>
+        </p:spPr>
+        <p:txBody>
+          <a:bodyPr>
+            <a:normAutofit fontScale="90000"/>
+          </a:bodyPr>
+          <a:lstStyle/>
+          <a:p>
+            <a:r>
+              <a:rPr lang="fr-FR" dirty="0"/>
+              <a:t>Conclusion sur l’illustration du concept méthodologique avec </a:t>
+            </a:r>
+            <a:r>
+              <a:rPr lang="fr-FR" dirty="0" smtClean="0"/>
+              <a:t>exemple </a:t>
+            </a:r>
+            <a:r>
+              <a:rPr lang="fr-FR" dirty="0"/>
+              <a:t>préliminaire</a:t>
+            </a:r>
+            <a:endParaRPr lang="en-US" dirty="0"/>
+          </a:p>
+        </p:txBody>
+      </p:sp>
+      <p:sp>
+        <p:nvSpPr>
+          <p:cNvPr id="3" name="Content Placeholder 2"/>
+          <p:cNvSpPr>
+            <a:spLocks noGrp="1"/>
+          </p:cNvSpPr>
+          <p:nvPr>
+            <p:ph idx="1"/>
+          </p:nvPr>
+        </p:nvSpPr>
+        <p:spPr>
+          <a:xfrm>
+            <a:off x="135468" y="1507068"/>
+            <a:ext cx="7450666" cy="4957630"/>
+          </a:xfrm>
+        </p:spPr>
+        <p:txBody>
+          <a:bodyPr>
+            <a:normAutofit/>
+          </a:bodyPr>
+          <a:lstStyle/>
+          <a:p>
+            <a:r>
+              <a:rPr lang="fr-CA" dirty="0" smtClean="0"/>
+              <a:t>L’implantation des modèles s’effectue d’abord dans SPS et par la suite dans PSIM, de manière à valider les résultats.</a:t>
+            </a:r>
+          </a:p>
+          <a:p>
+            <a:r>
+              <a:rPr lang="fr-CA" dirty="0" smtClean="0"/>
+              <a:t>L’implantation dans le simulateur en temps réel nécessite une simulation SPS fonctionnelle qui doit </a:t>
+            </a:r>
+            <a:r>
+              <a:rPr lang="fr-CA" dirty="0" smtClean="0"/>
+              <a:t>être modifiée selon la nomenclature </a:t>
+            </a:r>
+            <a:r>
+              <a:rPr lang="fr-CA" dirty="0" err="1" smtClean="0"/>
+              <a:t>Opal</a:t>
+            </a:r>
+            <a:r>
+              <a:rPr lang="fr-CA" dirty="0" smtClean="0"/>
+              <a:t>-RT.</a:t>
+            </a:r>
+          </a:p>
+          <a:p>
+            <a:r>
+              <a:rPr lang="fr-CA" dirty="0" smtClean="0"/>
+              <a:t>La commande issue de SPS est par la suite intégrée au simulateur en temps réel. </a:t>
+            </a:r>
+          </a:p>
+          <a:p>
+            <a:r>
+              <a:rPr lang="fr-CA" dirty="0" smtClean="0"/>
+              <a:t>L’optimisation des paramètres de discrétisation pour la simulation en temps réelle est faite de manière à retomber sur les formes d’ondes issues de SPS</a:t>
+            </a:r>
+          </a:p>
+          <a:p>
+            <a:r>
+              <a:rPr lang="fr-CA" dirty="0" smtClean="0"/>
+              <a:t>L’outil de post-traitement permet de visualiser les formes d’ondes obtenues et d’ajuster les paramètres des simulateurs</a:t>
+            </a:r>
+            <a:endParaRPr lang="fr-CA" dirty="0"/>
+          </a:p>
+        </p:txBody>
+      </p:sp>
+    </p:spTree>
+    <p:extLst>
+      <p:ext uri="{BB962C8B-B14F-4D97-AF65-F5344CB8AC3E}">
+        <p14:creationId xmlns:p14="http://schemas.microsoft.com/office/powerpoint/2010/main" val="2868033372"/>
+      </p:ext>
+    </p:extLst>
+  </p:cSld>
+  <p:clrMapOvr>
+    <a:masterClrMapping/>
+  </p:clrMapOvr>
+</p:sld>
+</file>
+
+<file path=ppt/slides/slide12.xml><?xml version="1.0" encoding="utf-8"?>
+<p:sld xmlns:a="http://schemas.openxmlformats.org/drawingml/2006/main" xmlns:r="http://schemas.openxmlformats.org/officeDocument/2006/relationships" xmlns:p="http://schemas.openxmlformats.org/presentationml/2006/main">
+  <p:cSld>
+    <p:spTree>
+      <p:nvGrpSpPr>
+        <p:cNvPr id="1" name=""/>
+        <p:cNvGrpSpPr/>
+        <p:nvPr/>
+      </p:nvGrpSpPr>
+      <p:grpSpPr>
+        <a:xfrm>
+          <a:off x="0" y="0"/>
+          <a:ext cx="0" cy="0"/>
+          <a:chOff x="0" y="0"/>
+          <a:chExt cx="0" cy="0"/>
+        </a:xfrm>
+      </p:grpSpPr>
+      <p:sp>
+        <p:nvSpPr>
+          <p:cNvPr id="4" name="Title 3"/>
+          <p:cNvSpPr>
+            <a:spLocks noGrp="1"/>
+          </p:cNvSpPr>
+          <p:nvPr>
+            <p:ph type="title"/>
+          </p:nvPr>
+        </p:nvSpPr>
+        <p:spPr>
+          <a:xfrm>
+            <a:off x="491068" y="0"/>
+            <a:ext cx="8889999" cy="1320800"/>
+          </a:xfrm>
+        </p:spPr>
+        <p:txBody>
+          <a:bodyPr/>
+          <a:lstStyle/>
+          <a:p>
+            <a:r>
+              <a:rPr lang="en-US" dirty="0" err="1" smtClean="0"/>
+              <a:t>Diagramme</a:t>
+            </a:r>
+            <a:r>
+              <a:rPr lang="en-US" dirty="0" smtClean="0"/>
+              <a:t> des </a:t>
+            </a:r>
+            <a:r>
+              <a:rPr lang="en-US" dirty="0" err="1" smtClean="0"/>
+              <a:t>fonctionnalités</a:t>
+            </a:r>
+            <a:endParaRPr lang="en-US" dirty="0"/>
+          </a:p>
+        </p:txBody>
+      </p:sp>
+      <p:pic>
+        <p:nvPicPr>
+          <p:cNvPr id="6" name="Picture 5" descr="diagramme_des_fonctionnalites.png"/>
+          <p:cNvPicPr>
+            <a:picLocks noChangeAspect="1"/>
+          </p:cNvPicPr>
+          <p:nvPr/>
+        </p:nvPicPr>
+        <p:blipFill>
+          <a:blip r:embed="rId2" cstate="print">
+            <a:extLst>
+              <a:ext uri="{28A0092B-C50C-407E-A947-70E740481C1C}">
+                <a14:useLocalDpi xmlns:a14="http://schemas.microsoft.com/office/drawing/2010/main" val="0"/>
+              </a:ext>
+            </a:extLst>
+          </a:blip>
+          <a:stretch>
+            <a:fillRect/>
+          </a:stretch>
+        </p:blipFill>
+        <p:spPr>
+          <a:xfrm>
+            <a:off x="1765300" y="169334"/>
+            <a:ext cx="5299364" cy="6858000"/>
+          </a:xfrm>
+          <a:prstGeom prst="rect">
+            <a:avLst/>
+          </a:prstGeom>
+        </p:spPr>
+      </p:pic>
+    </p:spTree>
+    <p:extLst>
+      <p:ext uri="{BB962C8B-B14F-4D97-AF65-F5344CB8AC3E}">
+        <p14:creationId xmlns:p14="http://schemas.microsoft.com/office/powerpoint/2010/main" val="1492495086"/>
+      </p:ext>
+    </p:extLst>
+  </p:cSld>
+  <p:clrMapOvr>
+    <a:masterClrMapping/>
+  </p:clrMapOvr>
+</p:sld>
+</file>
+
+<file path=ppt/slides/slide13.xml><?xml version="1.0" encoding="utf-8"?>
+<p:sld xmlns:a="http://schemas.openxmlformats.org/drawingml/2006/main" xmlns:r="http://schemas.openxmlformats.org/officeDocument/2006/relationships" xmlns:p="http://schemas.openxmlformats.org/presentationml/2006/main">
+  <p:cSld>
+    <p:spTree>
+      <p:nvGrpSpPr>
+        <p:cNvPr id="1" name=""/>
+        <p:cNvGrpSpPr/>
+        <p:nvPr/>
+      </p:nvGrpSpPr>
+      <p:grpSpPr>
+        <a:xfrm>
+          <a:off x="0" y="0"/>
+          <a:ext cx="0" cy="0"/>
+          <a:chOff x="0" y="0"/>
+          <a:chExt cx="0" cy="0"/>
+        </a:xfrm>
+      </p:grpSpPr>
+      <p:sp>
+        <p:nvSpPr>
+          <p:cNvPr id="2" name="Title 1"/>
+          <p:cNvSpPr>
+            <a:spLocks noGrp="1"/>
+          </p:cNvSpPr>
+          <p:nvPr>
+            <p:ph type="title"/>
+          </p:nvPr>
+        </p:nvSpPr>
+        <p:spPr/>
+        <p:txBody>
+          <a:bodyPr/>
+          <a:lstStyle/>
+          <a:p>
+            <a:r>
+              <a:rPr lang="en-US" dirty="0" err="1" smtClean="0"/>
+              <a:t>Diagramme</a:t>
+            </a:r>
+            <a:r>
+              <a:rPr lang="en-US" dirty="0" smtClean="0"/>
+              <a:t> physique</a:t>
+            </a:r>
+            <a:endParaRPr lang="en-US" dirty="0"/>
+          </a:p>
+        </p:txBody>
+      </p:sp>
+      <p:pic>
+        <p:nvPicPr>
+          <p:cNvPr id="3" name="Picture 2" descr="Diagramme_physique-2.png"/>
+          <p:cNvPicPr>
+            <a:picLocks noChangeAspect="1"/>
+          </p:cNvPicPr>
+          <p:nvPr/>
+        </p:nvPicPr>
+        <p:blipFill>
+          <a:blip r:embed="rId2">
+            <a:extLst>
+              <a:ext uri="{28A0092B-C50C-407E-A947-70E740481C1C}">
+                <a14:useLocalDpi xmlns:a14="http://schemas.microsoft.com/office/drawing/2010/main" val="0"/>
+              </a:ext>
+            </a:extLst>
+          </a:blip>
+          <a:stretch>
+            <a:fillRect/>
+          </a:stretch>
+        </p:blipFill>
+        <p:spPr>
+          <a:xfrm>
+            <a:off x="508001" y="1422400"/>
+            <a:ext cx="8052816" cy="4706112"/>
+          </a:xfrm>
+          <a:prstGeom prst="rect">
+            <a:avLst/>
+          </a:prstGeom>
+        </p:spPr>
+      </p:pic>
+    </p:spTree>
+    <p:extLst>
+      <p:ext uri="{BB962C8B-B14F-4D97-AF65-F5344CB8AC3E}">
+        <p14:creationId xmlns:p14="http://schemas.microsoft.com/office/powerpoint/2010/main" val="1673667167"/>
+      </p:ext>
+    </p:extLst>
+  </p:cSld>
+  <p:clrMapOvr>
+    <a:masterClrMapping/>
+  </p:clrMapOvr>
+</p:sld>
+</file>
+
+<file path=ppt/slides/slide14.xml><?xml version="1.0" encoding="utf-8"?>
+<p:sld xmlns:a="http://schemas.openxmlformats.org/drawingml/2006/main" xmlns:r="http://schemas.openxmlformats.org/officeDocument/2006/relationships" xmlns:p="http://schemas.openxmlformats.org/presentationml/2006/main">
+  <p:cSld>
+    <p:spTree>
+      <p:nvGrpSpPr>
+        <p:cNvPr id="1" name=""/>
+        <p:cNvGrpSpPr/>
+        <p:nvPr/>
+      </p:nvGrpSpPr>
+      <p:grpSpPr>
+        <a:xfrm>
+          <a:off x="0" y="0"/>
+          <a:ext cx="0" cy="0"/>
+          <a:chOff x="0" y="0"/>
+          <a:chExt cx="0" cy="0"/>
+        </a:xfrm>
+      </p:grpSpPr>
+      <p:sp>
+        <p:nvSpPr>
+          <p:cNvPr id="2" name="Title 1"/>
+          <p:cNvSpPr>
+            <a:spLocks noGrp="1"/>
+          </p:cNvSpPr>
+          <p:nvPr>
+            <p:ph type="title"/>
+          </p:nvPr>
+        </p:nvSpPr>
+        <p:spPr/>
+        <p:txBody>
+          <a:bodyPr/>
+          <a:lstStyle/>
+          <a:p>
+            <a:r>
+              <a:rPr lang="en-US" dirty="0" smtClean="0"/>
+              <a:t>Conception </a:t>
+            </a:r>
+            <a:r>
+              <a:rPr lang="en-US" dirty="0" err="1" smtClean="0"/>
+              <a:t>définitive</a:t>
+            </a:r>
+            <a:r>
+              <a:rPr lang="en-US" dirty="0" smtClean="0"/>
+              <a:t> (DCP/DCN)</a:t>
+            </a:r>
+            <a:endParaRPr lang="en-US" dirty="0"/>
+          </a:p>
+        </p:txBody>
+      </p:sp>
+      <p:pic>
+        <p:nvPicPr>
+          <p:cNvPr id="3" name="Picture 2" descr="Drawing2.png"/>
+          <p:cNvPicPr>
+            <a:picLocks noChangeAspect="1"/>
+          </p:cNvPicPr>
+          <p:nvPr/>
+        </p:nvPicPr>
+        <p:blipFill>
+          <a:blip r:embed="rId2">
+            <a:extLst>
+              <a:ext uri="{28A0092B-C50C-407E-A947-70E740481C1C}">
+                <a14:useLocalDpi xmlns:a14="http://schemas.microsoft.com/office/drawing/2010/main" val="0"/>
+              </a:ext>
+            </a:extLst>
+          </a:blip>
+          <a:stretch>
+            <a:fillRect/>
+          </a:stretch>
+        </p:blipFill>
+        <p:spPr>
+          <a:xfrm>
+            <a:off x="1625601" y="2362200"/>
+            <a:ext cx="5947360" cy="2755900"/>
+          </a:xfrm>
+          <a:prstGeom prst="rect">
+            <a:avLst/>
+          </a:prstGeom>
+        </p:spPr>
+      </p:pic>
+    </p:spTree>
+    <p:extLst>
+      <p:ext uri="{BB962C8B-B14F-4D97-AF65-F5344CB8AC3E}">
+        <p14:creationId xmlns:p14="http://schemas.microsoft.com/office/powerpoint/2010/main" val="2035914628"/>
+      </p:ext>
+    </p:extLst>
+  </p:cSld>
+  <p:clrMapOvr>
+    <a:masterClrMapping/>
+  </p:clrMapOvr>
+</p:sld>
+</file>
+
+<file path=ppt/slides/slide15.xml><?xml version="1.0" encoding="utf-8"?>
+<p:sld xmlns:a="http://schemas.openxmlformats.org/drawingml/2006/main" xmlns:r="http://schemas.openxmlformats.org/officeDocument/2006/relationships" xmlns:p="http://schemas.openxmlformats.org/presentationml/2006/main">
+  <p:cSld>
+    <p:spTree>
+      <p:nvGrpSpPr>
+        <p:cNvPr id="1" name=""/>
+        <p:cNvGrpSpPr/>
+        <p:nvPr/>
+      </p:nvGrpSpPr>
+      <p:grpSpPr>
+        <a:xfrm>
+          <a:off x="0" y="0"/>
+          <a:ext cx="0" cy="0"/>
+          <a:chOff x="0" y="0"/>
+          <a:chExt cx="0" cy="0"/>
+        </a:xfrm>
+      </p:grpSpPr>
+      <p:sp>
+        <p:nvSpPr>
+          <p:cNvPr id="2" name="Title 1"/>
+          <p:cNvSpPr>
+            <a:spLocks noGrp="1"/>
+          </p:cNvSpPr>
+          <p:nvPr>
+            <p:ph type="title"/>
+          </p:nvPr>
+        </p:nvSpPr>
+        <p:spPr>
+          <a:xfrm>
+            <a:off x="508001" y="135467"/>
+            <a:ext cx="6447501" cy="1320800"/>
+          </a:xfrm>
+        </p:spPr>
+        <p:txBody>
+          <a:bodyPr/>
+          <a:lstStyle/>
+          <a:p>
+            <a:r>
+              <a:rPr lang="en-US" dirty="0" err="1" smtClean="0"/>
+              <a:t>Méthode</a:t>
+            </a:r>
+            <a:r>
+              <a:rPr lang="en-US" dirty="0" smtClean="0"/>
+              <a:t> de </a:t>
+            </a:r>
+            <a:r>
+              <a:rPr lang="en-US" dirty="0" err="1" smtClean="0"/>
+              <a:t>commande</a:t>
+            </a:r>
+            <a:r>
+              <a:rPr lang="en-US" dirty="0" smtClean="0"/>
+              <a:t> des blocs </a:t>
+            </a:r>
+            <a:r>
+              <a:rPr lang="en-US" dirty="0" err="1" smtClean="0"/>
+              <a:t>DCp,DCn</a:t>
+            </a:r>
+            <a:endParaRPr lang="en-US" dirty="0"/>
+          </a:p>
+        </p:txBody>
+      </p:sp>
+      <p:pic>
+        <p:nvPicPr>
+          <p:cNvPr id="3" name="Picture 2" descr="commande_NPC_1.png"/>
+          <p:cNvPicPr>
+            <a:picLocks noChangeAspect="1"/>
+          </p:cNvPicPr>
+          <p:nvPr/>
+        </p:nvPicPr>
+        <p:blipFill>
+          <a:blip r:embed="rId2" cstate="print">
+            <a:extLst>
+              <a:ext uri="{28A0092B-C50C-407E-A947-70E740481C1C}">
+                <a14:useLocalDpi xmlns:a14="http://schemas.microsoft.com/office/drawing/2010/main" val="0"/>
+              </a:ext>
+            </a:extLst>
+          </a:blip>
+          <a:stretch>
+            <a:fillRect/>
+          </a:stretch>
+        </p:blipFill>
+        <p:spPr>
+          <a:xfrm>
+            <a:off x="1066806" y="1413934"/>
+            <a:ext cx="6350000" cy="2582332"/>
+          </a:xfrm>
+          <a:prstGeom prst="rect">
+            <a:avLst/>
+          </a:prstGeom>
+        </p:spPr>
+      </p:pic>
+      <p:sp>
+        <p:nvSpPr>
+          <p:cNvPr id="4" name="Rectangle 3"/>
+          <p:cNvSpPr/>
+          <p:nvPr/>
+        </p:nvSpPr>
+        <p:spPr>
+          <a:xfrm>
+            <a:off x="508006" y="4162695"/>
+            <a:ext cx="8077194" cy="2308324"/>
+          </a:xfrm>
+          <a:prstGeom prst="rect">
+            <a:avLst/>
+          </a:prstGeom>
+        </p:spPr>
+        <p:txBody>
+          <a:bodyPr wrap="square">
+            <a:spAutoFit/>
+          </a:bodyPr>
+          <a:lstStyle/>
+          <a:p>
+            <a:pPr marL="742950" lvl="1" indent="-285750">
+              <a:buClr>
+                <a:schemeClr val="tx2">
+                  <a:lumMod val="75000"/>
+                  <a:lumOff val="25000"/>
+                </a:schemeClr>
+              </a:buClr>
+              <a:buFont typeface="Arial"/>
+              <a:buChar char="•"/>
+            </a:pPr>
+            <a:r>
+              <a:rPr lang="en-CA" sz="2400" dirty="0" err="1" smtClean="0"/>
+              <a:t>Comparaison</a:t>
+            </a:r>
+            <a:r>
+              <a:rPr lang="en-CA" sz="2400" dirty="0" smtClean="0"/>
+              <a:t> entre le signal </a:t>
+            </a:r>
+            <a:r>
+              <a:rPr lang="en-CA" sz="2400" dirty="0" err="1" smtClean="0"/>
+              <a:t>d’erreur</a:t>
+            </a:r>
+            <a:r>
+              <a:rPr lang="en-CA" sz="2400" dirty="0" smtClean="0"/>
+              <a:t> et </a:t>
+            </a:r>
+            <a:r>
+              <a:rPr lang="en-CA" sz="2400" dirty="0" err="1" smtClean="0"/>
+              <a:t>trois</a:t>
+            </a:r>
+            <a:r>
+              <a:rPr lang="en-CA" sz="2400" dirty="0" smtClean="0"/>
+              <a:t> </a:t>
+            </a:r>
+            <a:r>
+              <a:rPr lang="en-CA" sz="2400" dirty="0" err="1" smtClean="0"/>
+              <a:t>signaux</a:t>
+            </a:r>
+            <a:r>
+              <a:rPr lang="en-CA" sz="2400" dirty="0" smtClean="0"/>
+              <a:t> en dent de </a:t>
+            </a:r>
+            <a:r>
+              <a:rPr lang="en-CA" sz="2400" dirty="0" err="1" smtClean="0"/>
+              <a:t>scie</a:t>
+            </a:r>
+            <a:endParaRPr lang="en-CA" sz="2400" dirty="0" smtClean="0"/>
+          </a:p>
+          <a:p>
+            <a:pPr marL="742950" lvl="1" indent="-285750">
+              <a:buClr>
+                <a:schemeClr val="tx2">
+                  <a:lumMod val="75000"/>
+                  <a:lumOff val="25000"/>
+                </a:schemeClr>
+              </a:buClr>
+              <a:buFont typeface="Arial"/>
+              <a:buChar char="•"/>
+            </a:pPr>
+            <a:r>
+              <a:rPr lang="en-CA" sz="2400" dirty="0" smtClean="0"/>
+              <a:t>Activation de la </a:t>
+            </a:r>
+            <a:r>
+              <a:rPr lang="en-CA" sz="2400" dirty="0" err="1" smtClean="0"/>
+              <a:t>paire</a:t>
+            </a:r>
+            <a:r>
+              <a:rPr lang="en-CA" sz="2400" dirty="0" smtClean="0"/>
+              <a:t> </a:t>
+            </a:r>
+            <a:r>
+              <a:rPr lang="en-CA" sz="2400" dirty="0" err="1" smtClean="0"/>
+              <a:t>d’IGBT</a:t>
+            </a:r>
+            <a:r>
+              <a:rPr lang="en-CA" sz="2400" dirty="0" smtClean="0"/>
+              <a:t> </a:t>
+            </a:r>
+            <a:r>
+              <a:rPr lang="en-CA" sz="2400" dirty="0" err="1" smtClean="0"/>
+              <a:t>associée</a:t>
+            </a:r>
+            <a:r>
+              <a:rPr lang="en-CA" sz="2400" dirty="0" smtClean="0"/>
+              <a:t> pendant le temps </a:t>
+            </a:r>
+            <a:r>
+              <a:rPr lang="en-CA" sz="2400" dirty="0" err="1" smtClean="0"/>
+              <a:t>calculé</a:t>
+            </a:r>
+            <a:r>
+              <a:rPr lang="en-CA" sz="2400" dirty="0" smtClean="0"/>
+              <a:t> </a:t>
+            </a:r>
+          </a:p>
+          <a:p>
+            <a:pPr marL="742950" lvl="1" indent="-285750">
+              <a:buClr>
+                <a:schemeClr val="tx2">
+                  <a:lumMod val="75000"/>
+                  <a:lumOff val="25000"/>
+                </a:schemeClr>
+              </a:buClr>
+              <a:buFont typeface="Arial"/>
+              <a:buChar char="•"/>
+            </a:pPr>
+            <a:r>
+              <a:rPr lang="en-CA" sz="2400" dirty="0" err="1" smtClean="0"/>
+              <a:t>Chaque</a:t>
+            </a:r>
+            <a:r>
+              <a:rPr lang="en-CA" sz="2400" dirty="0" smtClean="0"/>
+              <a:t> bras </a:t>
+            </a:r>
+            <a:r>
+              <a:rPr lang="en-CA" sz="2400" dirty="0" err="1" smtClean="0"/>
+              <a:t>est</a:t>
+            </a:r>
+            <a:r>
+              <a:rPr lang="en-CA" sz="2400" dirty="0" smtClean="0"/>
+              <a:t> </a:t>
+            </a:r>
+            <a:r>
+              <a:rPr lang="en-CA" sz="2400" dirty="0" err="1" smtClean="0"/>
+              <a:t>commandé</a:t>
+            </a:r>
+            <a:r>
+              <a:rPr lang="en-CA" sz="2400" dirty="0" smtClean="0"/>
+              <a:t> </a:t>
+            </a:r>
+            <a:r>
+              <a:rPr lang="en-CA" sz="2400" dirty="0" err="1" smtClean="0"/>
+              <a:t>à</a:t>
+            </a:r>
+            <a:r>
+              <a:rPr lang="en-CA" sz="2400" dirty="0" smtClean="0"/>
+              <a:t> un </a:t>
+            </a:r>
+            <a:r>
+              <a:rPr lang="en-CA" sz="2400" dirty="0" err="1" smtClean="0"/>
+              <a:t>intervalle</a:t>
+            </a:r>
+            <a:r>
+              <a:rPr lang="en-CA" sz="2400" dirty="0" smtClean="0"/>
+              <a:t> de 3ms</a:t>
+            </a:r>
+          </a:p>
+          <a:p>
+            <a:pPr marL="742950" lvl="1" indent="-285750">
+              <a:buClr>
+                <a:schemeClr val="tx2">
+                  <a:lumMod val="75000"/>
+                  <a:lumOff val="25000"/>
+                </a:schemeClr>
+              </a:buClr>
+              <a:buFont typeface="Arial"/>
+              <a:buChar char="•"/>
+            </a:pPr>
+            <a:r>
+              <a:rPr lang="en-CA" sz="2400" dirty="0" smtClean="0"/>
+              <a:t>La </a:t>
+            </a:r>
+            <a:r>
+              <a:rPr lang="en-CA" sz="2400" dirty="0" err="1" smtClean="0"/>
+              <a:t>commande</a:t>
+            </a:r>
+            <a:r>
+              <a:rPr lang="en-CA" sz="2400" dirty="0" smtClean="0"/>
+              <a:t> des bras </a:t>
+            </a:r>
+            <a:r>
+              <a:rPr lang="en-CA" sz="2400" dirty="0" err="1" smtClean="0"/>
+              <a:t>est</a:t>
+            </a:r>
+            <a:r>
+              <a:rPr lang="en-CA" sz="2400" dirty="0" smtClean="0"/>
+              <a:t> </a:t>
+            </a:r>
+            <a:r>
+              <a:rPr lang="en-CA" sz="2400" dirty="0" err="1" smtClean="0"/>
+              <a:t>décalée</a:t>
+            </a:r>
+            <a:r>
+              <a:rPr lang="en-CA" sz="2400" dirty="0" smtClean="0"/>
+              <a:t> de 1ms</a:t>
+            </a:r>
+            <a:endParaRPr lang="en-CA" sz="2400" dirty="0"/>
+          </a:p>
+        </p:txBody>
+      </p:sp>
+    </p:spTree>
+    <p:extLst>
+      <p:ext uri="{BB962C8B-B14F-4D97-AF65-F5344CB8AC3E}">
+        <p14:creationId xmlns:p14="http://schemas.microsoft.com/office/powerpoint/2010/main" val="1640360223"/>
+      </p:ext>
+    </p:extLst>
+  </p:cSld>
+  <p:clrMapOvr>
+    <a:masterClrMapping/>
+  </p:clrMapOvr>
+</p:sld>
+</file>
+
+<file path=ppt/slides/slide16.xml><?xml version="1.0" encoding="utf-8"?>
+<p:sld xmlns:a="http://schemas.openxmlformats.org/drawingml/2006/main" xmlns:r="http://schemas.openxmlformats.org/officeDocument/2006/relationships" xmlns:p="http://schemas.openxmlformats.org/presentationml/2006/main">
+  <p:cSld>
+    <p:spTree>
+      <p:nvGrpSpPr>
+        <p:cNvPr id="1" name=""/>
+        <p:cNvGrpSpPr/>
+        <p:nvPr/>
+      </p:nvGrpSpPr>
+      <p:grpSpPr>
+        <a:xfrm>
+          <a:off x="0" y="0"/>
+          <a:ext cx="0" cy="0"/>
+          <a:chOff x="0" y="0"/>
+          <a:chExt cx="0" cy="0"/>
+        </a:xfrm>
+      </p:grpSpPr>
+      <p:sp>
+        <p:nvSpPr>
+          <p:cNvPr id="2" name="Title 1"/>
+          <p:cNvSpPr>
+            <a:spLocks noGrp="1"/>
+          </p:cNvSpPr>
+          <p:nvPr>
+            <p:ph type="title"/>
+          </p:nvPr>
+        </p:nvSpPr>
+        <p:spPr/>
+        <p:txBody>
+          <a:bodyPr/>
+          <a:lstStyle/>
+          <a:p>
+            <a:r>
+              <a:rPr lang="en-US" dirty="0" smtClean="0"/>
+              <a:t>Implantation SPS</a:t>
+            </a:r>
+            <a:endParaRPr lang="en-US" dirty="0"/>
+          </a:p>
+        </p:txBody>
+      </p:sp>
+      <p:pic>
+        <p:nvPicPr>
+          <p:cNvPr id="5" name="Picture 4" descr="Screen Shot 2014-02-23 at 11.05.52 PM.png"/>
+          <p:cNvPicPr>
+            <a:picLocks noChangeAspect="1"/>
+          </p:cNvPicPr>
+          <p:nvPr/>
+        </p:nvPicPr>
+        <p:blipFill>
+          <a:blip r:embed="rId2">
+            <a:extLst>
+              <a:ext uri="{28A0092B-C50C-407E-A947-70E740481C1C}">
+                <a14:useLocalDpi xmlns:a14="http://schemas.microsoft.com/office/drawing/2010/main" val="0"/>
+              </a:ext>
+            </a:extLst>
+          </a:blip>
+          <a:stretch>
+            <a:fillRect/>
+          </a:stretch>
+        </p:blipFill>
+        <p:spPr>
+          <a:xfrm>
+            <a:off x="508001" y="1524001"/>
+            <a:ext cx="7797113" cy="3886200"/>
+          </a:xfrm>
+          <a:prstGeom prst="rect">
+            <a:avLst/>
+          </a:prstGeom>
+        </p:spPr>
+      </p:pic>
+    </p:spTree>
+    <p:extLst>
+      <p:ext uri="{BB962C8B-B14F-4D97-AF65-F5344CB8AC3E}">
+        <p14:creationId xmlns:p14="http://schemas.microsoft.com/office/powerpoint/2010/main" val="786968236"/>
+      </p:ext>
+    </p:extLst>
+  </p:cSld>
+  <p:clrMapOvr>
+    <a:masterClrMapping/>
+  </p:clrMapOvr>
 </p:sld>
 </file>
 
@@ -7672,14 +8729,14 @@
             <a:noFill/>
           </a:ln>
           <a:extLst>
-            <a:ext uri="{909E8E84-426E-40DD-AFC4-6F175D3DCCD1}">
+            <a:ext uri="{909E8E84-426E-40dd-AFC4-6F175D3DCCD1}">
               <a14:hiddenFill xmlns:a14="http://schemas.microsoft.com/office/drawing/2010/main">
                 <a:solidFill>
                   <a:srgbClr val="FFFFFF"/>
                 </a:solidFill>
               </a14:hiddenFill>
             </a:ext>
-            <a:ext uri="{91240B29-F687-4F45-9708-019B960494DF}">
+            <a:ext uri="{91240B29-F687-4f45-9708-019B960494DF}">
               <a14:hiddenLine xmlns:a14="http://schemas.microsoft.com/office/drawing/2010/main" w="9525">
                 <a:solidFill>
                   <a:srgbClr val="000000"/>
@@ -7759,7 +8816,7 @@
   <p:timing>
     <p:tnLst>
       <p:par>
-        <p:cTn id="1" dur="indefinite" restart="never" nodeType="tmRoot"/>
+        <p:cTn xmlns:p14="http://schemas.microsoft.com/office/powerpoint/2010/main" id="1" dur="indefinite" restart="never" nodeType="tmRoot"/>
       </p:par>
     </p:tnLst>
   </p:timing>
@@ -9412,7 +10469,7 @@
       </p:sp>
       <p:pic>
         <p:nvPicPr>
-          <p:cNvPr id="4" name="Picture 3" descr="Screen Shot 2014-02-23 at 5.20.03 PM.png"/>
+          <p:cNvPr id="5" name="Picture 4" descr="Screen Shot 2014-02-23 at 3.51.57 PM.png"/>
           <p:cNvPicPr>
             <a:picLocks noChangeAspect="1"/>
           </p:cNvPicPr>
@@ -9432,8 +10489,8 @@
         </p:blipFill>
         <p:spPr>
           <a:xfrm>
-            <a:off x="3556000" y="3456588"/>
-            <a:ext cx="6462183" cy="1647601"/>
+            <a:off x="186755" y="751763"/>
+            <a:ext cx="5071533" cy="2785029"/>
           </a:xfrm>
           <a:prstGeom prst="rect">
             <a:avLst/>
@@ -9442,7 +10499,7 @@
       </p:pic>
       <p:pic>
         <p:nvPicPr>
-          <p:cNvPr id="5" name="Picture 4" descr="Screen Shot 2014-02-23 at 3.51.57 PM.png"/>
+          <p:cNvPr id="2" name="Picture 1" descr="Drawing1.png"/>
           <p:cNvPicPr>
             <a:picLocks noChangeAspect="1"/>
           </p:cNvPicPr>
@@ -9462,8 +10519,8 @@
         </p:blipFill>
         <p:spPr>
           <a:xfrm>
-            <a:off x="186755" y="751763"/>
-            <a:ext cx="5071533" cy="2785029"/>
+            <a:off x="4250267" y="3604281"/>
+            <a:ext cx="5757331" cy="1492642"/>
           </a:xfrm>
           <a:prstGeom prst="rect">
             <a:avLst/>
@@ -9500,9 +10557,50 @@
           <a:chExt cx="0" cy="0"/>
         </a:xfrm>
       </p:grpSpPr>
+      <p:sp>
+        <p:nvSpPr>
+          <p:cNvPr id="9" name="Title 1"/>
+          <p:cNvSpPr>
+            <a:spLocks noGrp="1"/>
+          </p:cNvSpPr>
+          <p:nvPr>
+            <p:ph type="title"/>
+          </p:nvPr>
+        </p:nvSpPr>
+        <p:spPr>
+          <a:xfrm>
+            <a:off x="186755" y="643939"/>
+            <a:ext cx="7825042" cy="1743661"/>
+          </a:xfrm>
+        </p:spPr>
+        <p:txBody>
+          <a:bodyPr>
+            <a:normAutofit/>
+          </a:bodyPr>
+          <a:lstStyle/>
+          <a:p>
+            <a:r>
+              <a:rPr lang="en-US" sz="2800" dirty="0" smtClean="0"/>
+              <a:t>Implantation</a:t>
+            </a:r>
+            <a:br>
+              <a:rPr lang="en-US" sz="2800" dirty="0" smtClean="0"/>
+            </a:br>
+            <a:r>
+              <a:rPr lang="en-US" sz="2800" dirty="0" err="1" smtClean="0"/>
+              <a:t>Matlab</a:t>
+            </a:r>
+            <a:r>
+              <a:rPr lang="en-US" sz="2800" dirty="0" smtClean="0"/>
+              <a:t> (SPS)</a:t>
+            </a:r>
+            <a:endParaRPr lang="en-US" sz="2800" dirty="0"/>
+          </a:p>
+        </p:txBody>
+      </p:sp>
       <p:pic>
         <p:nvPicPr>
-          <p:cNvPr id="7" name="Picture 6" descr="Screen Shot 2014-02-23 at 5.29.39 PM.png"/>
+          <p:cNvPr id="2" name="Picture 1" descr="Icharge matlab.JPG"/>
           <p:cNvPicPr>
             <a:picLocks noChangeAspect="1"/>
           </p:cNvPicPr>
@@ -9522,8 +10620,8 @@
         </p:blipFill>
         <p:spPr>
           <a:xfrm>
-            <a:off x="550016" y="2743198"/>
-            <a:ext cx="7970144" cy="4013202"/>
+            <a:off x="97855" y="2387600"/>
+            <a:ext cx="4414296" cy="2408577"/>
           </a:xfrm>
           <a:prstGeom prst="rect">
             <a:avLst/>
@@ -9532,7 +10630,7 @@
       </p:pic>
       <p:pic>
         <p:nvPicPr>
-          <p:cNvPr id="8" name="Picture 7" descr="Screen Shot 2014-02-23 at 5.31.06 PM.png"/>
+          <p:cNvPr id="4" name="Picture 3" descr="Capture-4.JPG"/>
           <p:cNvPicPr>
             <a:picLocks noChangeAspect="1"/>
           </p:cNvPicPr>
@@ -9552,55 +10650,14 @@
         </p:blipFill>
         <p:spPr>
           <a:xfrm>
-            <a:off x="2833254" y="125147"/>
-            <a:ext cx="5686906" cy="2626842"/>
+            <a:off x="4499451" y="2387600"/>
+            <a:ext cx="5478786" cy="2408577"/>
           </a:xfrm>
           <a:prstGeom prst="rect">
             <a:avLst/>
           </a:prstGeom>
         </p:spPr>
       </p:pic>
-      <p:sp>
-        <p:nvSpPr>
-          <p:cNvPr id="9" name="Title 1"/>
-          <p:cNvSpPr>
-            <a:spLocks noGrp="1"/>
-          </p:cNvSpPr>
-          <p:nvPr>
-            <p:ph type="title"/>
-          </p:nvPr>
-        </p:nvSpPr>
-        <p:spPr>
-          <a:xfrm>
-            <a:off x="186755" y="643939"/>
-            <a:ext cx="7825042" cy="1743661"/>
-          </a:xfrm>
-        </p:spPr>
-        <p:txBody>
-          <a:bodyPr>
-            <a:normAutofit/>
-          </a:bodyPr>
-          <a:lstStyle/>
-          <a:p>
-            <a:r>
-              <a:rPr lang="en-US" sz="2800" dirty="0" smtClean="0"/>
-              <a:t>Implantation</a:t>
-            </a:r>
-            <a:br>
-              <a:rPr lang="en-US" sz="2800" dirty="0" smtClean="0"/>
-            </a:br>
-            <a:r>
-              <a:rPr lang="en-US" sz="2800" dirty="0" err="1" smtClean="0"/>
-              <a:t>Matlab</a:t>
-            </a:r>
-            <a:r>
-              <a:rPr lang="en-US" sz="2800" dirty="0" smtClean="0"/>
-              <a:t> (SPS)</a:t>
-            </a:r>
-            <a:endParaRPr lang="en-US" sz="2800" dirty="0"/>
-          </a:p>
-        </p:txBody>
-      </p:sp>
     </p:spTree>
     <p:extLst>
       <p:ext uri="{BB962C8B-B14F-4D97-AF65-F5344CB8AC3E}">
@@ -9654,8 +10711,8 @@
               <a:rPr lang="en-CA" dirty="0" smtClean="0"/>
             </a:br>
             <a:r>
-              <a:rPr lang="en-CA" dirty="0" err="1" smtClean="0"/>
-              <a:t>Psim</a:t>
+              <a:rPr lang="en-CA" dirty="0" smtClean="0"/>
+              <a:t>PSIM</a:t>
             </a:r>
             <a:endParaRPr lang="fr-CA" dirty="0"/>
           </a:p>
@@ -9684,8 +10741,8 @@
         </p:blipFill>
         <p:spPr bwMode="auto">
           <a:xfrm>
-            <a:off x="939801" y="2111039"/>
-            <a:ext cx="7162799" cy="2118061"/>
+            <a:off x="1337733" y="1930400"/>
+            <a:ext cx="6764867" cy="2000391"/>
           </a:xfrm>
           <a:prstGeom prst="rect">
             <a:avLst/>
@@ -9695,14 +10752,14 @@
             <a:noFill/>
           </a:ln>
           <a:extLst>
-            <a:ext uri="{909E8E84-426E-40DD-AFC4-6F175D3DCCD1}">
+            <a:ext uri="{909E8E84-426E-40dd-AFC4-6F175D3DCCD1}">
               <a14:hiddenFill xmlns:a14="http://schemas.microsoft.com/office/drawing/2010/main">
                 <a:solidFill>
                   <a:schemeClr val="accent1"/>
                 </a:solidFill>
               </a14:hiddenFill>
             </a:ext>
-            <a:ext uri="{91240B29-F687-4F45-9708-019B960494DF}">
+            <a:ext uri="{91240B29-F687-4f45-9708-019B960494DF}">
               <a14:hiddenLine xmlns:a14="http://schemas.microsoft.com/office/drawing/2010/main" w="9525">
                 <a:solidFill>
                   <a:schemeClr val="tx1"/>
@@ -9717,9 +10774,9 @@
       </p:pic>
       <p:pic>
         <p:nvPicPr>
-          <p:cNvPr id="1027" name="Picture 3"/>
+          <p:cNvPr id="3" name="Picture 2" descr="Capture-1.JPG"/>
           <p:cNvPicPr>
-            <a:picLocks noChangeAspect="1" noChangeArrowheads="1"/>
+            <a:picLocks noChangeAspect="1"/>
           </p:cNvPicPr>
           <p:nvPr/>
         </p:nvPicPr>
@@ -9731,96 +10788,18 @@
               </a:ext>
             </a:extLst>
           </a:blip>
-          <a:srcRect/>
           <a:stretch>
             <a:fillRect/>
           </a:stretch>
         </p:blipFill>
-        <p:spPr bwMode="auto">
+        <p:spPr>
           <a:xfrm>
-            <a:off x="3975100" y="101600"/>
-            <a:ext cx="3991898" cy="2009439"/>
+            <a:off x="1337733" y="3807464"/>
+            <a:ext cx="6764866" cy="2055735"/>
           </a:xfrm>
           <a:prstGeom prst="rect">
             <a:avLst/>
           </a:prstGeom>
-          <a:noFill/>
-          <a:ln>
-            <a:noFill/>
-          </a:ln>
-          <a:extLst>
-            <a:ext uri="{909E8E84-426E-40DD-AFC4-6F175D3DCCD1}">
-              <a14:hiddenFill xmlns:a14="http://schemas.microsoft.com/office/drawing/2010/main">
-                <a:solidFill>
-                  <a:schemeClr val="accent1"/>
-                </a:solidFill>
-              </a14:hiddenFill>
-            </a:ext>
-            <a:ext uri="{91240B29-F687-4F45-9708-019B960494DF}">
-              <a14:hiddenLine xmlns:a14="http://schemas.microsoft.com/office/drawing/2010/main" w="9525">
-                <a:solidFill>
-                  <a:schemeClr val="tx1"/>
-                </a:solidFill>
-                <a:miter lim="800000"/>
-                <a:headEnd/>
-                <a:tailEnd/>
-              </a14:hiddenLine>
-            </a:ext>
-          </a:extLst>
-        </p:spPr>
-      </p:pic>
-      <p:pic>
-        <p:nvPicPr>
-          <p:cNvPr id="1028" name="Picture 4"/>
-          <p:cNvPicPr>
-            <a:picLocks noChangeAspect="1" noChangeArrowheads="1"/>
-          </p:cNvPicPr>
-          <p:nvPr/>
-        </p:nvPicPr>
-        <p:blipFill>
-          <a:blip r:embed="rId4">
-            <a:extLst>
-              <a:ext uri="{28A0092B-C50C-407E-A947-70E740481C1C}">
-                <a14:useLocalDpi xmlns:a14="http://schemas.microsoft.com/office/drawing/2010/main" val="0"/>
-              </a:ext>
-            </a:extLst>
-          </a:blip>
-          <a:srcRect/>
-          <a:stretch>
-            <a:fillRect/>
-          </a:stretch>
-        </p:blipFill>
-        <p:spPr bwMode="auto">
-          <a:xfrm>
-            <a:off x="381001" y="4229100"/>
-            <a:ext cx="7950199" cy="2425700"/>
-          </a:xfrm>
-          <a:prstGeom prst="rect">
-            <a:avLst/>
-          </a:prstGeom>
-          <a:noFill/>
-          <a:ln>
-            <a:noFill/>
-          </a:ln>
-          <a:extLst>
-            <a:ext uri="{909E8E84-426E-40DD-AFC4-6F175D3DCCD1}">
-              <a14:hiddenFill xmlns:a14="http://schemas.microsoft.com/office/drawing/2010/main">
-                <a:solidFill>
-                  <a:schemeClr val="accent1"/>
-                </a:solidFill>
-              </a14:hiddenFill>
-            </a:ext>
-            <a:ext uri="{91240B29-F687-4F45-9708-019B960494DF}">
-              <a14:hiddenLine xmlns:a14="http://schemas.microsoft.com/office/drawing/2010/main" w="9525">
-                <a:solidFill>
-                  <a:schemeClr val="tx1"/>
-                </a:solidFill>
-                <a:miter lim="800000"/>
-                <a:headEnd/>
-                <a:tailEnd/>
-              </a14:hiddenLine>
-            </a:ext>
-          </a:extLst>
         </p:spPr>
       </p:pic>
     </p:spTree>
@@ -10099,7 +11078,7 @@
   <a:extraClrSchemeLst/>
   <a:extLst>
     <a:ext uri="{05A4C25C-085E-4340-85A3-A5531E510DB2}">
-      <thm15:themeFamily xmlns="" xmlns:thm15="http://schemas.microsoft.com/office/thememl/2012/main" name="Facet" id="{C0C680CD-088A-49FC-A102-D699147F32B2}" vid="{CFBC31BA-B70F-4F30-BCAA-4F3011E16C4D}"/>
+      <thm15:themeFamily xmlns:thm15="http://schemas.microsoft.com/office/thememl/2012/main" xmlns="" name="Facet" id="{C0C680CD-088A-49FC-A102-D699147F32B2}" vid="{CFBC31BA-B70F-4F30-BCAA-4F3011E16C4D}"/>
     </a:ext>
   </a:extLst>
 </a:theme>

</xml_diff>

<commit_message>
ajout de partie sur l'AFE
</commit_message>
<xml_diff>
--- a/Remise/Remise 2/Presentation1_corrigee_DT.pptx
+++ b/Remise/Remise 2/Presentation1_corrigee_DT.pptx
@@ -21,6 +21,9 @@
     <p:sldId id="271" r:id="rId15"/>
     <p:sldId id="272" r:id="rId16"/>
     <p:sldId id="273" r:id="rId17"/>
+    <p:sldId id="274" r:id="rId18"/>
+    <p:sldId id="275" r:id="rId19"/>
+    <p:sldId id="276" r:id="rId20"/>
   </p:sldIdLst>
   <p:sldSz cx="9144000" cy="6858000" type="screen4x3"/>
   <p:notesSz cx="6858000" cy="9144000"/>
@@ -914,7 +917,7 @@
                 <a:latin typeface="Trebuchet MS"/>
               </a:rPr>
               <a:pPr/>
-              <a:t>‹#›</a:t>
+              <a:t>‹N°›</a:t>
             </a:fld>
             <a:endParaRPr lang="en-US">
               <a:solidFill>
@@ -1210,7 +1213,7 @@
                 <a:latin typeface="Trebuchet MS"/>
               </a:rPr>
               <a:pPr/>
-              <a:t>‹#›</a:t>
+              <a:t>‹N°›</a:t>
             </a:fld>
             <a:endParaRPr lang="en-US">
               <a:solidFill>
@@ -1494,7 +1497,7 @@
                 <a:latin typeface="Trebuchet MS"/>
               </a:rPr>
               <a:pPr/>
-              <a:t>‹#›</a:t>
+              <a:t>‹N°›</a:t>
             </a:fld>
             <a:endParaRPr lang="en-US">
               <a:solidFill>
@@ -1841,7 +1844,7 @@
                 <a:latin typeface="Trebuchet MS"/>
               </a:rPr>
               <a:pPr/>
-              <a:t>‹#›</a:t>
+              <a:t>‹N°›</a:t>
             </a:fld>
             <a:endParaRPr lang="en-US">
               <a:solidFill>
@@ -2214,7 +2217,7 @@
                 <a:latin typeface="Trebuchet MS"/>
               </a:rPr>
               <a:pPr/>
-              <a:t>‹#›</a:t>
+              <a:t>‹N°›</a:t>
             </a:fld>
             <a:endParaRPr lang="en-US">
               <a:solidFill>
@@ -2561,7 +2564,7 @@
                 <a:latin typeface="Trebuchet MS"/>
               </a:rPr>
               <a:pPr/>
-              <a:t>‹#›</a:t>
+              <a:t>‹N°›</a:t>
             </a:fld>
             <a:endParaRPr lang="en-US">
               <a:solidFill>
@@ -2985,7 +2988,7 @@
                 <a:latin typeface="Trebuchet MS"/>
               </a:rPr>
               <a:pPr/>
-              <a:t>‹#›</a:t>
+              <a:t>‹N°›</a:t>
             </a:fld>
             <a:endParaRPr lang="en-US">
               <a:solidFill>
@@ -3188,7 +3191,7 @@
                 <a:latin typeface="Trebuchet MS"/>
               </a:rPr>
               <a:pPr/>
-              <a:t>‹#›</a:t>
+              <a:t>‹N°›</a:t>
             </a:fld>
             <a:endParaRPr lang="en-US">
               <a:solidFill>
@@ -3401,7 +3404,7 @@
                 <a:latin typeface="Trebuchet MS"/>
               </a:rPr>
               <a:pPr/>
-              <a:t>‹#›</a:t>
+              <a:t>‹N°›</a:t>
             </a:fld>
             <a:endParaRPr lang="en-US">
               <a:solidFill>
@@ -3691,7 +3694,7 @@
                 <a:latin typeface="Trebuchet MS"/>
               </a:rPr>
               <a:pPr/>
-              <a:t>‹#›</a:t>
+              <a:t>‹N°›</a:t>
             </a:fld>
             <a:endParaRPr lang="en-US" dirty="0">
               <a:solidFill>
@@ -3900,7 +3903,7 @@
                 <a:latin typeface="Trebuchet MS"/>
               </a:rPr>
               <a:pPr/>
-              <a:t>‹#›</a:t>
+              <a:t>‹N°›</a:t>
             </a:fld>
             <a:endParaRPr lang="en-US">
               <a:solidFill>
@@ -4180,7 +4183,7 @@
                 <a:latin typeface="Trebuchet MS"/>
               </a:rPr>
               <a:pPr/>
-              <a:t>‹#›</a:t>
+              <a:t>‹N°›</a:t>
             </a:fld>
             <a:endParaRPr lang="en-US">
               <a:solidFill>
@@ -4445,7 +4448,7 @@
                 <a:latin typeface="Trebuchet MS"/>
               </a:rPr>
               <a:pPr/>
-              <a:t>‹#›</a:t>
+              <a:t>‹N°›</a:t>
             </a:fld>
             <a:endParaRPr lang="en-US">
               <a:solidFill>
@@ -4852,7 +4855,7 @@
                 <a:latin typeface="Trebuchet MS"/>
               </a:rPr>
               <a:pPr/>
-              <a:t>‹#›</a:t>
+              <a:t>‹N°›</a:t>
             </a:fld>
             <a:endParaRPr lang="en-US">
               <a:solidFill>
@@ -5008,7 +5011,7 @@
                 <a:latin typeface="Trebuchet MS"/>
               </a:rPr>
               <a:pPr/>
-              <a:t>‹#›</a:t>
+              <a:t>‹N°›</a:t>
             </a:fld>
             <a:endParaRPr lang="en-US">
               <a:solidFill>
@@ -5136,7 +5139,7 @@
                 <a:latin typeface="Trebuchet MS"/>
               </a:rPr>
               <a:pPr/>
-              <a:t>‹#›</a:t>
+              <a:t>‹N°›</a:t>
             </a:fld>
             <a:endParaRPr lang="en-US">
               <a:solidFill>
@@ -5279,7 +5282,7 @@
                 <a:latin typeface="Trebuchet MS"/>
               </a:rPr>
               <a:pPr/>
-              <a:t>‹#›</a:t>
+              <a:t>‹N°›</a:t>
             </a:fld>
             <a:endParaRPr lang="en-US">
               <a:solidFill>
@@ -6097,7 +6100,7 @@
                 <a:latin typeface="Trebuchet MS"/>
               </a:rPr>
               <a:pPr/>
-              <a:t>‹#›</a:t>
+              <a:t>‹N°›</a:t>
             </a:fld>
             <a:endParaRPr lang="en-US">
               <a:solidFill>
@@ -6929,7 +6932,7 @@
                 <a:latin typeface="Trebuchet MS"/>
               </a:rPr>
               <a:pPr defTabSz="914400"/>
-              <a:t>‹#›</a:t>
+              <a:t>‹N°›</a:t>
             </a:fld>
             <a:endParaRPr lang="en-US">
               <a:solidFill>
@@ -7479,7 +7482,7 @@
   <p:timing>
     <p:tnLst>
       <p:par>
-        <p:cTn xmlns:p14="http://schemas.microsoft.com/office/powerpoint/2010/main" id="1" dur="indefinite" restart="never" nodeType="tmRoot"/>
+        <p:cTn id="1" dur="indefinite" restart="never" nodeType="tmRoot"/>
       </p:par>
     </p:tnLst>
   </p:timing>
@@ -7689,11 +7692,7 @@
             </a:pPr>
             <a:r>
               <a:rPr lang="fr-CA" sz="1600" dirty="0" smtClean="0"/>
-              <a:t>Les paramètres n’impliquant pas l’ajout de blocs ou des modifications importantes peuvent </a:t>
-            </a:r>
-            <a:r>
-              <a:rPr lang="fr-CA" sz="1600" dirty="0" smtClean="0"/>
-              <a:t>être changés pendant que la simulation tourne.</a:t>
+              <a:t>Les paramètres n’impliquant pas l’ajout de blocs ou des modifications importantes peuvent être changés pendant que la simulation tourne.</a:t>
             </a:r>
             <a:endParaRPr lang="fr-CA" sz="1600" dirty="0"/>
           </a:p>
@@ -7814,11 +7813,7 @@
           <a:p>
             <a:r>
               <a:rPr lang="fr-CA" dirty="0" smtClean="0"/>
-              <a:t>L’implantation dans le simulateur en temps réel nécessite une simulation SPS fonctionnelle qui doit </a:t>
-            </a:r>
-            <a:r>
-              <a:rPr lang="fr-CA" dirty="0" smtClean="0"/>
-              <a:t>être modifiée selon la nomenclature </a:t>
+              <a:t>L’implantation dans le simulateur en temps réel nécessite une simulation SPS fonctionnelle qui doit être modifiée selon la nomenclature </a:t>
             </a:r>
             <a:r>
               <a:rPr lang="fr-CA" dirty="0" err="1" smtClean="0"/>
@@ -8527,6 +8522,528 @@
     <p:extLst>
       <p:ext uri="{BB962C8B-B14F-4D97-AF65-F5344CB8AC3E}">
         <p14:creationId xmlns:p14="http://schemas.microsoft.com/office/powerpoint/2010/main" val="786968236"/>
+      </p:ext>
+    </p:extLst>
+  </p:cSld>
+  <p:clrMapOvr>
+    <a:masterClrMapping/>
+  </p:clrMapOvr>
+</p:sld>
+</file>
+
+<file path=ppt/slides/slide17.xml><?xml version="1.0" encoding="utf-8"?>
+<p:sld xmlns:a="http://schemas.openxmlformats.org/drawingml/2006/main" xmlns:r="http://schemas.openxmlformats.org/officeDocument/2006/relationships" xmlns:p="http://schemas.openxmlformats.org/presentationml/2006/main">
+  <p:cSld>
+    <p:spTree>
+      <p:nvGrpSpPr>
+        <p:cNvPr id="1" name=""/>
+        <p:cNvGrpSpPr/>
+        <p:nvPr/>
+      </p:nvGrpSpPr>
+      <p:grpSpPr>
+        <a:xfrm>
+          <a:off x="0" y="0"/>
+          <a:ext cx="0" cy="0"/>
+          <a:chOff x="0" y="0"/>
+          <a:chExt cx="0" cy="0"/>
+        </a:xfrm>
+      </p:grpSpPr>
+      <p:sp>
+        <p:nvSpPr>
+          <p:cNvPr id="2" name="Titre 1"/>
+          <p:cNvSpPr>
+            <a:spLocks noGrp="1"/>
+          </p:cNvSpPr>
+          <p:nvPr>
+            <p:ph type="title"/>
+          </p:nvPr>
+        </p:nvSpPr>
+        <p:spPr/>
+        <p:txBody>
+          <a:bodyPr/>
+          <a:lstStyle/>
+          <a:p>
+            <a:r>
+              <a:rPr lang="en-US" dirty="0"/>
+              <a:t>Conception </a:t>
+            </a:r>
+            <a:r>
+              <a:rPr lang="en-US" dirty="0" err="1"/>
+              <a:t>définitive</a:t>
+            </a:r>
+            <a:r>
+              <a:rPr lang="en-US" dirty="0"/>
+              <a:t> </a:t>
+            </a:r>
+            <a:r>
+              <a:rPr lang="en-US" dirty="0" smtClean="0"/>
+              <a:t>(AFE)</a:t>
+            </a:r>
+            <a:endParaRPr lang="fr-CA" dirty="0"/>
+          </a:p>
+        </p:txBody>
+      </p:sp>
+      <p:pic>
+        <p:nvPicPr>
+          <p:cNvPr id="1026" name="Picture 2"/>
+          <p:cNvPicPr>
+            <a:picLocks noChangeAspect="1" noChangeArrowheads="1"/>
+          </p:cNvPicPr>
+          <p:nvPr/>
+        </p:nvPicPr>
+        <p:blipFill>
+          <a:blip r:embed="rId2">
+            <a:extLst>
+              <a:ext uri="{28A0092B-C50C-407E-A947-70E740481C1C}">
+                <a14:useLocalDpi xmlns:a14="http://schemas.microsoft.com/office/drawing/2010/main" val="0"/>
+              </a:ext>
+            </a:extLst>
+          </a:blip>
+          <a:srcRect/>
+          <a:stretch>
+            <a:fillRect/>
+          </a:stretch>
+        </p:blipFill>
+        <p:spPr bwMode="auto">
+          <a:xfrm>
+            <a:off x="279401" y="1796823"/>
+            <a:ext cx="7648575" cy="3613375"/>
+          </a:xfrm>
+          <a:prstGeom prst="rect">
+            <a:avLst/>
+          </a:prstGeom>
+          <a:noFill/>
+          <a:ln>
+            <a:noFill/>
+          </a:ln>
+          <a:extLst>
+            <a:ext uri="{909E8E84-426E-40DD-AFC4-6F175D3DCCD1}">
+              <a14:hiddenFill xmlns:a14="http://schemas.microsoft.com/office/drawing/2010/main">
+                <a:solidFill>
+                  <a:schemeClr val="accent1"/>
+                </a:solidFill>
+              </a14:hiddenFill>
+            </a:ext>
+            <a:ext uri="{91240B29-F687-4F45-9708-019B960494DF}">
+              <a14:hiddenLine xmlns:a14="http://schemas.microsoft.com/office/drawing/2010/main" w="9525">
+                <a:solidFill>
+                  <a:schemeClr val="tx1"/>
+                </a:solidFill>
+                <a:miter lim="800000"/>
+                <a:headEnd/>
+                <a:tailEnd/>
+              </a14:hiddenLine>
+            </a:ext>
+          </a:extLst>
+        </p:spPr>
+      </p:pic>
+    </p:spTree>
+    <p:extLst>
+      <p:ext uri="{BB962C8B-B14F-4D97-AF65-F5344CB8AC3E}">
+        <p14:creationId xmlns:p14="http://schemas.microsoft.com/office/powerpoint/2010/main" val="738876734"/>
+      </p:ext>
+    </p:extLst>
+  </p:cSld>
+  <p:clrMapOvr>
+    <a:masterClrMapping/>
+  </p:clrMapOvr>
+</p:sld>
+</file>
+
+<file path=ppt/slides/slide18.xml><?xml version="1.0" encoding="utf-8"?>
+<p:sld xmlns:a="http://schemas.openxmlformats.org/drawingml/2006/main" xmlns:r="http://schemas.openxmlformats.org/officeDocument/2006/relationships" xmlns:p="http://schemas.openxmlformats.org/presentationml/2006/main">
+  <p:cSld>
+    <p:spTree>
+      <p:nvGrpSpPr>
+        <p:cNvPr id="1" name=""/>
+        <p:cNvGrpSpPr/>
+        <p:nvPr/>
+      </p:nvGrpSpPr>
+      <p:grpSpPr>
+        <a:xfrm>
+          <a:off x="0" y="0"/>
+          <a:ext cx="0" cy="0"/>
+          <a:chOff x="0" y="0"/>
+          <a:chExt cx="0" cy="0"/>
+        </a:xfrm>
+      </p:grpSpPr>
+      <p:sp>
+        <p:nvSpPr>
+          <p:cNvPr id="2" name="Titre 1"/>
+          <p:cNvSpPr>
+            <a:spLocks noGrp="1"/>
+          </p:cNvSpPr>
+          <p:nvPr>
+            <p:ph type="title"/>
+          </p:nvPr>
+        </p:nvSpPr>
+        <p:spPr/>
+        <p:txBody>
+          <a:bodyPr/>
+          <a:lstStyle/>
+          <a:p>
+            <a:r>
+              <a:rPr lang="en-CA" dirty="0" err="1" smtClean="0"/>
+              <a:t>Méthode</a:t>
+            </a:r>
+            <a:r>
+              <a:rPr lang="en-CA" dirty="0" smtClean="0"/>
+              <a:t> de </a:t>
+            </a:r>
+            <a:r>
+              <a:rPr lang="en-CA" dirty="0" err="1" smtClean="0"/>
+              <a:t>commande</a:t>
+            </a:r>
+            <a:r>
+              <a:rPr lang="en-CA" dirty="0" smtClean="0"/>
+              <a:t> de </a:t>
+            </a:r>
+            <a:r>
+              <a:rPr lang="en-CA" dirty="0" err="1" smtClean="0"/>
+              <a:t>l’AFE</a:t>
+            </a:r>
+            <a:endParaRPr lang="fr-CA" dirty="0"/>
+          </a:p>
+        </p:txBody>
+      </p:sp>
+      <p:pic>
+        <p:nvPicPr>
+          <p:cNvPr id="3" name="Picture 2"/>
+          <p:cNvPicPr>
+            <a:picLocks noChangeAspect="1" noChangeArrowheads="1"/>
+          </p:cNvPicPr>
+          <p:nvPr/>
+        </p:nvPicPr>
+        <p:blipFill>
+          <a:blip r:embed="rId2">
+            <a:extLst>
+              <a:ext uri="{28A0092B-C50C-407E-A947-70E740481C1C}">
+                <a14:useLocalDpi xmlns:a14="http://schemas.microsoft.com/office/drawing/2010/main" val="0"/>
+              </a:ext>
+            </a:extLst>
+          </a:blip>
+          <a:srcRect/>
+          <a:stretch>
+            <a:fillRect/>
+          </a:stretch>
+        </p:blipFill>
+        <p:spPr bwMode="auto">
+          <a:xfrm>
+            <a:off x="2072369" y="1408340"/>
+            <a:ext cx="4595132" cy="2959469"/>
+          </a:xfrm>
+          <a:prstGeom prst="rect">
+            <a:avLst/>
+          </a:prstGeom>
+          <a:noFill/>
+          <a:ln>
+            <a:noFill/>
+          </a:ln>
+          <a:extLst>
+            <a:ext uri="{909E8E84-426E-40DD-AFC4-6F175D3DCCD1}">
+              <a14:hiddenFill xmlns:a14="http://schemas.microsoft.com/office/drawing/2010/main">
+                <a:solidFill>
+                  <a:schemeClr val="accent1"/>
+                </a:solidFill>
+              </a14:hiddenFill>
+            </a:ext>
+            <a:ext uri="{91240B29-F687-4F45-9708-019B960494DF}">
+              <a14:hiddenLine xmlns:a14="http://schemas.microsoft.com/office/drawing/2010/main" w="9525">
+                <a:solidFill>
+                  <a:schemeClr val="tx1"/>
+                </a:solidFill>
+                <a:miter lim="800000"/>
+                <a:headEnd/>
+                <a:tailEnd/>
+              </a14:hiddenLine>
+            </a:ext>
+          </a:extLst>
+        </p:spPr>
+      </p:pic>
+      <p:sp>
+        <p:nvSpPr>
+          <p:cNvPr id="4" name="Rectangle 3"/>
+          <p:cNvSpPr/>
+          <p:nvPr/>
+        </p:nvSpPr>
+        <p:spPr>
+          <a:xfrm>
+            <a:off x="673100" y="4395421"/>
+            <a:ext cx="8356600" cy="2308324"/>
+          </a:xfrm>
+          <a:prstGeom prst="rect">
+            <a:avLst/>
+          </a:prstGeom>
+        </p:spPr>
+        <p:txBody>
+          <a:bodyPr wrap="square">
+            <a:spAutoFit/>
+          </a:bodyPr>
+          <a:lstStyle/>
+          <a:p>
+            <a:pPr marL="742950" lvl="1" indent="-285750">
+              <a:buClr>
+                <a:schemeClr val="tx2">
+                  <a:lumMod val="75000"/>
+                  <a:lumOff val="25000"/>
+                </a:schemeClr>
+              </a:buClr>
+              <a:buFont typeface="Arial"/>
+              <a:buChar char="•"/>
+            </a:pPr>
+            <a:r>
+              <a:rPr lang="en-CA" sz="2400" dirty="0" err="1"/>
+              <a:t>Comparaison</a:t>
+            </a:r>
+            <a:r>
+              <a:rPr lang="en-CA" sz="2400" dirty="0"/>
+              <a:t> entre le signal </a:t>
+            </a:r>
+            <a:r>
+              <a:rPr lang="en-CA" sz="2400" dirty="0" err="1"/>
+              <a:t>d’erreur</a:t>
+            </a:r>
+            <a:r>
+              <a:rPr lang="en-CA" sz="2400" dirty="0"/>
+              <a:t> et </a:t>
+            </a:r>
+            <a:r>
+              <a:rPr lang="en-CA" sz="2400" dirty="0" err="1"/>
+              <a:t>trois</a:t>
+            </a:r>
+            <a:r>
+              <a:rPr lang="en-CA" sz="2400" dirty="0"/>
+              <a:t> </a:t>
+            </a:r>
+            <a:r>
+              <a:rPr lang="en-CA" sz="2400" dirty="0" err="1"/>
+              <a:t>signaux</a:t>
+            </a:r>
+            <a:r>
+              <a:rPr lang="en-CA" sz="2400" dirty="0"/>
+              <a:t> en dent de </a:t>
+            </a:r>
+            <a:r>
+              <a:rPr lang="en-CA" sz="2400" dirty="0" err="1"/>
+              <a:t>scie</a:t>
+            </a:r>
+            <a:endParaRPr lang="en-CA" sz="2400" dirty="0"/>
+          </a:p>
+          <a:p>
+            <a:pPr marL="742950" lvl="1" indent="-285750">
+              <a:buClr>
+                <a:schemeClr val="tx2">
+                  <a:lumMod val="75000"/>
+                  <a:lumOff val="25000"/>
+                </a:schemeClr>
+              </a:buClr>
+              <a:buFont typeface="Arial"/>
+              <a:buChar char="•"/>
+            </a:pPr>
+            <a:r>
+              <a:rPr lang="en-CA" sz="2400" dirty="0"/>
+              <a:t>Activation de </a:t>
+            </a:r>
+            <a:r>
+              <a:rPr lang="en-CA" sz="2400" dirty="0" err="1" smtClean="0"/>
+              <a:t>chaque</a:t>
+            </a:r>
+            <a:r>
+              <a:rPr lang="en-CA" sz="2400" dirty="0" smtClean="0"/>
+              <a:t> </a:t>
+            </a:r>
+            <a:r>
+              <a:rPr lang="en-CA" sz="2400" dirty="0" err="1" smtClean="0"/>
+              <a:t>d’IGBT</a:t>
+            </a:r>
+            <a:r>
+              <a:rPr lang="en-CA" sz="2400" dirty="0" smtClean="0"/>
+              <a:t> au bon moment grâce à </a:t>
+            </a:r>
+            <a:r>
+              <a:rPr lang="en-CA" sz="2400" dirty="0" err="1" smtClean="0"/>
+              <a:t>une</a:t>
+            </a:r>
+            <a:r>
+              <a:rPr lang="en-CA" sz="2400" dirty="0" smtClean="0"/>
+              <a:t> </a:t>
+            </a:r>
+            <a:r>
+              <a:rPr lang="en-CA" sz="2400" dirty="0" err="1" smtClean="0"/>
+              <a:t>porteuse</a:t>
+            </a:r>
+            <a:endParaRPr lang="en-CA" sz="2400" dirty="0" smtClean="0"/>
+          </a:p>
+          <a:p>
+            <a:pPr marL="742950" lvl="1" indent="-285750">
+              <a:buClr>
+                <a:schemeClr val="tx2">
+                  <a:lumMod val="75000"/>
+                  <a:lumOff val="25000"/>
+                </a:schemeClr>
+              </a:buClr>
+              <a:buFont typeface="Arial"/>
+              <a:buChar char="•"/>
+            </a:pPr>
+            <a:r>
+              <a:rPr lang="en-CA" sz="2400" dirty="0" err="1" smtClean="0"/>
+              <a:t>Chaque</a:t>
+            </a:r>
+            <a:r>
+              <a:rPr lang="en-CA" sz="2400" dirty="0" smtClean="0"/>
+              <a:t> </a:t>
+            </a:r>
+            <a:r>
+              <a:rPr lang="en-CA" sz="2400" dirty="0" err="1" smtClean="0"/>
+              <a:t>porteuse</a:t>
+            </a:r>
+            <a:r>
+              <a:rPr lang="en-CA" sz="2400" dirty="0" smtClean="0"/>
+              <a:t> des bras </a:t>
+            </a:r>
+            <a:r>
+              <a:rPr lang="en-CA" sz="2400" dirty="0" err="1" smtClean="0"/>
+              <a:t>sont</a:t>
+            </a:r>
+            <a:r>
+              <a:rPr lang="en-CA" sz="2400" dirty="0" smtClean="0"/>
+              <a:t> </a:t>
+            </a:r>
+            <a:r>
+              <a:rPr lang="en-CA" sz="2400" dirty="0" err="1" smtClean="0"/>
+              <a:t>décalées</a:t>
+            </a:r>
+            <a:r>
+              <a:rPr lang="en-CA" sz="2400" dirty="0" smtClean="0"/>
+              <a:t> de </a:t>
+            </a:r>
+            <a:r>
+              <a:rPr lang="en-CA" sz="2400" dirty="0" smtClean="0"/>
+              <a:t>6.67ms entre </a:t>
+            </a:r>
+            <a:r>
+              <a:rPr lang="en-CA" sz="2400" dirty="0" err="1" smtClean="0"/>
+              <a:t>chaque</a:t>
+            </a:r>
+            <a:r>
+              <a:rPr lang="en-CA" sz="2400" dirty="0" smtClean="0"/>
+              <a:t> phase et du maximum de la tension AC.</a:t>
+            </a:r>
+            <a:endParaRPr lang="en-CA" sz="2400" dirty="0" smtClean="0"/>
+          </a:p>
+        </p:txBody>
+      </p:sp>
+    </p:spTree>
+    <p:extLst>
+      <p:ext uri="{BB962C8B-B14F-4D97-AF65-F5344CB8AC3E}">
+        <p14:creationId xmlns:p14="http://schemas.microsoft.com/office/powerpoint/2010/main" val="1024076200"/>
+      </p:ext>
+    </p:extLst>
+  </p:cSld>
+  <p:clrMapOvr>
+    <a:masterClrMapping/>
+  </p:clrMapOvr>
+</p:sld>
+</file>
+
+<file path=ppt/slides/slide19.xml><?xml version="1.0" encoding="utf-8"?>
+<p:sld xmlns:a="http://schemas.openxmlformats.org/drawingml/2006/main" xmlns:r="http://schemas.openxmlformats.org/officeDocument/2006/relationships" xmlns:p="http://schemas.openxmlformats.org/presentationml/2006/main">
+  <p:cSld>
+    <p:spTree>
+      <p:nvGrpSpPr>
+        <p:cNvPr id="1" name=""/>
+        <p:cNvGrpSpPr/>
+        <p:nvPr/>
+      </p:nvGrpSpPr>
+      <p:grpSpPr>
+        <a:xfrm>
+          <a:off x="0" y="0"/>
+          <a:ext cx="0" cy="0"/>
+          <a:chOff x="0" y="0"/>
+          <a:chExt cx="0" cy="0"/>
+        </a:xfrm>
+      </p:grpSpPr>
+      <p:sp>
+        <p:nvSpPr>
+          <p:cNvPr id="2" name="Titre 1"/>
+          <p:cNvSpPr>
+            <a:spLocks noGrp="1"/>
+          </p:cNvSpPr>
+          <p:nvPr>
+            <p:ph type="title"/>
+          </p:nvPr>
+        </p:nvSpPr>
+        <p:spPr/>
+        <p:txBody>
+          <a:bodyPr/>
+          <a:lstStyle/>
+          <a:p>
+            <a:r>
+              <a:rPr lang="en-CA" dirty="0" smtClean="0"/>
+              <a:t>Implantation SPS</a:t>
+            </a:r>
+            <a:endParaRPr lang="fr-CA" dirty="0"/>
+          </a:p>
+        </p:txBody>
+      </p:sp>
+      <p:pic>
+        <p:nvPicPr>
+          <p:cNvPr id="3" name="Picture 2"/>
+          <p:cNvPicPr>
+            <a:picLocks noChangeAspect="1" noChangeArrowheads="1"/>
+          </p:cNvPicPr>
+          <p:nvPr/>
+        </p:nvPicPr>
+        <p:blipFill>
+          <a:blip r:embed="rId2">
+            <a:extLst>
+              <a:ext uri="{28A0092B-C50C-407E-A947-70E740481C1C}">
+                <a14:useLocalDpi xmlns:a14="http://schemas.microsoft.com/office/drawing/2010/main" val="0"/>
+              </a:ext>
+            </a:extLst>
+          </a:blip>
+          <a:srcRect/>
+          <a:stretch>
+            <a:fillRect/>
+          </a:stretch>
+        </p:blipFill>
+        <p:spPr bwMode="auto">
+          <a:xfrm>
+            <a:off x="1122362" y="1451802"/>
+            <a:ext cx="6288088" cy="4644708"/>
+          </a:xfrm>
+          <a:prstGeom prst="rect">
+            <a:avLst/>
+          </a:prstGeom>
+          <a:noFill/>
+          <a:ln>
+            <a:noFill/>
+          </a:ln>
+          <a:extLst>
+            <a:ext uri="{909E8E84-426E-40DD-AFC4-6F175D3DCCD1}">
+              <a14:hiddenFill xmlns:a14="http://schemas.microsoft.com/office/drawing/2010/main">
+                <a:solidFill>
+                  <a:schemeClr val="accent1"/>
+                </a:solidFill>
+              </a14:hiddenFill>
+            </a:ext>
+            <a:ext uri="{91240B29-F687-4F45-9708-019B960494DF}">
+              <a14:hiddenLine xmlns:a14="http://schemas.microsoft.com/office/drawing/2010/main" w="9525">
+                <a:solidFill>
+                  <a:schemeClr val="tx1"/>
+                </a:solidFill>
+                <a:miter lim="800000"/>
+                <a:headEnd/>
+                <a:tailEnd/>
+              </a14:hiddenLine>
+            </a:ext>
+          </a:extLst>
+        </p:spPr>
+      </p:pic>
+    </p:spTree>
+    <p:extLst>
+      <p:ext uri="{BB962C8B-B14F-4D97-AF65-F5344CB8AC3E}">
+        <p14:creationId xmlns:p14="http://schemas.microsoft.com/office/powerpoint/2010/main" val="1782616819"/>
       </p:ext>
     </p:extLst>
   </p:cSld>
@@ -8729,14 +9246,14 @@
             <a:noFill/>
           </a:ln>
           <a:extLst>
-            <a:ext uri="{909E8E84-426E-40dd-AFC4-6F175D3DCCD1}">
+            <a:ext uri="{909E8E84-426E-40DD-AFC4-6F175D3DCCD1}">
               <a14:hiddenFill xmlns:a14="http://schemas.microsoft.com/office/drawing/2010/main">
                 <a:solidFill>
                   <a:srgbClr val="FFFFFF"/>
                 </a:solidFill>
               </a14:hiddenFill>
             </a:ext>
-            <a:ext uri="{91240B29-F687-4f45-9708-019B960494DF}">
+            <a:ext uri="{91240B29-F687-4F45-9708-019B960494DF}">
               <a14:hiddenLine xmlns:a14="http://schemas.microsoft.com/office/drawing/2010/main" w="9525">
                 <a:solidFill>
                   <a:srgbClr val="000000"/>
@@ -8816,7 +9333,7 @@
   <p:timing>
     <p:tnLst>
       <p:par>
-        <p:cTn xmlns:p14="http://schemas.microsoft.com/office/powerpoint/2010/main" id="1" dur="indefinite" restart="never" nodeType="tmRoot"/>
+        <p:cTn id="1" dur="indefinite" restart="never" nodeType="tmRoot"/>
       </p:par>
     </p:tnLst>
   </p:timing>
@@ -10752,14 +11269,14 @@
             <a:noFill/>
           </a:ln>
           <a:extLst>
-            <a:ext uri="{909E8E84-426E-40dd-AFC4-6F175D3DCCD1}">
+            <a:ext uri="{909E8E84-426E-40DD-AFC4-6F175D3DCCD1}">
               <a14:hiddenFill xmlns:a14="http://schemas.microsoft.com/office/drawing/2010/main">
                 <a:solidFill>
                   <a:schemeClr val="accent1"/>
                 </a:solidFill>
               </a14:hiddenFill>
             </a:ext>
-            <a:ext uri="{91240B29-F687-4f45-9708-019B960494DF}">
+            <a:ext uri="{91240B29-F687-4F45-9708-019B960494DF}">
               <a14:hiddenLine xmlns:a14="http://schemas.microsoft.com/office/drawing/2010/main" w="9525">
                 <a:solidFill>
                   <a:schemeClr val="tx1"/>
@@ -11078,7 +11595,7 @@
   <a:extraClrSchemeLst/>
   <a:extLst>
     <a:ext uri="{05A4C25C-085E-4340-85A3-A5531E510DB2}">
-      <thm15:themeFamily xmlns:thm15="http://schemas.microsoft.com/office/thememl/2012/main" xmlns="" name="Facet" id="{C0C680CD-088A-49FC-A102-D699147F32B2}" vid="{CFBC31BA-B70F-4F30-BCAA-4F3011E16C4D}"/>
+      <thm15:themeFamily xmlns="" xmlns:thm15="http://schemas.microsoft.com/office/thememl/2012/main" name="Facet" id="{C0C680CD-088A-49FC-A102-D699147F32B2}" vid="{CFBC31BA-B70F-4F30-BCAA-4F3011E16C4D}"/>
     </a:ext>
   </a:extLst>
 </a:theme>

</xml_diff>

<commit_message>
Registre de risque, plan de test, gantt et WBS intégré dans le PPT
</commit_message>
<xml_diff>
--- a/Remise/Remise 2/Presentation1_corrigee_DT.pptx
+++ b/Remise/Remise 2/Presentation1_corrigee_DT.pptx
@@ -24,6 +24,16 @@
     <p:sldId id="274" r:id="rId18"/>
     <p:sldId id="275" r:id="rId19"/>
     <p:sldId id="276" r:id="rId20"/>
+    <p:sldId id="277" r:id="rId21"/>
+    <p:sldId id="278" r:id="rId22"/>
+    <p:sldId id="279" r:id="rId23"/>
+    <p:sldId id="280" r:id="rId24"/>
+    <p:sldId id="281" r:id="rId25"/>
+    <p:sldId id="282" r:id="rId26"/>
+    <p:sldId id="283" r:id="rId27"/>
+    <p:sldId id="284" r:id="rId28"/>
+    <p:sldId id="285" r:id="rId29"/>
+    <p:sldId id="286" r:id="rId30"/>
   </p:sldIdLst>
   <p:sldSz cx="9144000" cy="6858000" type="screen4x3"/>
   <p:notesSz cx="6858000" cy="9144000"/>
@@ -122,6 +132,22 @@
       </a:defRPr>
     </a:lvl9pPr>
   </p:defaultTextStyle>
+  <p:extLst>
+    <p:ext uri="{EFAFB233-063F-42B5-8137-9DF3F51BA10A}">
+      <p15:sldGuideLst xmlns:p15="http://schemas.microsoft.com/office/powerpoint/2012/main">
+        <p15:guide id="1" orient="horz" pos="2160">
+          <p15:clr>
+            <a:srgbClr val="A4A3A4"/>
+          </p15:clr>
+        </p15:guide>
+        <p15:guide id="2" pos="2880">
+          <p15:clr>
+            <a:srgbClr val="A4A3A4"/>
+          </p15:clr>
+        </p15:guide>
+      </p15:sldGuideLst>
+    </p:ext>
+  </p:extLst>
 </p:presentation>
 </file>
 
@@ -917,7 +943,7 @@
                 <a:latin typeface="Trebuchet MS"/>
               </a:rPr>
               <a:pPr/>
-              <a:t>‹N°›</a:t>
+              <a:t>‹#›</a:t>
             </a:fld>
             <a:endParaRPr lang="en-US">
               <a:solidFill>
@@ -1213,7 +1239,7 @@
                 <a:latin typeface="Trebuchet MS"/>
               </a:rPr>
               <a:pPr/>
-              <a:t>‹N°›</a:t>
+              <a:t>‹#›</a:t>
             </a:fld>
             <a:endParaRPr lang="en-US">
               <a:solidFill>
@@ -1497,7 +1523,7 @@
                 <a:latin typeface="Trebuchet MS"/>
               </a:rPr>
               <a:pPr/>
-              <a:t>‹N°›</a:t>
+              <a:t>‹#›</a:t>
             </a:fld>
             <a:endParaRPr lang="en-US">
               <a:solidFill>
@@ -1844,7 +1870,7 @@
                 <a:latin typeface="Trebuchet MS"/>
               </a:rPr>
               <a:pPr/>
-              <a:t>‹N°›</a:t>
+              <a:t>‹#›</a:t>
             </a:fld>
             <a:endParaRPr lang="en-US">
               <a:solidFill>
@@ -2217,7 +2243,7 @@
                 <a:latin typeface="Trebuchet MS"/>
               </a:rPr>
               <a:pPr/>
-              <a:t>‹N°›</a:t>
+              <a:t>‹#›</a:t>
             </a:fld>
             <a:endParaRPr lang="en-US">
               <a:solidFill>
@@ -2564,7 +2590,7 @@
                 <a:latin typeface="Trebuchet MS"/>
               </a:rPr>
               <a:pPr/>
-              <a:t>‹N°›</a:t>
+              <a:t>‹#›</a:t>
             </a:fld>
             <a:endParaRPr lang="en-US">
               <a:solidFill>
@@ -2988,7 +3014,7 @@
                 <a:latin typeface="Trebuchet MS"/>
               </a:rPr>
               <a:pPr/>
-              <a:t>‹N°›</a:t>
+              <a:t>‹#›</a:t>
             </a:fld>
             <a:endParaRPr lang="en-US">
               <a:solidFill>
@@ -3191,7 +3217,7 @@
                 <a:latin typeface="Trebuchet MS"/>
               </a:rPr>
               <a:pPr/>
-              <a:t>‹N°›</a:t>
+              <a:t>‹#›</a:t>
             </a:fld>
             <a:endParaRPr lang="en-US">
               <a:solidFill>
@@ -3404,7 +3430,7 @@
                 <a:latin typeface="Trebuchet MS"/>
               </a:rPr>
               <a:pPr/>
-              <a:t>‹N°›</a:t>
+              <a:t>‹#›</a:t>
             </a:fld>
             <a:endParaRPr lang="en-US">
               <a:solidFill>
@@ -3694,7 +3720,7 @@
                 <a:latin typeface="Trebuchet MS"/>
               </a:rPr>
               <a:pPr/>
-              <a:t>‹N°›</a:t>
+              <a:t>‹#›</a:t>
             </a:fld>
             <a:endParaRPr lang="en-US" dirty="0">
               <a:solidFill>
@@ -3903,7 +3929,7 @@
                 <a:latin typeface="Trebuchet MS"/>
               </a:rPr>
               <a:pPr/>
-              <a:t>‹N°›</a:t>
+              <a:t>‹#›</a:t>
             </a:fld>
             <a:endParaRPr lang="en-US">
               <a:solidFill>
@@ -4183,7 +4209,7 @@
                 <a:latin typeface="Trebuchet MS"/>
               </a:rPr>
               <a:pPr/>
-              <a:t>‹N°›</a:t>
+              <a:t>‹#›</a:t>
             </a:fld>
             <a:endParaRPr lang="en-US">
               <a:solidFill>
@@ -4448,7 +4474,7 @@
                 <a:latin typeface="Trebuchet MS"/>
               </a:rPr>
               <a:pPr/>
-              <a:t>‹N°›</a:t>
+              <a:t>‹#›</a:t>
             </a:fld>
             <a:endParaRPr lang="en-US">
               <a:solidFill>
@@ -4855,7 +4881,7 @@
                 <a:latin typeface="Trebuchet MS"/>
               </a:rPr>
               <a:pPr/>
-              <a:t>‹N°›</a:t>
+              <a:t>‹#›</a:t>
             </a:fld>
             <a:endParaRPr lang="en-US">
               <a:solidFill>
@@ -5011,7 +5037,7 @@
                 <a:latin typeface="Trebuchet MS"/>
               </a:rPr>
               <a:pPr/>
-              <a:t>‹N°›</a:t>
+              <a:t>‹#›</a:t>
             </a:fld>
             <a:endParaRPr lang="en-US">
               <a:solidFill>
@@ -5139,7 +5165,7 @@
                 <a:latin typeface="Trebuchet MS"/>
               </a:rPr>
               <a:pPr/>
-              <a:t>‹N°›</a:t>
+              <a:t>‹#›</a:t>
             </a:fld>
             <a:endParaRPr lang="en-US">
               <a:solidFill>
@@ -5282,7 +5308,7 @@
                 <a:latin typeface="Trebuchet MS"/>
               </a:rPr>
               <a:pPr/>
-              <a:t>‹N°›</a:t>
+              <a:t>‹#›</a:t>
             </a:fld>
             <a:endParaRPr lang="en-US">
               <a:solidFill>
@@ -6100,7 +6126,7 @@
                 <a:latin typeface="Trebuchet MS"/>
               </a:rPr>
               <a:pPr/>
-              <a:t>‹N°›</a:t>
+              <a:t>‹#›</a:t>
             </a:fld>
             <a:endParaRPr lang="en-US">
               <a:solidFill>
@@ -6932,7 +6958,7 @@
                 <a:latin typeface="Trebuchet MS"/>
               </a:rPr>
               <a:pPr defTabSz="914400"/>
-              <a:t>‹N°›</a:t>
+              <a:t>‹#›</a:t>
             </a:fld>
             <a:endParaRPr lang="en-US">
               <a:solidFill>
@@ -8915,11 +8941,7 @@
             </a:r>
             <a:r>
               <a:rPr lang="en-CA" sz="2400" dirty="0" smtClean="0"/>
-              <a:t> de </a:t>
-            </a:r>
-            <a:r>
-              <a:rPr lang="en-CA" sz="2400" dirty="0" smtClean="0"/>
-              <a:t>6.67ms entre </a:t>
+              <a:t> de 6.67ms entre </a:t>
             </a:r>
             <a:r>
               <a:rPr lang="en-CA" sz="2400" dirty="0" err="1" smtClean="0"/>
@@ -8929,7 +8951,6 @@
               <a:rPr lang="en-CA" sz="2400" dirty="0" smtClean="0"/>
               <a:t> phase et du maximum de la tension AC.</a:t>
             </a:r>
-            <a:endParaRPr lang="en-CA" sz="2400" dirty="0" smtClean="0"/>
           </a:p>
         </p:txBody>
       </p:sp>
@@ -9324,6 +9345,4626 @@
     <p:extLst>
       <p:ext uri="{BB962C8B-B14F-4D97-AF65-F5344CB8AC3E}">
         <p14:creationId xmlns:p14="http://schemas.microsoft.com/office/powerpoint/2010/main" val="3311981088"/>
+      </p:ext>
+    </p:extLst>
+  </p:cSld>
+  <p:clrMapOvr>
+    <a:masterClrMapping/>
+  </p:clrMapOvr>
+  <p:timing>
+    <p:tnLst>
+      <p:par>
+        <p:cTn id="1" dur="indefinite" restart="never" nodeType="tmRoot"/>
+      </p:par>
+    </p:tnLst>
+  </p:timing>
+</p:sld>
+</file>
+
+<file path=ppt/slides/slide20.xml><?xml version="1.0" encoding="utf-8"?>
+<p:sld xmlns:a="http://schemas.openxmlformats.org/drawingml/2006/main" xmlns:r="http://schemas.openxmlformats.org/officeDocument/2006/relationships" xmlns:p="http://schemas.openxmlformats.org/presentationml/2006/main">
+  <p:cSld>
+    <p:spTree>
+      <p:nvGrpSpPr>
+        <p:cNvPr id="1" name=""/>
+        <p:cNvGrpSpPr/>
+        <p:nvPr/>
+      </p:nvGrpSpPr>
+      <p:grpSpPr>
+        <a:xfrm>
+          <a:off x="0" y="0"/>
+          <a:ext cx="0" cy="0"/>
+          <a:chOff x="0" y="0"/>
+          <a:chExt cx="0" cy="0"/>
+        </a:xfrm>
+      </p:grpSpPr>
+      <p:sp>
+        <p:nvSpPr>
+          <p:cNvPr id="2" name="Title 1"/>
+          <p:cNvSpPr>
+            <a:spLocks noGrp="1"/>
+          </p:cNvSpPr>
+          <p:nvPr>
+            <p:ph type="title"/>
+          </p:nvPr>
+        </p:nvSpPr>
+        <p:spPr/>
+        <p:txBody>
+          <a:bodyPr/>
+          <a:lstStyle/>
+          <a:p>
+            <a:r>
+              <a:rPr lang="en-US" dirty="0" smtClean="0"/>
+              <a:t>Plan de test</a:t>
+            </a:r>
+            <a:endParaRPr lang="en-US" dirty="0"/>
+          </a:p>
+        </p:txBody>
+      </p:sp>
+      <p:graphicFrame>
+        <p:nvGraphicFramePr>
+          <p:cNvPr id="3" name="Table 2"/>
+          <p:cNvGraphicFramePr>
+            <a:graphicFrameLocks noGrp="1"/>
+          </p:cNvGraphicFramePr>
+          <p:nvPr>
+            <p:extLst/>
+          </p:nvPr>
+        </p:nvGraphicFramePr>
+        <p:xfrm>
+          <a:off x="377817" y="1269939"/>
+          <a:ext cx="8516801" cy="5300857"/>
+        </p:xfrm>
+        <a:graphic>
+          <a:graphicData uri="http://schemas.openxmlformats.org/drawingml/2006/table">
+            <a:tbl>
+              <a:tblPr firstRow="1" firstCol="1" bandRow="1">
+                <a:tableStyleId>{5C22544A-7EE6-4342-B048-85BDC9FD1C3A}</a:tableStyleId>
+              </a:tblPr>
+              <a:tblGrid>
+                <a:gridCol w="1608827"/>
+                <a:gridCol w="1636836"/>
+                <a:gridCol w="1188675"/>
+                <a:gridCol w="1393499"/>
+                <a:gridCol w="2688964"/>
+              </a:tblGrid>
+              <a:tr h="480425">
+                <a:tc>
+                  <a:txBody>
+                    <a:bodyPr/>
+                    <a:lstStyle/>
+                    <a:p>
+                      <a:pPr algn="ctr">
+                        <a:lnSpc>
+                          <a:spcPct val="107000"/>
+                        </a:lnSpc>
+                        <a:spcAft>
+                          <a:spcPts val="0"/>
+                        </a:spcAft>
+                      </a:pPr>
+                      <a:r>
+                        <a:rPr lang="fr-CA" sz="1000" dirty="0">
+                          <a:effectLst/>
+                        </a:rPr>
+                        <a:t>Fonctionnalité</a:t>
+                      </a:r>
+                      <a:endParaRPr lang="fr-CA" sz="1000" dirty="0">
+                        <a:effectLst/>
+                        <a:latin typeface="Calibri" panose="020F0502020204030204" pitchFamily="34" charset="0"/>
+                        <a:ea typeface="Calibri" panose="020F0502020204030204" pitchFamily="34" charset="0"/>
+                        <a:cs typeface="Times New Roman" panose="02020603050405020304" pitchFamily="18" charset="0"/>
+                      </a:endParaRPr>
+                    </a:p>
+                  </a:txBody>
+                  <a:tcPr marL="38048" marR="38048" marT="0" marB="0" anchor="ctr"/>
+                </a:tc>
+                <a:tc>
+                  <a:txBody>
+                    <a:bodyPr/>
+                    <a:lstStyle/>
+                    <a:p>
+                      <a:pPr algn="ctr">
+                        <a:lnSpc>
+                          <a:spcPct val="107000"/>
+                        </a:lnSpc>
+                        <a:spcAft>
+                          <a:spcPts val="0"/>
+                        </a:spcAft>
+                      </a:pPr>
+                      <a:r>
+                        <a:rPr lang="fr-CA" sz="1000">
+                          <a:effectLst/>
+                        </a:rPr>
+                        <a:t>Exigence</a:t>
+                      </a:r>
+                      <a:endParaRPr lang="fr-CA" sz="1000">
+                        <a:effectLst/>
+                        <a:latin typeface="Calibri" panose="020F0502020204030204" pitchFamily="34" charset="0"/>
+                        <a:ea typeface="Calibri" panose="020F0502020204030204" pitchFamily="34" charset="0"/>
+                        <a:cs typeface="Times New Roman" panose="02020603050405020304" pitchFamily="18" charset="0"/>
+                      </a:endParaRPr>
+                    </a:p>
+                  </a:txBody>
+                  <a:tcPr marL="38048" marR="38048" marT="0" marB="0" anchor="ctr"/>
+                </a:tc>
+                <a:tc>
+                  <a:txBody>
+                    <a:bodyPr/>
+                    <a:lstStyle/>
+                    <a:p>
+                      <a:pPr algn="ctr">
+                        <a:lnSpc>
+                          <a:spcPct val="107000"/>
+                        </a:lnSpc>
+                        <a:spcAft>
+                          <a:spcPts val="0"/>
+                        </a:spcAft>
+                      </a:pPr>
+                      <a:r>
+                        <a:rPr lang="fr-CA" sz="1000">
+                          <a:effectLst/>
+                        </a:rPr>
+                        <a:t>Méthode de vérification</a:t>
+                      </a:r>
+                      <a:endParaRPr lang="fr-CA" sz="1000">
+                        <a:effectLst/>
+                        <a:latin typeface="Calibri" panose="020F0502020204030204" pitchFamily="34" charset="0"/>
+                        <a:ea typeface="Calibri" panose="020F0502020204030204" pitchFamily="34" charset="0"/>
+                        <a:cs typeface="Times New Roman" panose="02020603050405020304" pitchFamily="18" charset="0"/>
+                      </a:endParaRPr>
+                    </a:p>
+                  </a:txBody>
+                  <a:tcPr marL="38048" marR="38048" marT="0" marB="0" anchor="ctr"/>
+                </a:tc>
+                <a:tc>
+                  <a:txBody>
+                    <a:bodyPr/>
+                    <a:lstStyle/>
+                    <a:p>
+                      <a:pPr algn="ctr">
+                        <a:lnSpc>
+                          <a:spcPct val="107000"/>
+                        </a:lnSpc>
+                        <a:spcAft>
+                          <a:spcPts val="0"/>
+                        </a:spcAft>
+                      </a:pPr>
+                      <a:r>
+                        <a:rPr lang="fr-CA" sz="1000">
+                          <a:effectLst/>
+                        </a:rPr>
+                        <a:t>Équipement requis</a:t>
+                      </a:r>
+                      <a:endParaRPr lang="fr-CA" sz="1000">
+                        <a:effectLst/>
+                        <a:latin typeface="Calibri" panose="020F0502020204030204" pitchFamily="34" charset="0"/>
+                        <a:ea typeface="Calibri" panose="020F0502020204030204" pitchFamily="34" charset="0"/>
+                        <a:cs typeface="Times New Roman" panose="02020603050405020304" pitchFamily="18" charset="0"/>
+                      </a:endParaRPr>
+                    </a:p>
+                  </a:txBody>
+                  <a:tcPr marL="38048" marR="38048" marT="0" marB="0" anchor="ctr"/>
+                </a:tc>
+                <a:tc>
+                  <a:txBody>
+                    <a:bodyPr/>
+                    <a:lstStyle/>
+                    <a:p>
+                      <a:pPr algn="ctr">
+                        <a:lnSpc>
+                          <a:spcPct val="107000"/>
+                        </a:lnSpc>
+                        <a:spcAft>
+                          <a:spcPts val="0"/>
+                        </a:spcAft>
+                      </a:pPr>
+                      <a:r>
+                        <a:rPr lang="fr-CA" sz="1000">
+                          <a:effectLst/>
+                        </a:rPr>
+                        <a:t>Méthode d’analyse</a:t>
+                      </a:r>
+                      <a:endParaRPr lang="fr-CA" sz="1000">
+                        <a:effectLst/>
+                        <a:latin typeface="Calibri" panose="020F0502020204030204" pitchFamily="34" charset="0"/>
+                        <a:ea typeface="Calibri" panose="020F0502020204030204" pitchFamily="34" charset="0"/>
+                        <a:cs typeface="Times New Roman" panose="02020603050405020304" pitchFamily="18" charset="0"/>
+                      </a:endParaRPr>
+                    </a:p>
+                  </a:txBody>
+                  <a:tcPr marL="38048" marR="38048" marT="0" marB="0" anchor="ctr"/>
+                </a:tc>
+              </a:tr>
+              <a:tr h="371105">
+                <a:tc rowSpan="2">
+                  <a:txBody>
+                    <a:bodyPr/>
+                    <a:lstStyle/>
+                    <a:p>
+                      <a:pPr>
+                        <a:lnSpc>
+                          <a:spcPct val="107000"/>
+                        </a:lnSpc>
+                        <a:spcAft>
+                          <a:spcPts val="0"/>
+                        </a:spcAft>
+                      </a:pPr>
+                      <a:r>
+                        <a:rPr lang="fr-CA" sz="1000" dirty="0">
+                          <a:effectLst/>
+                        </a:rPr>
+                        <a:t>Accepter des paramètres de modélisation</a:t>
+                      </a:r>
+                      <a:endParaRPr lang="fr-CA" sz="1000" dirty="0">
+                        <a:effectLst/>
+                        <a:latin typeface="Calibri" panose="020F0502020204030204" pitchFamily="34" charset="0"/>
+                        <a:ea typeface="Calibri" panose="020F0502020204030204" pitchFamily="34" charset="0"/>
+                        <a:cs typeface="Times New Roman" panose="02020603050405020304" pitchFamily="18" charset="0"/>
+                      </a:endParaRPr>
+                    </a:p>
+                  </a:txBody>
+                  <a:tcPr marL="38048" marR="38048" marT="0" marB="0" anchor="ctr"/>
+                </a:tc>
+                <a:tc rowSpan="2">
+                  <a:txBody>
+                    <a:bodyPr/>
+                    <a:lstStyle/>
+                    <a:p>
+                      <a:pPr algn="ctr">
+                        <a:lnSpc>
+                          <a:spcPct val="107000"/>
+                        </a:lnSpc>
+                        <a:spcAft>
+                          <a:spcPts val="0"/>
+                        </a:spcAft>
+                      </a:pPr>
+                      <a:r>
+                        <a:rPr lang="fr-CA" sz="1000" dirty="0">
+                          <a:effectLst/>
+                        </a:rPr>
+                        <a:t>Être capable de paramétrer au minimum 80% des blocs</a:t>
+                      </a:r>
+                      <a:endParaRPr lang="fr-CA" sz="1000" dirty="0">
+                        <a:effectLst/>
+                        <a:latin typeface="Calibri" panose="020F0502020204030204" pitchFamily="34" charset="0"/>
+                        <a:ea typeface="Calibri" panose="020F0502020204030204" pitchFamily="34" charset="0"/>
+                        <a:cs typeface="Times New Roman" panose="02020603050405020304" pitchFamily="18" charset="0"/>
+                      </a:endParaRPr>
+                    </a:p>
+                  </a:txBody>
+                  <a:tcPr marL="38048" marR="38048" marT="0" marB="0" anchor="ctr"/>
+                </a:tc>
+                <a:tc rowSpan="2">
+                  <a:txBody>
+                    <a:bodyPr/>
+                    <a:lstStyle/>
+                    <a:p>
+                      <a:pPr algn="ctr">
+                        <a:lnSpc>
+                          <a:spcPct val="107000"/>
+                        </a:lnSpc>
+                        <a:spcAft>
+                          <a:spcPts val="0"/>
+                        </a:spcAft>
+                      </a:pPr>
+                      <a:r>
+                        <a:rPr lang="fr-CA" sz="1000">
+                          <a:effectLst/>
+                        </a:rPr>
+                        <a:t>Comparaison des paramètres</a:t>
+                      </a:r>
+                      <a:endParaRPr lang="fr-CA" sz="1000">
+                        <a:effectLst/>
+                        <a:latin typeface="Calibri" panose="020F0502020204030204" pitchFamily="34" charset="0"/>
+                        <a:ea typeface="Calibri" panose="020F0502020204030204" pitchFamily="34" charset="0"/>
+                        <a:cs typeface="Times New Roman" panose="02020603050405020304" pitchFamily="18" charset="0"/>
+                      </a:endParaRPr>
+                    </a:p>
+                  </a:txBody>
+                  <a:tcPr marL="38048" marR="38048" marT="0" marB="0" anchor="ctr"/>
+                </a:tc>
+                <a:tc>
+                  <a:txBody>
+                    <a:bodyPr/>
+                    <a:lstStyle/>
+                    <a:p>
+                      <a:pPr algn="ctr">
+                        <a:lnSpc>
+                          <a:spcPct val="107000"/>
+                        </a:lnSpc>
+                        <a:spcAft>
+                          <a:spcPts val="0"/>
+                        </a:spcAft>
+                      </a:pPr>
+                      <a:r>
+                        <a:rPr lang="fr-CA" sz="1000">
+                          <a:effectLst/>
+                        </a:rPr>
+                        <a:t>Interface de contrôle de simulation</a:t>
+                      </a:r>
+                      <a:endParaRPr lang="fr-CA" sz="1000">
+                        <a:effectLst/>
+                        <a:latin typeface="Calibri" panose="020F0502020204030204" pitchFamily="34" charset="0"/>
+                        <a:ea typeface="Calibri" panose="020F0502020204030204" pitchFamily="34" charset="0"/>
+                        <a:cs typeface="Times New Roman" panose="02020603050405020304" pitchFamily="18" charset="0"/>
+                      </a:endParaRPr>
+                    </a:p>
+                  </a:txBody>
+                  <a:tcPr marL="38048" marR="38048" marT="0" marB="0" anchor="ctr"/>
+                </a:tc>
+                <a:tc rowSpan="2">
+                  <a:txBody>
+                    <a:bodyPr/>
+                    <a:lstStyle/>
+                    <a:p>
+                      <a:pPr algn="ctr">
+                        <a:lnSpc>
+                          <a:spcPct val="107000"/>
+                        </a:lnSpc>
+                        <a:spcAft>
+                          <a:spcPts val="0"/>
+                        </a:spcAft>
+                      </a:pPr>
+                      <a:r>
+                        <a:rPr lang="fr-CA" sz="1000">
+                          <a:effectLst/>
+                        </a:rPr>
+                        <a:t>Calculer le nombre total de paramètres disponibles ainsi que ceux paramétrables dans l’interface de contrôle.</a:t>
+                      </a:r>
+                      <a:endParaRPr lang="fr-CA" sz="1000">
+                        <a:effectLst/>
+                        <a:latin typeface="Calibri" panose="020F0502020204030204" pitchFamily="34" charset="0"/>
+                        <a:ea typeface="Calibri" panose="020F0502020204030204" pitchFamily="34" charset="0"/>
+                        <a:cs typeface="Times New Roman" panose="02020603050405020304" pitchFamily="18" charset="0"/>
+                      </a:endParaRPr>
+                    </a:p>
+                  </a:txBody>
+                  <a:tcPr marL="38048" marR="38048" marT="0" marB="0" anchor="ctr"/>
+                </a:tc>
+              </a:tr>
+              <a:tr h="123702">
+                <a:tc vMerge="1">
+                  <a:txBody>
+                    <a:bodyPr/>
+                    <a:lstStyle/>
+                    <a:p>
+                      <a:endParaRPr lang="fr-CA"/>
+                    </a:p>
+                  </a:txBody>
+                  <a:tcPr/>
+                </a:tc>
+                <a:tc vMerge="1">
+                  <a:txBody>
+                    <a:bodyPr/>
+                    <a:lstStyle/>
+                    <a:p>
+                      <a:endParaRPr lang="fr-CA"/>
+                    </a:p>
+                  </a:txBody>
+                  <a:tcPr/>
+                </a:tc>
+                <a:tc vMerge="1">
+                  <a:txBody>
+                    <a:bodyPr/>
+                    <a:lstStyle/>
+                    <a:p>
+                      <a:endParaRPr lang="fr-CA"/>
+                    </a:p>
+                  </a:txBody>
+                  <a:tcPr/>
+                </a:tc>
+                <a:tc>
+                  <a:txBody>
+                    <a:bodyPr/>
+                    <a:lstStyle/>
+                    <a:p>
+                      <a:pPr algn="ctr">
+                        <a:lnSpc>
+                          <a:spcPct val="107000"/>
+                        </a:lnSpc>
+                        <a:spcAft>
+                          <a:spcPts val="0"/>
+                        </a:spcAft>
+                      </a:pPr>
+                      <a:r>
+                        <a:rPr lang="fr-CA" sz="1000">
+                          <a:effectLst/>
+                        </a:rPr>
+                        <a:t>Simulateur</a:t>
+                      </a:r>
+                      <a:endParaRPr lang="fr-CA" sz="1000">
+                        <a:effectLst/>
+                        <a:latin typeface="Calibri" panose="020F0502020204030204" pitchFamily="34" charset="0"/>
+                        <a:ea typeface="Calibri" panose="020F0502020204030204" pitchFamily="34" charset="0"/>
+                        <a:cs typeface="Times New Roman" panose="02020603050405020304" pitchFamily="18" charset="0"/>
+                      </a:endParaRPr>
+                    </a:p>
+                  </a:txBody>
+                  <a:tcPr marL="38048" marR="38048" marT="0" marB="0" anchor="ctr"/>
+                </a:tc>
+                <a:tc vMerge="1">
+                  <a:txBody>
+                    <a:bodyPr/>
+                    <a:lstStyle/>
+                    <a:p>
+                      <a:endParaRPr lang="fr-CA"/>
+                    </a:p>
+                  </a:txBody>
+                  <a:tcPr/>
+                </a:tc>
+              </a:tr>
+              <a:tr h="1088551">
+                <a:tc>
+                  <a:txBody>
+                    <a:bodyPr/>
+                    <a:lstStyle/>
+                    <a:p>
+                      <a:pPr>
+                        <a:lnSpc>
+                          <a:spcPct val="107000"/>
+                        </a:lnSpc>
+                        <a:spcAft>
+                          <a:spcPts val="0"/>
+                        </a:spcAft>
+                      </a:pPr>
+                      <a:r>
+                        <a:rPr lang="fr-CA" sz="1000" dirty="0">
+                          <a:effectLst/>
+                        </a:rPr>
+                        <a:t>Redresser le signal d’entrée à la sortie du transformateur</a:t>
+                      </a:r>
+                      <a:endParaRPr lang="fr-CA" sz="1000" dirty="0">
+                        <a:effectLst/>
+                        <a:latin typeface="Calibri" panose="020F0502020204030204" pitchFamily="34" charset="0"/>
+                        <a:ea typeface="Calibri" panose="020F0502020204030204" pitchFamily="34" charset="0"/>
+                        <a:cs typeface="Times New Roman" panose="02020603050405020304" pitchFamily="18" charset="0"/>
+                      </a:endParaRPr>
+                    </a:p>
+                  </a:txBody>
+                  <a:tcPr marL="38048" marR="38048" marT="0" marB="0" anchor="ctr"/>
+                </a:tc>
+                <a:tc>
+                  <a:txBody>
+                    <a:bodyPr/>
+                    <a:lstStyle/>
+                    <a:p>
+                      <a:pPr algn="ctr">
+                        <a:lnSpc>
+                          <a:spcPct val="107000"/>
+                        </a:lnSpc>
+                        <a:spcAft>
+                          <a:spcPts val="0"/>
+                        </a:spcAft>
+                      </a:pPr>
+                      <a:r>
+                        <a:rPr lang="fr-CA" sz="1000" dirty="0">
+                          <a:effectLst/>
+                        </a:rPr>
+                        <a:t>La tension possède une ondulation maximale de 25 volts par rapport à la référence</a:t>
+                      </a:r>
+                      <a:endParaRPr lang="fr-CA" sz="1000" dirty="0">
+                        <a:effectLst/>
+                        <a:latin typeface="Calibri" panose="020F0502020204030204" pitchFamily="34" charset="0"/>
+                        <a:ea typeface="Calibri" panose="020F0502020204030204" pitchFamily="34" charset="0"/>
+                        <a:cs typeface="Times New Roman" panose="02020603050405020304" pitchFamily="18" charset="0"/>
+                      </a:endParaRPr>
+                    </a:p>
+                  </a:txBody>
+                  <a:tcPr marL="38048" marR="38048" marT="0" marB="0" anchor="ctr"/>
+                </a:tc>
+                <a:tc>
+                  <a:txBody>
+                    <a:bodyPr/>
+                    <a:lstStyle/>
+                    <a:p>
+                      <a:pPr algn="ctr">
+                        <a:lnSpc>
+                          <a:spcPct val="107000"/>
+                        </a:lnSpc>
+                        <a:spcAft>
+                          <a:spcPts val="0"/>
+                        </a:spcAft>
+                      </a:pPr>
+                      <a:r>
+                        <a:rPr lang="fr-CA" sz="1000" dirty="0">
+                          <a:effectLst/>
+                        </a:rPr>
+                        <a:t>Résultats de simulation</a:t>
+                      </a:r>
+                      <a:endParaRPr lang="fr-CA" sz="1000" dirty="0">
+                        <a:effectLst/>
+                        <a:latin typeface="Calibri" panose="020F0502020204030204" pitchFamily="34" charset="0"/>
+                        <a:ea typeface="Calibri" panose="020F0502020204030204" pitchFamily="34" charset="0"/>
+                        <a:cs typeface="Times New Roman" panose="02020603050405020304" pitchFamily="18" charset="0"/>
+                      </a:endParaRPr>
+                    </a:p>
+                  </a:txBody>
+                  <a:tcPr marL="38048" marR="38048" marT="0" marB="0" anchor="ctr"/>
+                </a:tc>
+                <a:tc>
+                  <a:txBody>
+                    <a:bodyPr/>
+                    <a:lstStyle/>
+                    <a:p>
+                      <a:pPr algn="ctr">
+                        <a:lnSpc>
+                          <a:spcPct val="107000"/>
+                        </a:lnSpc>
+                        <a:spcAft>
+                          <a:spcPts val="0"/>
+                        </a:spcAft>
+                      </a:pPr>
+                      <a:r>
+                        <a:rPr lang="fr-CA" sz="1000">
+                          <a:effectLst/>
+                        </a:rPr>
+                        <a:t>Simulateur</a:t>
+                      </a:r>
+                      <a:endParaRPr lang="fr-CA" sz="1000">
+                        <a:effectLst/>
+                        <a:latin typeface="Calibri" panose="020F0502020204030204" pitchFamily="34" charset="0"/>
+                        <a:ea typeface="Calibri" panose="020F0502020204030204" pitchFamily="34" charset="0"/>
+                        <a:cs typeface="Times New Roman" panose="02020603050405020304" pitchFamily="18" charset="0"/>
+                      </a:endParaRPr>
+                    </a:p>
+                  </a:txBody>
+                  <a:tcPr marL="38048" marR="38048" marT="0" marB="0" anchor="ctr"/>
+                </a:tc>
+                <a:tc>
+                  <a:txBody>
+                    <a:bodyPr/>
+                    <a:lstStyle/>
+                    <a:p>
+                      <a:pPr algn="ctr">
+                        <a:lnSpc>
+                          <a:spcPct val="107000"/>
+                        </a:lnSpc>
+                        <a:spcAft>
+                          <a:spcPts val="0"/>
+                        </a:spcAft>
+                      </a:pPr>
+                      <a:r>
+                        <a:rPr lang="fr-CA" sz="1000">
+                          <a:effectLst/>
+                        </a:rPr>
+                        <a:t>À l’aide de la forme d’onde de tension en sortie du redresseur, il est possible de valider l’ondulation de tension ainsi que le fonctionnement de la commande. Effectuer le test avec 5 niveaux de tension différents</a:t>
+                      </a:r>
+                      <a:endParaRPr lang="fr-CA" sz="1000">
+                        <a:effectLst/>
+                        <a:latin typeface="Calibri" panose="020F0502020204030204" pitchFamily="34" charset="0"/>
+                        <a:ea typeface="Calibri" panose="020F0502020204030204" pitchFamily="34" charset="0"/>
+                        <a:cs typeface="Times New Roman" panose="02020603050405020304" pitchFamily="18" charset="0"/>
+                      </a:endParaRPr>
+                    </a:p>
+                  </a:txBody>
+                  <a:tcPr marL="38048" marR="38048" marT="0" marB="0" anchor="ctr"/>
+                </a:tc>
+              </a:tr>
+              <a:tr h="723675">
+                <a:tc>
+                  <a:txBody>
+                    <a:bodyPr/>
+                    <a:lstStyle/>
+                    <a:p>
+                      <a:pPr>
+                        <a:lnSpc>
+                          <a:spcPct val="107000"/>
+                        </a:lnSpc>
+                        <a:spcAft>
+                          <a:spcPts val="0"/>
+                        </a:spcAft>
+                      </a:pPr>
+                      <a:r>
+                        <a:rPr lang="fr-CA" sz="1000">
+                          <a:effectLst/>
+                        </a:rPr>
+                        <a:t>Charger un banc de condensateur</a:t>
+                      </a:r>
+                      <a:endParaRPr lang="fr-CA" sz="1000">
+                        <a:effectLst/>
+                        <a:latin typeface="Calibri" panose="020F0502020204030204" pitchFamily="34" charset="0"/>
+                        <a:ea typeface="Calibri" panose="020F0502020204030204" pitchFamily="34" charset="0"/>
+                        <a:cs typeface="Times New Roman" panose="02020603050405020304" pitchFamily="18" charset="0"/>
+                      </a:endParaRPr>
+                    </a:p>
+                  </a:txBody>
+                  <a:tcPr marL="38048" marR="38048" marT="0" marB="0" anchor="ctr"/>
+                </a:tc>
+                <a:tc>
+                  <a:txBody>
+                    <a:bodyPr/>
+                    <a:lstStyle/>
+                    <a:p>
+                      <a:pPr algn="ctr">
+                        <a:lnSpc>
+                          <a:spcPct val="107000"/>
+                        </a:lnSpc>
+                        <a:spcAft>
+                          <a:spcPts val="0"/>
+                        </a:spcAft>
+                      </a:pPr>
+                      <a:r>
+                        <a:rPr lang="fr-CA" sz="1000" dirty="0">
+                          <a:effectLst/>
+                        </a:rPr>
+                        <a:t> </a:t>
+                      </a:r>
+                      <a:endParaRPr lang="fr-CA" sz="1000" dirty="0">
+                        <a:effectLst/>
+                        <a:latin typeface="Calibri" panose="020F0502020204030204" pitchFamily="34" charset="0"/>
+                        <a:ea typeface="Calibri" panose="020F0502020204030204" pitchFamily="34" charset="0"/>
+                        <a:cs typeface="Times New Roman" panose="02020603050405020304" pitchFamily="18" charset="0"/>
+                      </a:endParaRPr>
+                    </a:p>
+                  </a:txBody>
+                  <a:tcPr marL="38048" marR="38048" marT="0" marB="0" anchor="ctr"/>
+                </a:tc>
+                <a:tc>
+                  <a:txBody>
+                    <a:bodyPr/>
+                    <a:lstStyle/>
+                    <a:p>
+                      <a:pPr algn="ctr">
+                        <a:lnSpc>
+                          <a:spcPct val="107000"/>
+                        </a:lnSpc>
+                        <a:spcAft>
+                          <a:spcPts val="0"/>
+                        </a:spcAft>
+                      </a:pPr>
+                      <a:r>
+                        <a:rPr lang="fr-CA" sz="1000" dirty="0">
+                          <a:effectLst/>
+                        </a:rPr>
+                        <a:t>Résultats de simulation</a:t>
+                      </a:r>
+                      <a:endParaRPr lang="fr-CA" sz="1000" dirty="0">
+                        <a:effectLst/>
+                        <a:latin typeface="Calibri" panose="020F0502020204030204" pitchFamily="34" charset="0"/>
+                        <a:ea typeface="Calibri" panose="020F0502020204030204" pitchFamily="34" charset="0"/>
+                        <a:cs typeface="Times New Roman" panose="02020603050405020304" pitchFamily="18" charset="0"/>
+                      </a:endParaRPr>
+                    </a:p>
+                  </a:txBody>
+                  <a:tcPr marL="38048" marR="38048" marT="0" marB="0" anchor="ctr"/>
+                </a:tc>
+                <a:tc>
+                  <a:txBody>
+                    <a:bodyPr/>
+                    <a:lstStyle/>
+                    <a:p>
+                      <a:pPr algn="ctr">
+                        <a:lnSpc>
+                          <a:spcPct val="107000"/>
+                        </a:lnSpc>
+                        <a:spcAft>
+                          <a:spcPts val="0"/>
+                        </a:spcAft>
+                      </a:pPr>
+                      <a:r>
+                        <a:rPr lang="fr-CA" sz="1000" dirty="0">
+                          <a:effectLst/>
+                        </a:rPr>
+                        <a:t>Simulateur</a:t>
+                      </a:r>
+                      <a:endParaRPr lang="fr-CA" sz="1000" dirty="0">
+                        <a:effectLst/>
+                        <a:latin typeface="Calibri" panose="020F0502020204030204" pitchFamily="34" charset="0"/>
+                        <a:ea typeface="Calibri" panose="020F0502020204030204" pitchFamily="34" charset="0"/>
+                        <a:cs typeface="Times New Roman" panose="02020603050405020304" pitchFamily="18" charset="0"/>
+                      </a:endParaRPr>
+                    </a:p>
+                  </a:txBody>
+                  <a:tcPr marL="38048" marR="38048" marT="0" marB="0" anchor="ctr"/>
+                </a:tc>
+                <a:tc>
+                  <a:txBody>
+                    <a:bodyPr/>
+                    <a:lstStyle/>
+                    <a:p>
+                      <a:pPr algn="ctr">
+                        <a:lnSpc>
+                          <a:spcPct val="107000"/>
+                        </a:lnSpc>
+                        <a:spcAft>
+                          <a:spcPts val="0"/>
+                        </a:spcAft>
+                      </a:pPr>
+                      <a:r>
+                        <a:rPr lang="fr-CA" sz="1000">
+                          <a:effectLst/>
+                        </a:rPr>
+                        <a:t>Vérifier à l’aide des formes d’ondes de charge que le temps de charge est en accord avec la théorie. Effectuer le test avec 5 charges différentes</a:t>
+                      </a:r>
+                      <a:endParaRPr lang="fr-CA" sz="1000">
+                        <a:effectLst/>
+                        <a:latin typeface="Calibri" panose="020F0502020204030204" pitchFamily="34" charset="0"/>
+                        <a:ea typeface="Calibri" panose="020F0502020204030204" pitchFamily="34" charset="0"/>
+                        <a:cs typeface="Times New Roman" panose="02020603050405020304" pitchFamily="18" charset="0"/>
+                      </a:endParaRPr>
+                    </a:p>
+                  </a:txBody>
+                  <a:tcPr marL="38048" marR="38048" marT="0" marB="0" anchor="ctr"/>
+                </a:tc>
+              </a:tr>
+              <a:tr h="1113315">
+                <a:tc>
+                  <a:txBody>
+                    <a:bodyPr/>
+                    <a:lstStyle/>
+                    <a:p>
+                      <a:pPr>
+                        <a:lnSpc>
+                          <a:spcPct val="107000"/>
+                        </a:lnSpc>
+                        <a:spcAft>
+                          <a:spcPts val="0"/>
+                        </a:spcAft>
+                      </a:pPr>
+                      <a:r>
+                        <a:rPr lang="fr-CA" sz="1000">
+                          <a:effectLst/>
+                        </a:rPr>
+                        <a:t>Alimenter les électroaimants de l’accélérateur de particules</a:t>
+                      </a:r>
+                      <a:endParaRPr lang="fr-CA" sz="1000">
+                        <a:effectLst/>
+                        <a:latin typeface="Calibri" panose="020F0502020204030204" pitchFamily="34" charset="0"/>
+                        <a:ea typeface="Calibri" panose="020F0502020204030204" pitchFamily="34" charset="0"/>
+                        <a:cs typeface="Times New Roman" panose="02020603050405020304" pitchFamily="18" charset="0"/>
+                      </a:endParaRPr>
+                    </a:p>
+                  </a:txBody>
+                  <a:tcPr marL="38048" marR="38048" marT="0" marB="0" anchor="ctr"/>
+                </a:tc>
+                <a:tc>
+                  <a:txBody>
+                    <a:bodyPr/>
+                    <a:lstStyle/>
+                    <a:p>
+                      <a:pPr algn="ctr">
+                        <a:lnSpc>
+                          <a:spcPct val="107000"/>
+                        </a:lnSpc>
+                        <a:spcAft>
+                          <a:spcPts val="0"/>
+                        </a:spcAft>
+                      </a:pPr>
+                      <a:r>
+                        <a:rPr lang="fr-CA" sz="1000">
+                          <a:effectLst/>
+                        </a:rPr>
+                        <a:t>L’ondulation du courant est plus faible que 25A par rapport à la référence</a:t>
+                      </a:r>
+                      <a:endParaRPr lang="fr-CA" sz="1000">
+                        <a:effectLst/>
+                        <a:latin typeface="Calibri" panose="020F0502020204030204" pitchFamily="34" charset="0"/>
+                        <a:ea typeface="Calibri" panose="020F0502020204030204" pitchFamily="34" charset="0"/>
+                        <a:cs typeface="Times New Roman" panose="02020603050405020304" pitchFamily="18" charset="0"/>
+                      </a:endParaRPr>
+                    </a:p>
+                  </a:txBody>
+                  <a:tcPr marL="38048" marR="38048" marT="0" marB="0" anchor="ctr"/>
+                </a:tc>
+                <a:tc>
+                  <a:txBody>
+                    <a:bodyPr/>
+                    <a:lstStyle/>
+                    <a:p>
+                      <a:pPr algn="ctr">
+                        <a:lnSpc>
+                          <a:spcPct val="107000"/>
+                        </a:lnSpc>
+                        <a:spcAft>
+                          <a:spcPts val="0"/>
+                        </a:spcAft>
+                      </a:pPr>
+                      <a:r>
+                        <a:rPr lang="fr-CA" sz="1000" dirty="0">
+                          <a:effectLst/>
+                        </a:rPr>
+                        <a:t>Résultats de simulation</a:t>
+                      </a:r>
+                      <a:endParaRPr lang="fr-CA" sz="1000" dirty="0">
+                        <a:effectLst/>
+                        <a:latin typeface="Calibri" panose="020F0502020204030204" pitchFamily="34" charset="0"/>
+                        <a:ea typeface="Calibri" panose="020F0502020204030204" pitchFamily="34" charset="0"/>
+                        <a:cs typeface="Times New Roman" panose="02020603050405020304" pitchFamily="18" charset="0"/>
+                      </a:endParaRPr>
+                    </a:p>
+                  </a:txBody>
+                  <a:tcPr marL="38048" marR="38048" marT="0" marB="0" anchor="ctr"/>
+                </a:tc>
+                <a:tc>
+                  <a:txBody>
+                    <a:bodyPr/>
+                    <a:lstStyle/>
+                    <a:p>
+                      <a:pPr algn="ctr">
+                        <a:lnSpc>
+                          <a:spcPct val="107000"/>
+                        </a:lnSpc>
+                        <a:spcAft>
+                          <a:spcPts val="0"/>
+                        </a:spcAft>
+                      </a:pPr>
+                      <a:r>
+                        <a:rPr lang="fr-CA" sz="1000" dirty="0">
+                          <a:effectLst/>
+                        </a:rPr>
+                        <a:t>Simulateur</a:t>
+                      </a:r>
+                      <a:endParaRPr lang="fr-CA" sz="1000" dirty="0">
+                        <a:effectLst/>
+                        <a:latin typeface="Calibri" panose="020F0502020204030204" pitchFamily="34" charset="0"/>
+                        <a:ea typeface="Calibri" panose="020F0502020204030204" pitchFamily="34" charset="0"/>
+                        <a:cs typeface="Times New Roman" panose="02020603050405020304" pitchFamily="18" charset="0"/>
+                      </a:endParaRPr>
+                    </a:p>
+                  </a:txBody>
+                  <a:tcPr marL="38048" marR="38048" marT="0" marB="0" anchor="ctr"/>
+                </a:tc>
+                <a:tc>
+                  <a:txBody>
+                    <a:bodyPr/>
+                    <a:lstStyle/>
+                    <a:p>
+                      <a:pPr algn="ctr">
+                        <a:lnSpc>
+                          <a:spcPct val="107000"/>
+                        </a:lnSpc>
+                        <a:spcAft>
+                          <a:spcPts val="0"/>
+                        </a:spcAft>
+                      </a:pPr>
+                      <a:r>
+                        <a:rPr lang="fr-CA" sz="1000" dirty="0">
+                          <a:effectLst/>
+                        </a:rPr>
+                        <a:t>À l’aide de la forme d’onde de courant traversant les électroaimants, il est possible de valider l’ondulation de courant ainsi que le fonctionnement de la commande. Effectuer le test avec 5 formes de courant de référence différentes</a:t>
+                      </a:r>
+                      <a:endParaRPr lang="fr-CA" sz="1000" dirty="0">
+                        <a:effectLst/>
+                        <a:latin typeface="Calibri" panose="020F0502020204030204" pitchFamily="34" charset="0"/>
+                        <a:ea typeface="Calibri" panose="020F0502020204030204" pitchFamily="34" charset="0"/>
+                        <a:cs typeface="Times New Roman" panose="02020603050405020304" pitchFamily="18" charset="0"/>
+                      </a:endParaRPr>
+                    </a:p>
+                  </a:txBody>
+                  <a:tcPr marL="38048" marR="38048" marT="0" marB="0" anchor="ctr"/>
+                </a:tc>
+              </a:tr>
+              <a:tr h="371105">
+                <a:tc rowSpan="2">
+                  <a:txBody>
+                    <a:bodyPr/>
+                    <a:lstStyle/>
+                    <a:p>
+                      <a:pPr>
+                        <a:lnSpc>
+                          <a:spcPct val="107000"/>
+                        </a:lnSpc>
+                        <a:spcAft>
+                          <a:spcPts val="0"/>
+                        </a:spcAft>
+                      </a:pPr>
+                      <a:r>
+                        <a:rPr lang="fr-CA" sz="1000">
+                          <a:effectLst/>
+                        </a:rPr>
+                        <a:t>Afficher des résultats de simulation personnalisés</a:t>
+                      </a:r>
+                      <a:endParaRPr lang="fr-CA" sz="1000">
+                        <a:effectLst/>
+                        <a:latin typeface="Calibri" panose="020F0502020204030204" pitchFamily="34" charset="0"/>
+                        <a:ea typeface="Calibri" panose="020F0502020204030204" pitchFamily="34" charset="0"/>
+                        <a:cs typeface="Times New Roman" panose="02020603050405020304" pitchFamily="18" charset="0"/>
+                      </a:endParaRPr>
+                    </a:p>
+                  </a:txBody>
+                  <a:tcPr marL="38048" marR="38048" marT="0" marB="0" anchor="ctr"/>
+                </a:tc>
+                <a:tc rowSpan="2">
+                  <a:txBody>
+                    <a:bodyPr/>
+                    <a:lstStyle/>
+                    <a:p>
+                      <a:pPr algn="ctr">
+                        <a:lnSpc>
+                          <a:spcPct val="107000"/>
+                        </a:lnSpc>
+                        <a:spcAft>
+                          <a:spcPts val="0"/>
+                        </a:spcAft>
+                      </a:pPr>
+                      <a:r>
+                        <a:rPr lang="fr-CA" sz="1000">
+                          <a:effectLst/>
+                        </a:rPr>
+                        <a:t> </a:t>
+                      </a:r>
+                      <a:endParaRPr lang="fr-CA" sz="1000">
+                        <a:effectLst/>
+                        <a:latin typeface="Calibri" panose="020F0502020204030204" pitchFamily="34" charset="0"/>
+                        <a:ea typeface="Calibri" panose="020F0502020204030204" pitchFamily="34" charset="0"/>
+                        <a:cs typeface="Times New Roman" panose="02020603050405020304" pitchFamily="18" charset="0"/>
+                      </a:endParaRPr>
+                    </a:p>
+                  </a:txBody>
+                  <a:tcPr marL="38048" marR="38048" marT="0" marB="0" anchor="ctr"/>
+                </a:tc>
+                <a:tc rowSpan="2">
+                  <a:txBody>
+                    <a:bodyPr/>
+                    <a:lstStyle/>
+                    <a:p>
+                      <a:pPr algn="ctr">
+                        <a:lnSpc>
+                          <a:spcPct val="107000"/>
+                        </a:lnSpc>
+                        <a:spcAft>
+                          <a:spcPts val="0"/>
+                        </a:spcAft>
+                      </a:pPr>
+                      <a:r>
+                        <a:rPr lang="fr-CA" sz="1000">
+                          <a:effectLst/>
+                        </a:rPr>
+                        <a:t>Résultats de simulation</a:t>
+                      </a:r>
+                      <a:endParaRPr lang="fr-CA" sz="1000">
+                        <a:effectLst/>
+                        <a:latin typeface="Calibri" panose="020F0502020204030204" pitchFamily="34" charset="0"/>
+                        <a:ea typeface="Calibri" panose="020F0502020204030204" pitchFamily="34" charset="0"/>
+                        <a:cs typeface="Times New Roman" panose="02020603050405020304" pitchFamily="18" charset="0"/>
+                      </a:endParaRPr>
+                    </a:p>
+                  </a:txBody>
+                  <a:tcPr marL="38048" marR="38048" marT="0" marB="0" anchor="ctr"/>
+                </a:tc>
+                <a:tc>
+                  <a:txBody>
+                    <a:bodyPr/>
+                    <a:lstStyle/>
+                    <a:p>
+                      <a:pPr algn="ctr">
+                        <a:lnSpc>
+                          <a:spcPct val="107000"/>
+                        </a:lnSpc>
+                        <a:spcAft>
+                          <a:spcPts val="0"/>
+                        </a:spcAft>
+                      </a:pPr>
+                      <a:r>
+                        <a:rPr lang="fr-CA" sz="1000">
+                          <a:effectLst/>
+                        </a:rPr>
+                        <a:t>Interface de contrôle de simulation</a:t>
+                      </a:r>
+                      <a:endParaRPr lang="fr-CA" sz="1000">
+                        <a:effectLst/>
+                        <a:latin typeface="Calibri" panose="020F0502020204030204" pitchFamily="34" charset="0"/>
+                        <a:ea typeface="Calibri" panose="020F0502020204030204" pitchFamily="34" charset="0"/>
+                        <a:cs typeface="Times New Roman" panose="02020603050405020304" pitchFamily="18" charset="0"/>
+                      </a:endParaRPr>
+                    </a:p>
+                  </a:txBody>
+                  <a:tcPr marL="38048" marR="38048" marT="0" marB="0" anchor="ctr"/>
+                </a:tc>
+                <a:tc rowSpan="2">
+                  <a:txBody>
+                    <a:bodyPr/>
+                    <a:lstStyle/>
+                    <a:p>
+                      <a:pPr algn="ctr">
+                        <a:lnSpc>
+                          <a:spcPct val="107000"/>
+                        </a:lnSpc>
+                        <a:spcAft>
+                          <a:spcPts val="0"/>
+                        </a:spcAft>
+                      </a:pPr>
+                      <a:r>
+                        <a:rPr lang="fr-CA" sz="1000" dirty="0">
+                          <a:effectLst/>
+                        </a:rPr>
+                        <a:t>À l’aide de l’interface de contrôle, vérifier qu’il est possible d’accéder à chacune des formes d’onde produites par le simulateur</a:t>
+                      </a:r>
+                      <a:endParaRPr lang="fr-CA" sz="1000" dirty="0">
+                        <a:effectLst/>
+                        <a:latin typeface="Calibri" panose="020F0502020204030204" pitchFamily="34" charset="0"/>
+                        <a:ea typeface="Calibri" panose="020F0502020204030204" pitchFamily="34" charset="0"/>
+                        <a:cs typeface="Times New Roman" panose="02020603050405020304" pitchFamily="18" charset="0"/>
+                      </a:endParaRPr>
+                    </a:p>
+                  </a:txBody>
+                  <a:tcPr marL="38048" marR="38048" marT="0" marB="0" anchor="ctr"/>
+                </a:tc>
+              </a:tr>
+              <a:tr h="247403">
+                <a:tc vMerge="1">
+                  <a:txBody>
+                    <a:bodyPr/>
+                    <a:lstStyle/>
+                    <a:p>
+                      <a:endParaRPr lang="fr-CA"/>
+                    </a:p>
+                  </a:txBody>
+                  <a:tcPr/>
+                </a:tc>
+                <a:tc vMerge="1">
+                  <a:txBody>
+                    <a:bodyPr/>
+                    <a:lstStyle/>
+                    <a:p>
+                      <a:endParaRPr lang="fr-CA"/>
+                    </a:p>
+                  </a:txBody>
+                  <a:tcPr/>
+                </a:tc>
+                <a:tc vMerge="1">
+                  <a:txBody>
+                    <a:bodyPr/>
+                    <a:lstStyle/>
+                    <a:p>
+                      <a:endParaRPr lang="fr-CA"/>
+                    </a:p>
+                  </a:txBody>
+                  <a:tcPr/>
+                </a:tc>
+                <a:tc>
+                  <a:txBody>
+                    <a:bodyPr/>
+                    <a:lstStyle/>
+                    <a:p>
+                      <a:pPr algn="ctr">
+                        <a:lnSpc>
+                          <a:spcPct val="107000"/>
+                        </a:lnSpc>
+                        <a:spcAft>
+                          <a:spcPts val="0"/>
+                        </a:spcAft>
+                      </a:pPr>
+                      <a:r>
+                        <a:rPr lang="fr-CA" sz="1000" dirty="0">
+                          <a:effectLst/>
+                        </a:rPr>
+                        <a:t>Simulateur</a:t>
+                      </a:r>
+                      <a:endParaRPr lang="fr-CA" sz="1000" dirty="0">
+                        <a:effectLst/>
+                        <a:latin typeface="Calibri" panose="020F0502020204030204" pitchFamily="34" charset="0"/>
+                        <a:ea typeface="Calibri" panose="020F0502020204030204" pitchFamily="34" charset="0"/>
+                        <a:cs typeface="Times New Roman" panose="02020603050405020304" pitchFamily="18" charset="0"/>
+                      </a:endParaRPr>
+                    </a:p>
+                  </a:txBody>
+                  <a:tcPr marL="38048" marR="38048" marT="0" marB="0" anchor="ctr"/>
+                </a:tc>
+                <a:tc vMerge="1">
+                  <a:txBody>
+                    <a:bodyPr/>
+                    <a:lstStyle/>
+                    <a:p>
+                      <a:endParaRPr lang="fr-CA"/>
+                    </a:p>
+                  </a:txBody>
+                  <a:tcPr/>
+                </a:tc>
+              </a:tr>
+              <a:tr h="371105">
+                <a:tc rowSpan="2">
+                  <a:txBody>
+                    <a:bodyPr/>
+                    <a:lstStyle/>
+                    <a:p>
+                      <a:pPr>
+                        <a:lnSpc>
+                          <a:spcPct val="107000"/>
+                        </a:lnSpc>
+                        <a:spcAft>
+                          <a:spcPts val="0"/>
+                        </a:spcAft>
+                      </a:pPr>
+                      <a:r>
+                        <a:rPr lang="fr-CA" sz="1000">
+                          <a:effectLst/>
+                        </a:rPr>
+                        <a:t>Présenter la validation croisée de chacun des simulateurs</a:t>
+                      </a:r>
+                      <a:endParaRPr lang="fr-CA" sz="1000">
+                        <a:effectLst/>
+                        <a:latin typeface="Calibri" panose="020F0502020204030204" pitchFamily="34" charset="0"/>
+                        <a:ea typeface="Calibri" panose="020F0502020204030204" pitchFamily="34" charset="0"/>
+                        <a:cs typeface="Times New Roman" panose="02020603050405020304" pitchFamily="18" charset="0"/>
+                      </a:endParaRPr>
+                    </a:p>
+                  </a:txBody>
+                  <a:tcPr marL="38048" marR="38048" marT="0" marB="0" anchor="ctr"/>
+                </a:tc>
+                <a:tc rowSpan="2">
+                  <a:txBody>
+                    <a:bodyPr/>
+                    <a:lstStyle/>
+                    <a:p>
+                      <a:pPr algn="ctr">
+                        <a:lnSpc>
+                          <a:spcPct val="107000"/>
+                        </a:lnSpc>
+                        <a:spcAft>
+                          <a:spcPts val="0"/>
+                        </a:spcAft>
+                      </a:pPr>
+                      <a:r>
+                        <a:rPr lang="fr-CA" sz="1000">
+                          <a:effectLst/>
+                        </a:rPr>
+                        <a:t>Les courbes de chacun des simulateurs sont semblables</a:t>
+                      </a:r>
+                      <a:endParaRPr lang="fr-CA" sz="1000">
+                        <a:effectLst/>
+                        <a:latin typeface="Calibri" panose="020F0502020204030204" pitchFamily="34" charset="0"/>
+                        <a:ea typeface="Calibri" panose="020F0502020204030204" pitchFamily="34" charset="0"/>
+                        <a:cs typeface="Times New Roman" panose="02020603050405020304" pitchFamily="18" charset="0"/>
+                      </a:endParaRPr>
+                    </a:p>
+                  </a:txBody>
+                  <a:tcPr marL="38048" marR="38048" marT="0" marB="0" anchor="ctr"/>
+                </a:tc>
+                <a:tc rowSpan="2">
+                  <a:txBody>
+                    <a:bodyPr/>
+                    <a:lstStyle/>
+                    <a:p>
+                      <a:pPr algn="ctr">
+                        <a:lnSpc>
+                          <a:spcPct val="107000"/>
+                        </a:lnSpc>
+                        <a:spcAft>
+                          <a:spcPts val="0"/>
+                        </a:spcAft>
+                      </a:pPr>
+                      <a:r>
+                        <a:rPr lang="fr-CA" sz="1000">
+                          <a:effectLst/>
+                        </a:rPr>
+                        <a:t>Résultats de simulation</a:t>
+                      </a:r>
+                      <a:endParaRPr lang="fr-CA" sz="1000">
+                        <a:effectLst/>
+                        <a:latin typeface="Calibri" panose="020F0502020204030204" pitchFamily="34" charset="0"/>
+                        <a:ea typeface="Calibri" panose="020F0502020204030204" pitchFamily="34" charset="0"/>
+                        <a:cs typeface="Times New Roman" panose="02020603050405020304" pitchFamily="18" charset="0"/>
+                      </a:endParaRPr>
+                    </a:p>
+                  </a:txBody>
+                  <a:tcPr marL="38048" marR="38048" marT="0" marB="0" anchor="ctr"/>
+                </a:tc>
+                <a:tc>
+                  <a:txBody>
+                    <a:bodyPr/>
+                    <a:lstStyle/>
+                    <a:p>
+                      <a:pPr algn="ctr">
+                        <a:lnSpc>
+                          <a:spcPct val="107000"/>
+                        </a:lnSpc>
+                        <a:spcAft>
+                          <a:spcPts val="0"/>
+                        </a:spcAft>
+                      </a:pPr>
+                      <a:r>
+                        <a:rPr lang="fr-CA" sz="1000">
+                          <a:effectLst/>
+                        </a:rPr>
+                        <a:t>Interface de contrôle de simulation</a:t>
+                      </a:r>
+                      <a:endParaRPr lang="fr-CA" sz="1000">
+                        <a:effectLst/>
+                        <a:latin typeface="Calibri" panose="020F0502020204030204" pitchFamily="34" charset="0"/>
+                        <a:ea typeface="Calibri" panose="020F0502020204030204" pitchFamily="34" charset="0"/>
+                        <a:cs typeface="Times New Roman" panose="02020603050405020304" pitchFamily="18" charset="0"/>
+                      </a:endParaRPr>
+                    </a:p>
+                  </a:txBody>
+                  <a:tcPr marL="38048" marR="38048" marT="0" marB="0" anchor="ctr"/>
+                </a:tc>
+                <a:tc rowSpan="2">
+                  <a:txBody>
+                    <a:bodyPr/>
+                    <a:lstStyle/>
+                    <a:p>
+                      <a:pPr algn="ctr">
+                        <a:lnSpc>
+                          <a:spcPct val="107000"/>
+                        </a:lnSpc>
+                        <a:spcAft>
+                          <a:spcPts val="0"/>
+                        </a:spcAft>
+                      </a:pPr>
+                      <a:r>
+                        <a:rPr lang="fr-CA" sz="1000" dirty="0">
+                          <a:effectLst/>
+                        </a:rPr>
+                        <a:t>Vérifier la concordance des résultats de chacun des sous-systèmes implantés dans chacun des simulateurs pour plusieurs paramètres de simulations différents</a:t>
+                      </a:r>
+                      <a:endParaRPr lang="fr-CA" sz="1000" dirty="0">
+                        <a:effectLst/>
+                        <a:latin typeface="Calibri" panose="020F0502020204030204" pitchFamily="34" charset="0"/>
+                        <a:ea typeface="Calibri" panose="020F0502020204030204" pitchFamily="34" charset="0"/>
+                        <a:cs typeface="Times New Roman" panose="02020603050405020304" pitchFamily="18" charset="0"/>
+                      </a:endParaRPr>
+                    </a:p>
+                  </a:txBody>
+                  <a:tcPr marL="38048" marR="38048" marT="0" marB="0" anchor="ctr"/>
+                </a:tc>
+              </a:tr>
+              <a:tr h="371105">
+                <a:tc vMerge="1">
+                  <a:txBody>
+                    <a:bodyPr/>
+                    <a:lstStyle/>
+                    <a:p>
+                      <a:endParaRPr lang="fr-CA"/>
+                    </a:p>
+                  </a:txBody>
+                  <a:tcPr/>
+                </a:tc>
+                <a:tc vMerge="1">
+                  <a:txBody>
+                    <a:bodyPr/>
+                    <a:lstStyle/>
+                    <a:p>
+                      <a:endParaRPr lang="fr-CA"/>
+                    </a:p>
+                  </a:txBody>
+                  <a:tcPr/>
+                </a:tc>
+                <a:tc vMerge="1">
+                  <a:txBody>
+                    <a:bodyPr/>
+                    <a:lstStyle/>
+                    <a:p>
+                      <a:endParaRPr lang="fr-CA"/>
+                    </a:p>
+                  </a:txBody>
+                  <a:tcPr/>
+                </a:tc>
+                <a:tc>
+                  <a:txBody>
+                    <a:bodyPr/>
+                    <a:lstStyle/>
+                    <a:p>
+                      <a:pPr algn="ctr">
+                        <a:lnSpc>
+                          <a:spcPct val="107000"/>
+                        </a:lnSpc>
+                        <a:spcAft>
+                          <a:spcPts val="0"/>
+                        </a:spcAft>
+                      </a:pPr>
+                      <a:r>
+                        <a:rPr lang="fr-CA" sz="1000" dirty="0">
+                          <a:effectLst/>
+                        </a:rPr>
+                        <a:t> 3 simulateurs</a:t>
+                      </a:r>
+                      <a:endParaRPr lang="fr-CA" sz="1000" dirty="0">
+                        <a:effectLst/>
+                        <a:latin typeface="Calibri" panose="020F0502020204030204" pitchFamily="34" charset="0"/>
+                        <a:ea typeface="Calibri" panose="020F0502020204030204" pitchFamily="34" charset="0"/>
+                        <a:cs typeface="Times New Roman" panose="02020603050405020304" pitchFamily="18" charset="0"/>
+                      </a:endParaRPr>
+                    </a:p>
+                  </a:txBody>
+                  <a:tcPr marL="38048" marR="38048" marT="0" marB="0" anchor="ctr"/>
+                </a:tc>
+                <a:tc vMerge="1">
+                  <a:txBody>
+                    <a:bodyPr/>
+                    <a:lstStyle/>
+                    <a:p>
+                      <a:endParaRPr lang="fr-CA"/>
+                    </a:p>
+                  </a:txBody>
+                  <a:tcPr/>
+                </a:tc>
+              </a:tr>
+            </a:tbl>
+          </a:graphicData>
+        </a:graphic>
+      </p:graphicFrame>
+    </p:spTree>
+    <p:extLst>
+      <p:ext uri="{BB962C8B-B14F-4D97-AF65-F5344CB8AC3E}">
+        <p14:creationId xmlns:p14="http://schemas.microsoft.com/office/powerpoint/2010/main" val="1086151694"/>
+      </p:ext>
+    </p:extLst>
+  </p:cSld>
+  <p:clrMapOvr>
+    <a:masterClrMapping/>
+  </p:clrMapOvr>
+</p:sld>
+</file>
+
+<file path=ppt/slides/slide21.xml><?xml version="1.0" encoding="utf-8"?>
+<p:sld xmlns:a="http://schemas.openxmlformats.org/drawingml/2006/main" xmlns:r="http://schemas.openxmlformats.org/officeDocument/2006/relationships" xmlns:p="http://schemas.openxmlformats.org/presentationml/2006/main">
+  <p:cSld>
+    <p:spTree>
+      <p:nvGrpSpPr>
+        <p:cNvPr id="1" name=""/>
+        <p:cNvGrpSpPr/>
+        <p:nvPr/>
+      </p:nvGrpSpPr>
+      <p:grpSpPr>
+        <a:xfrm>
+          <a:off x="0" y="0"/>
+          <a:ext cx="0" cy="0"/>
+          <a:chOff x="0" y="0"/>
+          <a:chExt cx="0" cy="0"/>
+        </a:xfrm>
+      </p:grpSpPr>
+      <p:sp>
+        <p:nvSpPr>
+          <p:cNvPr id="2" name="Title 1"/>
+          <p:cNvSpPr>
+            <a:spLocks noGrp="1"/>
+          </p:cNvSpPr>
+          <p:nvPr>
+            <p:ph type="title"/>
+          </p:nvPr>
+        </p:nvSpPr>
+        <p:spPr/>
+        <p:txBody>
+          <a:bodyPr/>
+          <a:lstStyle/>
+          <a:p>
+            <a:r>
+              <a:rPr lang="en-US" dirty="0" err="1" smtClean="0"/>
+              <a:t>Registre</a:t>
+            </a:r>
+            <a:r>
+              <a:rPr lang="en-US" dirty="0" smtClean="0"/>
+              <a:t> de </a:t>
+            </a:r>
+            <a:r>
+              <a:rPr lang="en-US" dirty="0" err="1" smtClean="0"/>
+              <a:t>risques</a:t>
+            </a:r>
+            <a:r>
+              <a:rPr lang="en-US" dirty="0" smtClean="0"/>
+              <a:t> (1/4)</a:t>
+            </a:r>
+            <a:endParaRPr lang="en-US" dirty="0"/>
+          </a:p>
+        </p:txBody>
+      </p:sp>
+      <p:graphicFrame>
+        <p:nvGraphicFramePr>
+          <p:cNvPr id="4" name="Table 3"/>
+          <p:cNvGraphicFramePr>
+            <a:graphicFrameLocks noGrp="1"/>
+          </p:cNvGraphicFramePr>
+          <p:nvPr>
+            <p:extLst/>
+          </p:nvPr>
+        </p:nvGraphicFramePr>
+        <p:xfrm>
+          <a:off x="406380" y="1328943"/>
+          <a:ext cx="8535740" cy="5261861"/>
+        </p:xfrm>
+        <a:graphic>
+          <a:graphicData uri="http://schemas.openxmlformats.org/drawingml/2006/table">
+            <a:tbl>
+              <a:tblPr firstRow="1" firstCol="1" bandRow="1">
+                <a:tableStyleId>{5C22544A-7EE6-4342-B048-85BDC9FD1C3A}</a:tableStyleId>
+              </a:tblPr>
+              <a:tblGrid>
+                <a:gridCol w="1256841"/>
+                <a:gridCol w="955932"/>
+                <a:gridCol w="1541872"/>
+                <a:gridCol w="1169878"/>
+                <a:gridCol w="1058707"/>
+                <a:gridCol w="1537807"/>
+                <a:gridCol w="1014703"/>
+              </a:tblGrid>
+              <a:tr h="780492">
+                <a:tc>
+                  <a:txBody>
+                    <a:bodyPr/>
+                    <a:lstStyle/>
+                    <a:p>
+                      <a:pPr algn="ctr" fontAlgn="ctr"/>
+                      <a:r>
+                        <a:rPr lang="fr-CA" sz="1200" u="none" strike="noStrike" dirty="0">
+                          <a:effectLst/>
+                        </a:rPr>
+                        <a:t>Type de risque</a:t>
+                      </a:r>
+                      <a:endParaRPr lang="fr-CA" sz="1200" b="1" i="0" u="none" strike="noStrike" dirty="0">
+                        <a:solidFill>
+                          <a:srgbClr val="000000"/>
+                        </a:solidFill>
+                        <a:effectLst/>
+                        <a:latin typeface="Calibri" panose="020F0502020204030204" pitchFamily="34" charset="0"/>
+                      </a:endParaRPr>
+                    </a:p>
+                  </a:txBody>
+                  <a:tcPr marL="2208" marR="2208" marT="2208" marB="0" anchor="ctr"/>
+                </a:tc>
+                <a:tc>
+                  <a:txBody>
+                    <a:bodyPr/>
+                    <a:lstStyle/>
+                    <a:p>
+                      <a:pPr marL="0" indent="0" algn="ctr" fontAlgn="ctr">
+                        <a:tabLst>
+                          <a:tab pos="628650" algn="l"/>
+                        </a:tabLst>
+                      </a:pPr>
+                      <a:r>
+                        <a:rPr lang="fr-CA" sz="1200" u="none" strike="noStrike" dirty="0">
+                          <a:effectLst/>
+                        </a:rPr>
+                        <a:t>Niveau de priorité</a:t>
+                      </a:r>
+                      <a:br>
+                        <a:rPr lang="fr-CA" sz="1200" u="none" strike="noStrike" dirty="0">
+                          <a:effectLst/>
+                        </a:rPr>
+                      </a:br>
+                      <a:r>
+                        <a:rPr lang="fr-CA" sz="1200" u="none" strike="noStrike" dirty="0">
+                          <a:effectLst/>
+                        </a:rPr>
+                        <a:t>(1 faible, 5 élevé)</a:t>
+                      </a:r>
+                      <a:endParaRPr lang="fr-CA" sz="1200" b="1" i="0" u="none" strike="noStrike" dirty="0">
+                        <a:solidFill>
+                          <a:srgbClr val="000000"/>
+                        </a:solidFill>
+                        <a:effectLst/>
+                        <a:latin typeface="Calibri" panose="020F0502020204030204" pitchFamily="34" charset="0"/>
+                      </a:endParaRPr>
+                    </a:p>
+                  </a:txBody>
+                  <a:tcPr marL="2208" marR="2208" marT="2208" marB="0" anchor="ctr"/>
+                </a:tc>
+                <a:tc>
+                  <a:txBody>
+                    <a:bodyPr/>
+                    <a:lstStyle/>
+                    <a:p>
+                      <a:pPr algn="ctr" fontAlgn="ctr"/>
+                      <a:r>
+                        <a:rPr lang="fr-CA" sz="1200" u="none" strike="noStrike" dirty="0">
+                          <a:effectLst/>
+                        </a:rPr>
+                        <a:t>Conséquence de</a:t>
+                      </a:r>
+                      <a:br>
+                        <a:rPr lang="fr-CA" sz="1200" u="none" strike="noStrike" dirty="0">
+                          <a:effectLst/>
+                        </a:rPr>
+                      </a:br>
+                      <a:r>
+                        <a:rPr lang="fr-CA" sz="1200" u="none" strike="noStrike" dirty="0">
+                          <a:effectLst/>
+                        </a:rPr>
+                        <a:t> l'occurrence du risque</a:t>
+                      </a:r>
+                      <a:endParaRPr lang="fr-CA" sz="1200" b="1" i="0" u="none" strike="noStrike" dirty="0">
+                        <a:solidFill>
+                          <a:srgbClr val="000000"/>
+                        </a:solidFill>
+                        <a:effectLst/>
+                        <a:latin typeface="Calibri" panose="020F0502020204030204" pitchFamily="34" charset="0"/>
+                      </a:endParaRPr>
+                    </a:p>
+                  </a:txBody>
+                  <a:tcPr marL="2208" marR="2208" marT="2208" marB="0" anchor="ctr"/>
+                </a:tc>
+                <a:tc>
+                  <a:txBody>
+                    <a:bodyPr/>
+                    <a:lstStyle/>
+                    <a:p>
+                      <a:pPr algn="ctr" fontAlgn="ctr"/>
+                      <a:r>
+                        <a:rPr lang="fr-CA" sz="1200" u="none" strike="noStrike">
+                          <a:effectLst/>
+                        </a:rPr>
+                        <a:t>Coût en performance</a:t>
+                      </a:r>
+                      <a:br>
+                        <a:rPr lang="fr-CA" sz="1200" u="none" strike="noStrike">
+                          <a:effectLst/>
+                        </a:rPr>
+                      </a:br>
+                      <a:r>
+                        <a:rPr lang="fr-CA" sz="1200" u="none" strike="noStrike">
+                          <a:effectLst/>
+                        </a:rPr>
+                        <a:t> associé au risque</a:t>
+                      </a:r>
+                      <a:endParaRPr lang="fr-CA" sz="1200" b="1" i="0" u="none" strike="noStrike">
+                        <a:solidFill>
+                          <a:srgbClr val="000000"/>
+                        </a:solidFill>
+                        <a:effectLst/>
+                        <a:latin typeface="Calibri" panose="020F0502020204030204" pitchFamily="34" charset="0"/>
+                      </a:endParaRPr>
+                    </a:p>
+                  </a:txBody>
+                  <a:tcPr marL="2208" marR="2208" marT="2208" marB="0" anchor="ctr"/>
+                </a:tc>
+                <a:tc>
+                  <a:txBody>
+                    <a:bodyPr/>
+                    <a:lstStyle/>
+                    <a:p>
+                      <a:pPr algn="ctr" fontAlgn="ctr"/>
+                      <a:r>
+                        <a:rPr lang="fr-CA" sz="1200" u="none" strike="noStrike" dirty="0">
+                          <a:effectLst/>
+                        </a:rPr>
+                        <a:t>Probabilité d'occurrence</a:t>
+                      </a:r>
+                      <a:endParaRPr lang="fr-CA" sz="1200" b="1" i="0" u="none" strike="noStrike" dirty="0">
+                        <a:solidFill>
+                          <a:srgbClr val="000000"/>
+                        </a:solidFill>
+                        <a:effectLst/>
+                        <a:latin typeface="Calibri" panose="020F0502020204030204" pitchFamily="34" charset="0"/>
+                      </a:endParaRPr>
+                    </a:p>
+                  </a:txBody>
+                  <a:tcPr marL="2208" marR="2208" marT="2208" marB="0" anchor="ctr"/>
+                </a:tc>
+                <a:tc>
+                  <a:txBody>
+                    <a:bodyPr/>
+                    <a:lstStyle/>
+                    <a:p>
+                      <a:pPr algn="ctr" fontAlgn="ctr"/>
+                      <a:r>
+                        <a:rPr lang="fr-CA" sz="1200" u="none" strike="noStrike" dirty="0">
+                          <a:effectLst/>
+                        </a:rPr>
+                        <a:t>Plan de réduction</a:t>
+                      </a:r>
+                      <a:br>
+                        <a:rPr lang="fr-CA" sz="1200" u="none" strike="noStrike" dirty="0">
+                          <a:effectLst/>
+                        </a:rPr>
+                      </a:br>
+                      <a:r>
+                        <a:rPr lang="fr-CA" sz="1200" u="none" strike="noStrike" dirty="0">
+                          <a:effectLst/>
+                        </a:rPr>
+                        <a:t> du risque</a:t>
+                      </a:r>
+                      <a:endParaRPr lang="fr-CA" sz="1200" b="1" i="0" u="none" strike="noStrike" dirty="0">
+                        <a:solidFill>
+                          <a:srgbClr val="000000"/>
+                        </a:solidFill>
+                        <a:effectLst/>
+                        <a:latin typeface="Calibri" panose="020F0502020204030204" pitchFamily="34" charset="0"/>
+                      </a:endParaRPr>
+                    </a:p>
+                  </a:txBody>
+                  <a:tcPr marL="2208" marR="2208" marT="2208" marB="0" anchor="ctr"/>
+                </a:tc>
+                <a:tc>
+                  <a:txBody>
+                    <a:bodyPr/>
+                    <a:lstStyle/>
+                    <a:p>
+                      <a:pPr algn="ctr" fontAlgn="ctr"/>
+                      <a:r>
+                        <a:rPr lang="fr-CA" sz="1200" u="none" strike="noStrike">
+                          <a:effectLst/>
+                        </a:rPr>
+                        <a:t>Responsable du risque</a:t>
+                      </a:r>
+                      <a:endParaRPr lang="fr-CA" sz="1200" b="1" i="0" u="none" strike="noStrike">
+                        <a:solidFill>
+                          <a:srgbClr val="000000"/>
+                        </a:solidFill>
+                        <a:effectLst/>
+                        <a:latin typeface="Calibri" panose="020F0502020204030204" pitchFamily="34" charset="0"/>
+                      </a:endParaRPr>
+                    </a:p>
+                  </a:txBody>
+                  <a:tcPr marL="2208" marR="2208" marT="2208" marB="0" anchor="ctr"/>
+                </a:tc>
+              </a:tr>
+              <a:tr h="975028">
+                <a:tc>
+                  <a:txBody>
+                    <a:bodyPr/>
+                    <a:lstStyle/>
+                    <a:p>
+                      <a:pPr algn="ctr" fontAlgn="ctr"/>
+                      <a:r>
+                        <a:rPr lang="fr-CA" sz="1200" u="none" strike="noStrike">
+                          <a:effectLst/>
+                        </a:rPr>
+                        <a:t>Maladies ou </a:t>
+                      </a:r>
+                      <a:br>
+                        <a:rPr lang="fr-CA" sz="1200" u="none" strike="noStrike">
+                          <a:effectLst/>
+                        </a:rPr>
+                      </a:br>
+                      <a:r>
+                        <a:rPr lang="fr-CA" sz="1200" u="none" strike="noStrike">
+                          <a:effectLst/>
+                        </a:rPr>
+                        <a:t>incapacité d'un membre à continuer le projet</a:t>
+                      </a:r>
+                      <a:endParaRPr lang="fr-CA" sz="1200" b="0" i="0" u="none" strike="noStrike">
+                        <a:solidFill>
+                          <a:srgbClr val="000000"/>
+                        </a:solidFill>
+                        <a:effectLst/>
+                        <a:latin typeface="Calibri" panose="020F0502020204030204" pitchFamily="34" charset="0"/>
+                      </a:endParaRPr>
+                    </a:p>
+                  </a:txBody>
+                  <a:tcPr marL="2208" marR="2208" marT="2208" marB="0" anchor="ctr"/>
+                </a:tc>
+                <a:tc>
+                  <a:txBody>
+                    <a:bodyPr/>
+                    <a:lstStyle/>
+                    <a:p>
+                      <a:pPr algn="ctr" fontAlgn="ctr"/>
+                      <a:r>
+                        <a:rPr lang="fr-CA" sz="1200" u="none" strike="noStrike" dirty="0">
+                          <a:effectLst/>
+                        </a:rPr>
+                        <a:t>1</a:t>
+                      </a:r>
+                      <a:endParaRPr lang="fr-CA" sz="1200" b="0" i="0" u="none" strike="noStrike" dirty="0">
+                        <a:solidFill>
+                          <a:srgbClr val="000000"/>
+                        </a:solidFill>
+                        <a:effectLst/>
+                        <a:latin typeface="Calibri" panose="020F0502020204030204" pitchFamily="34" charset="0"/>
+                      </a:endParaRPr>
+                    </a:p>
+                  </a:txBody>
+                  <a:tcPr marL="2208" marR="2208" marT="2208" marB="0" anchor="ctr"/>
+                </a:tc>
+                <a:tc>
+                  <a:txBody>
+                    <a:bodyPr/>
+                    <a:lstStyle/>
+                    <a:p>
+                      <a:pPr algn="ctr" fontAlgn="ctr"/>
+                      <a:r>
+                        <a:rPr lang="fr-CA" sz="1200" u="none" strike="noStrike" dirty="0">
+                          <a:effectLst/>
+                        </a:rPr>
+                        <a:t>Travail en surplus</a:t>
+                      </a:r>
+                      <a:br>
+                        <a:rPr lang="fr-CA" sz="1200" u="none" strike="noStrike" dirty="0">
+                          <a:effectLst/>
+                        </a:rPr>
+                      </a:br>
+                      <a:r>
+                        <a:rPr lang="fr-CA" sz="1200" u="none" strike="noStrike" dirty="0">
+                          <a:effectLst/>
+                        </a:rPr>
+                        <a:t> à exécuter</a:t>
+                      </a:r>
+                      <a:endParaRPr lang="fr-CA" sz="1200" b="0" i="0" u="none" strike="noStrike" dirty="0">
+                        <a:solidFill>
+                          <a:srgbClr val="000000"/>
+                        </a:solidFill>
+                        <a:effectLst/>
+                        <a:latin typeface="Calibri" panose="020F0502020204030204" pitchFamily="34" charset="0"/>
+                      </a:endParaRPr>
+                    </a:p>
+                  </a:txBody>
+                  <a:tcPr marL="2208" marR="2208" marT="2208" marB="0" anchor="ctr"/>
+                </a:tc>
+                <a:tc>
+                  <a:txBody>
+                    <a:bodyPr/>
+                    <a:lstStyle/>
+                    <a:p>
+                      <a:pPr algn="ctr" fontAlgn="ctr"/>
+                      <a:r>
+                        <a:rPr lang="fr-CA" sz="1200" u="none" strike="noStrike">
+                          <a:effectLst/>
+                        </a:rPr>
+                        <a:t>Retard sur le projet</a:t>
+                      </a:r>
+                      <a:endParaRPr lang="fr-CA" sz="1200" b="0" i="0" u="none" strike="noStrike">
+                        <a:solidFill>
+                          <a:srgbClr val="000000"/>
+                        </a:solidFill>
+                        <a:effectLst/>
+                        <a:latin typeface="Calibri" panose="020F0502020204030204" pitchFamily="34" charset="0"/>
+                      </a:endParaRPr>
+                    </a:p>
+                  </a:txBody>
+                  <a:tcPr marL="2208" marR="2208" marT="2208" marB="0" anchor="ctr"/>
+                </a:tc>
+                <a:tc>
+                  <a:txBody>
+                    <a:bodyPr/>
+                    <a:lstStyle/>
+                    <a:p>
+                      <a:pPr algn="ctr" fontAlgn="ctr"/>
+                      <a:r>
+                        <a:rPr lang="fr-CA" sz="1200" u="none" strike="noStrike" dirty="0">
+                          <a:effectLst/>
+                        </a:rPr>
+                        <a:t>10%</a:t>
+                      </a:r>
+                      <a:endParaRPr lang="fr-CA" sz="1200" b="0" i="0" u="none" strike="noStrike" dirty="0">
+                        <a:solidFill>
+                          <a:srgbClr val="000000"/>
+                        </a:solidFill>
+                        <a:effectLst/>
+                        <a:latin typeface="Calibri" panose="020F0502020204030204" pitchFamily="34" charset="0"/>
+                      </a:endParaRPr>
+                    </a:p>
+                  </a:txBody>
+                  <a:tcPr marL="2208" marR="2208" marT="2208" marB="0" anchor="ctr"/>
+                </a:tc>
+                <a:tc>
+                  <a:txBody>
+                    <a:bodyPr/>
+                    <a:lstStyle/>
+                    <a:p>
+                      <a:pPr algn="ctr" fontAlgn="ctr"/>
+                      <a:r>
+                        <a:rPr lang="fr-CA" sz="1200" u="none" strike="noStrike">
+                          <a:effectLst/>
+                        </a:rPr>
+                        <a:t>Répartir le travail</a:t>
+                      </a:r>
+                      <a:br>
+                        <a:rPr lang="fr-CA" sz="1200" u="none" strike="noStrike">
+                          <a:effectLst/>
+                        </a:rPr>
+                      </a:br>
+                      <a:r>
+                        <a:rPr lang="fr-CA" sz="1200" u="none" strike="noStrike">
+                          <a:effectLst/>
+                        </a:rPr>
+                        <a:t> dans l'équipe</a:t>
+                      </a:r>
+                      <a:endParaRPr lang="fr-CA" sz="1200" b="0" i="0" u="none" strike="noStrike">
+                        <a:solidFill>
+                          <a:srgbClr val="000000"/>
+                        </a:solidFill>
+                        <a:effectLst/>
+                        <a:latin typeface="Calibri" panose="020F0502020204030204" pitchFamily="34" charset="0"/>
+                      </a:endParaRPr>
+                    </a:p>
+                  </a:txBody>
+                  <a:tcPr marL="2208" marR="2208" marT="2208" marB="0" anchor="ctr"/>
+                </a:tc>
+                <a:tc>
+                  <a:txBody>
+                    <a:bodyPr/>
+                    <a:lstStyle/>
+                    <a:p>
+                      <a:pPr algn="ctr" fontAlgn="ctr"/>
+                      <a:r>
+                        <a:rPr lang="fr-CA" sz="1200" u="none" strike="noStrike" dirty="0">
+                          <a:effectLst/>
+                        </a:rPr>
+                        <a:t>Daniel Thibodeau</a:t>
+                      </a:r>
+                      <a:endParaRPr lang="fr-CA" sz="1200" b="0" i="0" u="none" strike="noStrike" dirty="0">
+                        <a:solidFill>
+                          <a:srgbClr val="000000"/>
+                        </a:solidFill>
+                        <a:effectLst/>
+                        <a:latin typeface="Calibri" panose="020F0502020204030204" pitchFamily="34" charset="0"/>
+                      </a:endParaRPr>
+                    </a:p>
+                  </a:txBody>
+                  <a:tcPr marL="2208" marR="2208" marT="2208" marB="0" anchor="ctr"/>
+                </a:tc>
+              </a:tr>
+              <a:tr h="1364099">
+                <a:tc>
+                  <a:txBody>
+                    <a:bodyPr/>
+                    <a:lstStyle/>
+                    <a:p>
+                      <a:pPr algn="ctr" fontAlgn="ctr"/>
+                      <a:r>
+                        <a:rPr lang="fr-CA" sz="1200" u="none" strike="noStrike">
+                          <a:effectLst/>
+                        </a:rPr>
+                        <a:t>Délai de livraison</a:t>
+                      </a:r>
+                      <a:br>
+                        <a:rPr lang="fr-CA" sz="1200" u="none" strike="noStrike">
+                          <a:effectLst/>
+                        </a:rPr>
+                      </a:br>
+                      <a:r>
+                        <a:rPr lang="fr-CA" sz="1200" u="none" strike="noStrike">
+                          <a:effectLst/>
+                        </a:rPr>
+                        <a:t> du simulateur en temps réel non respecté</a:t>
+                      </a:r>
+                      <a:endParaRPr lang="fr-CA" sz="1200" b="0" i="0" u="none" strike="noStrike">
+                        <a:solidFill>
+                          <a:srgbClr val="000000"/>
+                        </a:solidFill>
+                        <a:effectLst/>
+                        <a:latin typeface="Calibri" panose="020F0502020204030204" pitchFamily="34" charset="0"/>
+                      </a:endParaRPr>
+                    </a:p>
+                  </a:txBody>
+                  <a:tcPr marL="2208" marR="2208" marT="2208" marB="0" anchor="ctr"/>
+                </a:tc>
+                <a:tc>
+                  <a:txBody>
+                    <a:bodyPr/>
+                    <a:lstStyle/>
+                    <a:p>
+                      <a:pPr algn="ctr" fontAlgn="ctr"/>
+                      <a:r>
+                        <a:rPr lang="fr-CA" sz="1200" u="none" strike="noStrike">
+                          <a:effectLst/>
+                        </a:rPr>
+                        <a:t>5</a:t>
+                      </a:r>
+                      <a:endParaRPr lang="fr-CA" sz="1200" b="0" i="0" u="none" strike="noStrike">
+                        <a:solidFill>
+                          <a:srgbClr val="000000"/>
+                        </a:solidFill>
+                        <a:effectLst/>
+                        <a:latin typeface="Calibri" panose="020F0502020204030204" pitchFamily="34" charset="0"/>
+                      </a:endParaRPr>
+                    </a:p>
+                  </a:txBody>
+                  <a:tcPr marL="2208" marR="2208" marT="2208" marB="0" anchor="ctr"/>
+                </a:tc>
+                <a:tc>
+                  <a:txBody>
+                    <a:bodyPr/>
+                    <a:lstStyle/>
+                    <a:p>
+                      <a:pPr algn="ctr" fontAlgn="ctr"/>
+                      <a:r>
+                        <a:rPr lang="fr-CA" sz="1200" u="none" strike="noStrike" dirty="0">
+                          <a:effectLst/>
+                        </a:rPr>
+                        <a:t>Impossibilité de</a:t>
+                      </a:r>
+                      <a:br>
+                        <a:rPr lang="fr-CA" sz="1200" u="none" strike="noStrike" dirty="0">
+                          <a:effectLst/>
+                        </a:rPr>
+                      </a:br>
+                      <a:r>
+                        <a:rPr lang="fr-CA" sz="1200" u="none" strike="noStrike" dirty="0">
+                          <a:effectLst/>
+                        </a:rPr>
+                        <a:t> faire la simulation en temps réel</a:t>
+                      </a:r>
+                      <a:endParaRPr lang="fr-CA" sz="1200" b="0" i="0" u="none" strike="noStrike" dirty="0">
+                        <a:solidFill>
+                          <a:srgbClr val="000000"/>
+                        </a:solidFill>
+                        <a:effectLst/>
+                        <a:latin typeface="Calibri" panose="020F0502020204030204" pitchFamily="34" charset="0"/>
+                      </a:endParaRPr>
+                    </a:p>
+                  </a:txBody>
+                  <a:tcPr marL="2208" marR="2208" marT="2208" marB="0" anchor="ctr"/>
+                </a:tc>
+                <a:tc>
+                  <a:txBody>
+                    <a:bodyPr/>
+                    <a:lstStyle/>
+                    <a:p>
+                      <a:pPr algn="ctr" fontAlgn="ctr"/>
+                      <a:r>
+                        <a:rPr lang="fr-CA" sz="1200" u="none" strike="noStrike">
+                          <a:effectLst/>
+                        </a:rPr>
+                        <a:t>Échéancier du projet</a:t>
+                      </a:r>
+                      <a:br>
+                        <a:rPr lang="fr-CA" sz="1200" u="none" strike="noStrike">
+                          <a:effectLst/>
+                        </a:rPr>
+                      </a:br>
+                      <a:r>
+                        <a:rPr lang="fr-CA" sz="1200" u="none" strike="noStrike">
+                          <a:effectLst/>
+                        </a:rPr>
+                        <a:t> non respecté</a:t>
+                      </a:r>
+                      <a:endParaRPr lang="fr-CA" sz="1200" b="0" i="0" u="none" strike="noStrike">
+                        <a:solidFill>
+                          <a:srgbClr val="000000"/>
+                        </a:solidFill>
+                        <a:effectLst/>
+                        <a:latin typeface="Calibri" panose="020F0502020204030204" pitchFamily="34" charset="0"/>
+                      </a:endParaRPr>
+                    </a:p>
+                  </a:txBody>
+                  <a:tcPr marL="2208" marR="2208" marT="2208" marB="0" anchor="ctr"/>
+                </a:tc>
+                <a:tc>
+                  <a:txBody>
+                    <a:bodyPr/>
+                    <a:lstStyle/>
+                    <a:p>
+                      <a:pPr algn="ctr" fontAlgn="ctr"/>
+                      <a:r>
+                        <a:rPr lang="fr-CA" sz="1200" u="none" strike="noStrike">
+                          <a:effectLst/>
+                        </a:rPr>
+                        <a:t>10%</a:t>
+                      </a:r>
+                      <a:endParaRPr lang="fr-CA" sz="1200" b="0" i="0" u="none" strike="noStrike">
+                        <a:solidFill>
+                          <a:srgbClr val="000000"/>
+                        </a:solidFill>
+                        <a:effectLst/>
+                        <a:latin typeface="Calibri" panose="020F0502020204030204" pitchFamily="34" charset="0"/>
+                      </a:endParaRPr>
+                    </a:p>
+                  </a:txBody>
+                  <a:tcPr marL="2208" marR="2208" marT="2208" marB="0" anchor="ctr"/>
+                </a:tc>
+                <a:tc>
+                  <a:txBody>
+                    <a:bodyPr/>
+                    <a:lstStyle/>
+                    <a:p>
+                      <a:pPr algn="ctr" fontAlgn="ctr"/>
+                      <a:r>
+                        <a:rPr lang="fr-CA" sz="1200" u="none" strike="noStrike">
+                          <a:effectLst/>
+                        </a:rPr>
+                        <a:t>Maintenir une communication efficace avec le LEEPCI dans l'optique de se servir du simulateur dès son arrivée</a:t>
+                      </a:r>
+                      <a:endParaRPr lang="fr-CA" sz="1200" b="0" i="0" u="none" strike="noStrike">
+                        <a:solidFill>
+                          <a:srgbClr val="000000"/>
+                        </a:solidFill>
+                        <a:effectLst/>
+                        <a:latin typeface="Calibri" panose="020F0502020204030204" pitchFamily="34" charset="0"/>
+                      </a:endParaRPr>
+                    </a:p>
+                  </a:txBody>
+                  <a:tcPr marL="2208" marR="2208" marT="2208" marB="0" anchor="ctr"/>
+                </a:tc>
+                <a:tc>
+                  <a:txBody>
+                    <a:bodyPr/>
+                    <a:lstStyle/>
+                    <a:p>
+                      <a:pPr algn="ctr" fontAlgn="ctr"/>
+                      <a:r>
+                        <a:rPr lang="fr-CA" sz="1200" u="none" strike="noStrike">
+                          <a:effectLst/>
+                        </a:rPr>
+                        <a:t>Gabriel Boivin</a:t>
+                      </a:r>
+                      <a:endParaRPr lang="fr-CA" sz="1200" b="0" i="0" u="none" strike="noStrike">
+                        <a:solidFill>
+                          <a:srgbClr val="000000"/>
+                        </a:solidFill>
+                        <a:effectLst/>
+                        <a:latin typeface="Calibri" panose="020F0502020204030204" pitchFamily="34" charset="0"/>
+                      </a:endParaRPr>
+                    </a:p>
+                  </a:txBody>
+                  <a:tcPr marL="2208" marR="2208" marT="2208" marB="0" anchor="ctr"/>
+                </a:tc>
+              </a:tr>
+              <a:tr h="2142242">
+                <a:tc>
+                  <a:txBody>
+                    <a:bodyPr/>
+                    <a:lstStyle/>
+                    <a:p>
+                      <a:pPr algn="ctr" fontAlgn="ctr"/>
+                      <a:r>
+                        <a:rPr lang="fr-CA" sz="1200" u="none" strike="noStrike">
+                          <a:effectLst/>
+                        </a:rPr>
+                        <a:t>Pertes des données liées aux simulateurs</a:t>
+                      </a:r>
+                      <a:endParaRPr lang="fr-CA" sz="1200" b="0" i="0" u="none" strike="noStrike">
+                        <a:solidFill>
+                          <a:srgbClr val="000000"/>
+                        </a:solidFill>
+                        <a:effectLst/>
+                        <a:latin typeface="Calibri" panose="020F0502020204030204" pitchFamily="34" charset="0"/>
+                      </a:endParaRPr>
+                    </a:p>
+                  </a:txBody>
+                  <a:tcPr marL="2208" marR="2208" marT="2208" marB="0" anchor="ctr"/>
+                </a:tc>
+                <a:tc>
+                  <a:txBody>
+                    <a:bodyPr/>
+                    <a:lstStyle/>
+                    <a:p>
+                      <a:pPr algn="ctr" fontAlgn="ctr"/>
+                      <a:r>
+                        <a:rPr lang="fr-CA" sz="1200" u="none" strike="noStrike" dirty="0">
+                          <a:effectLst/>
+                        </a:rPr>
+                        <a:t>5</a:t>
+                      </a:r>
+                      <a:endParaRPr lang="fr-CA" sz="1200" b="0" i="0" u="none" strike="noStrike" dirty="0">
+                        <a:solidFill>
+                          <a:srgbClr val="000000"/>
+                        </a:solidFill>
+                        <a:effectLst/>
+                        <a:latin typeface="Calibri" panose="020F0502020204030204" pitchFamily="34" charset="0"/>
+                      </a:endParaRPr>
+                    </a:p>
+                  </a:txBody>
+                  <a:tcPr marL="2208" marR="2208" marT="2208" marB="0" anchor="ctr"/>
+                </a:tc>
+                <a:tc>
+                  <a:txBody>
+                    <a:bodyPr/>
+                    <a:lstStyle/>
+                    <a:p>
+                      <a:pPr algn="ctr" fontAlgn="ctr"/>
+                      <a:r>
+                        <a:rPr lang="fr-CA" sz="1200" u="none" strike="noStrike" dirty="0">
+                          <a:effectLst/>
+                        </a:rPr>
+                        <a:t>Retard sur le projet mineur s'il existe une révision récente et retards majeurs dans le cas échéant</a:t>
+                      </a:r>
+                      <a:endParaRPr lang="fr-CA" sz="1200" b="0" i="0" u="none" strike="noStrike" dirty="0">
+                        <a:solidFill>
+                          <a:srgbClr val="000000"/>
+                        </a:solidFill>
+                        <a:effectLst/>
+                        <a:latin typeface="Calibri" panose="020F0502020204030204" pitchFamily="34" charset="0"/>
+                      </a:endParaRPr>
+                    </a:p>
+                  </a:txBody>
+                  <a:tcPr marL="2208" marR="2208" marT="2208" marB="0" anchor="ctr"/>
+                </a:tc>
+                <a:tc>
+                  <a:txBody>
+                    <a:bodyPr/>
+                    <a:lstStyle/>
+                    <a:p>
+                      <a:pPr algn="ctr" fontAlgn="ctr"/>
+                      <a:r>
+                        <a:rPr lang="fr-CA" sz="1200" u="none" strike="noStrike">
+                          <a:effectLst/>
+                        </a:rPr>
+                        <a:t>Certains objectifs ne seront pas atteints dans les temps initiaux prescrits</a:t>
+                      </a:r>
+                      <a:endParaRPr lang="fr-CA" sz="1200" b="0" i="0" u="none" strike="noStrike">
+                        <a:solidFill>
+                          <a:srgbClr val="000000"/>
+                        </a:solidFill>
+                        <a:effectLst/>
+                        <a:latin typeface="Calibri" panose="020F0502020204030204" pitchFamily="34" charset="0"/>
+                      </a:endParaRPr>
+                    </a:p>
+                  </a:txBody>
+                  <a:tcPr marL="2208" marR="2208" marT="2208" marB="0" anchor="ctr"/>
+                </a:tc>
+                <a:tc>
+                  <a:txBody>
+                    <a:bodyPr/>
+                    <a:lstStyle/>
+                    <a:p>
+                      <a:pPr algn="ctr" fontAlgn="ctr"/>
+                      <a:r>
+                        <a:rPr lang="fr-CA" sz="1200" u="none" strike="noStrike" dirty="0">
+                          <a:effectLst/>
+                        </a:rPr>
+                        <a:t>20%</a:t>
+                      </a:r>
+                      <a:endParaRPr lang="fr-CA" sz="1200" b="0" i="0" u="none" strike="noStrike" dirty="0">
+                        <a:solidFill>
+                          <a:srgbClr val="000000"/>
+                        </a:solidFill>
+                        <a:effectLst/>
+                        <a:latin typeface="Calibri" panose="020F0502020204030204" pitchFamily="34" charset="0"/>
+                      </a:endParaRPr>
+                    </a:p>
+                  </a:txBody>
+                  <a:tcPr marL="2208" marR="2208" marT="2208" marB="0" anchor="ctr"/>
+                </a:tc>
+                <a:tc>
+                  <a:txBody>
+                    <a:bodyPr/>
+                    <a:lstStyle/>
+                    <a:p>
+                      <a:pPr algn="ctr" fontAlgn="ctr"/>
+                      <a:r>
+                        <a:rPr lang="fr-CA" sz="1200" u="none" strike="noStrike">
+                          <a:effectLst/>
+                        </a:rPr>
+                        <a:t>S'assurer de bien maintenir les révisions à jour, travaille collaboratif mis fréquemment à jour et dont les changements sont réversibles au moyen d'une synchronisation sur un serveur web protégé (GitHub)</a:t>
+                      </a:r>
+                      <a:endParaRPr lang="fr-CA" sz="1200" b="0" i="0" u="none" strike="noStrike">
+                        <a:solidFill>
+                          <a:srgbClr val="000000"/>
+                        </a:solidFill>
+                        <a:effectLst/>
+                        <a:latin typeface="Calibri" panose="020F0502020204030204" pitchFamily="34" charset="0"/>
+                      </a:endParaRPr>
+                    </a:p>
+                  </a:txBody>
+                  <a:tcPr marL="2208" marR="2208" marT="2208" marB="0" anchor="ctr"/>
+                </a:tc>
+                <a:tc>
+                  <a:txBody>
+                    <a:bodyPr/>
+                    <a:lstStyle/>
+                    <a:p>
+                      <a:pPr algn="ctr" fontAlgn="ctr"/>
+                      <a:r>
+                        <a:rPr lang="fr-CA" sz="1200" u="none" strike="noStrike" dirty="0">
+                          <a:effectLst/>
+                        </a:rPr>
+                        <a:t>Francis Valois</a:t>
+                      </a:r>
+                      <a:endParaRPr lang="fr-CA" sz="1200" b="0" i="0" u="none" strike="noStrike" dirty="0">
+                        <a:solidFill>
+                          <a:srgbClr val="000000"/>
+                        </a:solidFill>
+                        <a:effectLst/>
+                        <a:latin typeface="Calibri" panose="020F0502020204030204" pitchFamily="34" charset="0"/>
+                      </a:endParaRPr>
+                    </a:p>
+                  </a:txBody>
+                  <a:tcPr marL="2208" marR="2208" marT="2208" marB="0" anchor="ctr"/>
+                </a:tc>
+              </a:tr>
+            </a:tbl>
+          </a:graphicData>
+        </a:graphic>
+      </p:graphicFrame>
+    </p:spTree>
+    <p:extLst>
+      <p:ext uri="{BB962C8B-B14F-4D97-AF65-F5344CB8AC3E}">
+        <p14:creationId xmlns:p14="http://schemas.microsoft.com/office/powerpoint/2010/main" val="478733809"/>
+      </p:ext>
+    </p:extLst>
+  </p:cSld>
+  <p:clrMapOvr>
+    <a:masterClrMapping/>
+  </p:clrMapOvr>
+  <p:timing>
+    <p:tnLst>
+      <p:par>
+        <p:cTn id="1" dur="indefinite" restart="never" nodeType="tmRoot"/>
+      </p:par>
+    </p:tnLst>
+  </p:timing>
+</p:sld>
+</file>
+
+<file path=ppt/slides/slide22.xml><?xml version="1.0" encoding="utf-8"?>
+<p:sld xmlns:a="http://schemas.openxmlformats.org/drawingml/2006/main" xmlns:r="http://schemas.openxmlformats.org/officeDocument/2006/relationships" xmlns:p="http://schemas.openxmlformats.org/presentationml/2006/main">
+  <p:cSld>
+    <p:spTree>
+      <p:nvGrpSpPr>
+        <p:cNvPr id="1" name=""/>
+        <p:cNvGrpSpPr/>
+        <p:nvPr/>
+      </p:nvGrpSpPr>
+      <p:grpSpPr>
+        <a:xfrm>
+          <a:off x="0" y="0"/>
+          <a:ext cx="0" cy="0"/>
+          <a:chOff x="0" y="0"/>
+          <a:chExt cx="0" cy="0"/>
+        </a:xfrm>
+      </p:grpSpPr>
+      <p:sp>
+        <p:nvSpPr>
+          <p:cNvPr id="2" name="Title 1"/>
+          <p:cNvSpPr>
+            <a:spLocks noGrp="1"/>
+          </p:cNvSpPr>
+          <p:nvPr>
+            <p:ph type="title"/>
+          </p:nvPr>
+        </p:nvSpPr>
+        <p:spPr/>
+        <p:txBody>
+          <a:bodyPr/>
+          <a:lstStyle/>
+          <a:p>
+            <a:r>
+              <a:rPr lang="en-US" dirty="0" err="1" smtClean="0"/>
+              <a:t>Registre</a:t>
+            </a:r>
+            <a:r>
+              <a:rPr lang="en-US" dirty="0" smtClean="0"/>
+              <a:t> de </a:t>
+            </a:r>
+            <a:r>
+              <a:rPr lang="en-US" dirty="0" err="1" smtClean="0"/>
+              <a:t>risques</a:t>
+            </a:r>
+            <a:r>
+              <a:rPr lang="en-US" dirty="0" smtClean="0"/>
+              <a:t> (2/4)</a:t>
+            </a:r>
+            <a:endParaRPr lang="en-US" dirty="0"/>
+          </a:p>
+        </p:txBody>
+      </p:sp>
+      <p:graphicFrame>
+        <p:nvGraphicFramePr>
+          <p:cNvPr id="3" name="Table 2"/>
+          <p:cNvGraphicFramePr>
+            <a:graphicFrameLocks noGrp="1"/>
+          </p:cNvGraphicFramePr>
+          <p:nvPr>
+            <p:extLst/>
+          </p:nvPr>
+        </p:nvGraphicFramePr>
+        <p:xfrm>
+          <a:off x="199251" y="1322820"/>
+          <a:ext cx="8837882" cy="5162389"/>
+        </p:xfrm>
+        <a:graphic>
+          <a:graphicData uri="http://schemas.openxmlformats.org/drawingml/2006/table">
+            <a:tbl>
+              <a:tblPr firstRow="1" firstCol="1" bandRow="1">
+                <a:tableStyleId>{5C22544A-7EE6-4342-B048-85BDC9FD1C3A}</a:tableStyleId>
+              </a:tblPr>
+              <a:tblGrid>
+                <a:gridCol w="928911"/>
+                <a:gridCol w="855023"/>
+                <a:gridCol w="1691183"/>
+                <a:gridCol w="1500882"/>
+                <a:gridCol w="893049"/>
+                <a:gridCol w="1730607"/>
+                <a:gridCol w="1238227"/>
+              </a:tblGrid>
+              <a:tr h="945367">
+                <a:tc>
+                  <a:txBody>
+                    <a:bodyPr/>
+                    <a:lstStyle/>
+                    <a:p>
+                      <a:pPr algn="ctr" fontAlgn="ctr"/>
+                      <a:r>
+                        <a:rPr lang="fr-CA" sz="1200" u="none" strike="noStrike" dirty="0">
+                          <a:effectLst/>
+                        </a:rPr>
+                        <a:t>Type de risque</a:t>
+                      </a:r>
+                      <a:endParaRPr lang="fr-CA" sz="1200" b="1" i="0" u="none" strike="noStrike" dirty="0">
+                        <a:solidFill>
+                          <a:srgbClr val="000000"/>
+                        </a:solidFill>
+                        <a:effectLst/>
+                        <a:latin typeface="Calibri" panose="020F0502020204030204" pitchFamily="34" charset="0"/>
+                      </a:endParaRPr>
+                    </a:p>
+                  </a:txBody>
+                  <a:tcPr marL="2208" marR="2208" marT="2208" marB="0" anchor="ctr"/>
+                </a:tc>
+                <a:tc>
+                  <a:txBody>
+                    <a:bodyPr/>
+                    <a:lstStyle/>
+                    <a:p>
+                      <a:pPr marL="0" indent="0" algn="ctr" fontAlgn="ctr">
+                        <a:tabLst>
+                          <a:tab pos="628650" algn="l"/>
+                        </a:tabLst>
+                      </a:pPr>
+                      <a:r>
+                        <a:rPr lang="fr-CA" sz="1200" u="none" strike="noStrike" dirty="0">
+                          <a:effectLst/>
+                        </a:rPr>
+                        <a:t>Niveau de priorité</a:t>
+                      </a:r>
+                      <a:br>
+                        <a:rPr lang="fr-CA" sz="1200" u="none" strike="noStrike" dirty="0">
+                          <a:effectLst/>
+                        </a:rPr>
+                      </a:br>
+                      <a:r>
+                        <a:rPr lang="fr-CA" sz="1200" u="none" strike="noStrike" dirty="0">
+                          <a:effectLst/>
+                        </a:rPr>
+                        <a:t>(1 faible, 5 élevé)</a:t>
+                      </a:r>
+                      <a:endParaRPr lang="fr-CA" sz="1200" b="1" i="0" u="none" strike="noStrike" dirty="0">
+                        <a:solidFill>
+                          <a:srgbClr val="000000"/>
+                        </a:solidFill>
+                        <a:effectLst/>
+                        <a:latin typeface="Calibri" panose="020F0502020204030204" pitchFamily="34" charset="0"/>
+                      </a:endParaRPr>
+                    </a:p>
+                  </a:txBody>
+                  <a:tcPr marL="2208" marR="2208" marT="2208" marB="0" anchor="ctr"/>
+                </a:tc>
+                <a:tc>
+                  <a:txBody>
+                    <a:bodyPr/>
+                    <a:lstStyle/>
+                    <a:p>
+                      <a:pPr algn="ctr" fontAlgn="ctr"/>
+                      <a:r>
+                        <a:rPr lang="fr-CA" sz="1200" u="none" strike="noStrike" dirty="0">
+                          <a:effectLst/>
+                        </a:rPr>
+                        <a:t>Conséquence de</a:t>
+                      </a:r>
+                      <a:br>
+                        <a:rPr lang="fr-CA" sz="1200" u="none" strike="noStrike" dirty="0">
+                          <a:effectLst/>
+                        </a:rPr>
+                      </a:br>
+                      <a:r>
+                        <a:rPr lang="fr-CA" sz="1200" u="none" strike="noStrike" dirty="0">
+                          <a:effectLst/>
+                        </a:rPr>
+                        <a:t> l'occurrence du risque</a:t>
+                      </a:r>
+                      <a:endParaRPr lang="fr-CA" sz="1200" b="1" i="0" u="none" strike="noStrike" dirty="0">
+                        <a:solidFill>
+                          <a:srgbClr val="000000"/>
+                        </a:solidFill>
+                        <a:effectLst/>
+                        <a:latin typeface="Calibri" panose="020F0502020204030204" pitchFamily="34" charset="0"/>
+                      </a:endParaRPr>
+                    </a:p>
+                  </a:txBody>
+                  <a:tcPr marL="2208" marR="2208" marT="2208" marB="0" anchor="ctr"/>
+                </a:tc>
+                <a:tc>
+                  <a:txBody>
+                    <a:bodyPr/>
+                    <a:lstStyle/>
+                    <a:p>
+                      <a:pPr algn="ctr" fontAlgn="ctr"/>
+                      <a:r>
+                        <a:rPr lang="fr-CA" sz="1200" u="none" strike="noStrike" dirty="0">
+                          <a:effectLst/>
+                        </a:rPr>
+                        <a:t>Coût en performance</a:t>
+                      </a:r>
+                      <a:br>
+                        <a:rPr lang="fr-CA" sz="1200" u="none" strike="noStrike" dirty="0">
+                          <a:effectLst/>
+                        </a:rPr>
+                      </a:br>
+                      <a:r>
+                        <a:rPr lang="fr-CA" sz="1200" u="none" strike="noStrike" dirty="0">
+                          <a:effectLst/>
+                        </a:rPr>
+                        <a:t> associé au risque</a:t>
+                      </a:r>
+                      <a:endParaRPr lang="fr-CA" sz="1200" b="1" i="0" u="none" strike="noStrike" dirty="0">
+                        <a:solidFill>
+                          <a:srgbClr val="000000"/>
+                        </a:solidFill>
+                        <a:effectLst/>
+                        <a:latin typeface="Calibri" panose="020F0502020204030204" pitchFamily="34" charset="0"/>
+                      </a:endParaRPr>
+                    </a:p>
+                  </a:txBody>
+                  <a:tcPr marL="2208" marR="2208" marT="2208" marB="0" anchor="ctr"/>
+                </a:tc>
+                <a:tc>
+                  <a:txBody>
+                    <a:bodyPr/>
+                    <a:lstStyle/>
+                    <a:p>
+                      <a:pPr algn="ctr" fontAlgn="ctr"/>
+                      <a:r>
+                        <a:rPr lang="fr-CA" sz="1200" u="none" strike="noStrike" dirty="0">
+                          <a:effectLst/>
+                        </a:rPr>
+                        <a:t>Probabilité d'occurrence</a:t>
+                      </a:r>
+                      <a:endParaRPr lang="fr-CA" sz="1200" b="1" i="0" u="none" strike="noStrike" dirty="0">
+                        <a:solidFill>
+                          <a:srgbClr val="000000"/>
+                        </a:solidFill>
+                        <a:effectLst/>
+                        <a:latin typeface="Calibri" panose="020F0502020204030204" pitchFamily="34" charset="0"/>
+                      </a:endParaRPr>
+                    </a:p>
+                  </a:txBody>
+                  <a:tcPr marL="2208" marR="2208" marT="2208" marB="0" anchor="ctr"/>
+                </a:tc>
+                <a:tc>
+                  <a:txBody>
+                    <a:bodyPr/>
+                    <a:lstStyle/>
+                    <a:p>
+                      <a:pPr algn="ctr" fontAlgn="ctr"/>
+                      <a:r>
+                        <a:rPr lang="fr-CA" sz="1200" u="none" strike="noStrike" dirty="0">
+                          <a:effectLst/>
+                        </a:rPr>
+                        <a:t>Plan de réduction</a:t>
+                      </a:r>
+                      <a:br>
+                        <a:rPr lang="fr-CA" sz="1200" u="none" strike="noStrike" dirty="0">
+                          <a:effectLst/>
+                        </a:rPr>
+                      </a:br>
+                      <a:r>
+                        <a:rPr lang="fr-CA" sz="1200" u="none" strike="noStrike" dirty="0">
+                          <a:effectLst/>
+                        </a:rPr>
+                        <a:t> du risque</a:t>
+                      </a:r>
+                      <a:endParaRPr lang="fr-CA" sz="1200" b="1" i="0" u="none" strike="noStrike" dirty="0">
+                        <a:solidFill>
+                          <a:srgbClr val="000000"/>
+                        </a:solidFill>
+                        <a:effectLst/>
+                        <a:latin typeface="Calibri" panose="020F0502020204030204" pitchFamily="34" charset="0"/>
+                      </a:endParaRPr>
+                    </a:p>
+                  </a:txBody>
+                  <a:tcPr marL="2208" marR="2208" marT="2208" marB="0" anchor="ctr"/>
+                </a:tc>
+                <a:tc>
+                  <a:txBody>
+                    <a:bodyPr/>
+                    <a:lstStyle/>
+                    <a:p>
+                      <a:pPr algn="ctr" fontAlgn="ctr"/>
+                      <a:r>
+                        <a:rPr lang="fr-CA" sz="1200" u="none" strike="noStrike" dirty="0">
+                          <a:effectLst/>
+                        </a:rPr>
+                        <a:t>Responsable du risque</a:t>
+                      </a:r>
+                      <a:endParaRPr lang="fr-CA" sz="1200" b="1" i="0" u="none" strike="noStrike" dirty="0">
+                        <a:solidFill>
+                          <a:srgbClr val="000000"/>
+                        </a:solidFill>
+                        <a:effectLst/>
+                        <a:latin typeface="Calibri" panose="020F0502020204030204" pitchFamily="34" charset="0"/>
+                      </a:endParaRPr>
+                    </a:p>
+                  </a:txBody>
+                  <a:tcPr marL="2208" marR="2208" marT="2208" marB="0" anchor="ctr"/>
+                </a:tc>
+              </a:tr>
+              <a:tr h="1509448">
+                <a:tc>
+                  <a:txBody>
+                    <a:bodyPr/>
+                    <a:lstStyle/>
+                    <a:p>
+                      <a:pPr algn="ctr" fontAlgn="ctr"/>
+                      <a:r>
+                        <a:rPr lang="fr-CA" sz="1200" u="none" strike="noStrike" dirty="0">
+                          <a:effectLst/>
+                        </a:rPr>
+                        <a:t>Versions  de développement et d'utilisation différentes de Matlab </a:t>
+                      </a:r>
+                      <a:endParaRPr lang="fr-CA" sz="1200" b="0" i="0" u="none" strike="noStrike" dirty="0">
+                        <a:solidFill>
+                          <a:srgbClr val="000000"/>
+                        </a:solidFill>
+                        <a:effectLst/>
+                        <a:latin typeface="Calibri" panose="020F0502020204030204" pitchFamily="34" charset="0"/>
+                      </a:endParaRPr>
+                    </a:p>
+                  </a:txBody>
+                  <a:tcPr marL="5391" marR="5391" marT="5391" marB="0" anchor="ctr"/>
+                </a:tc>
+                <a:tc>
+                  <a:txBody>
+                    <a:bodyPr/>
+                    <a:lstStyle/>
+                    <a:p>
+                      <a:pPr algn="ctr" fontAlgn="ctr"/>
+                      <a:r>
+                        <a:rPr lang="fr-CA" sz="1200" u="none" strike="noStrike" dirty="0">
+                          <a:effectLst/>
+                        </a:rPr>
+                        <a:t>4</a:t>
+                      </a:r>
+                      <a:endParaRPr lang="fr-CA" sz="1200" b="0" i="0" u="none" strike="noStrike" dirty="0">
+                        <a:solidFill>
+                          <a:srgbClr val="000000"/>
+                        </a:solidFill>
+                        <a:effectLst/>
+                        <a:latin typeface="Calibri" panose="020F0502020204030204" pitchFamily="34" charset="0"/>
+                      </a:endParaRPr>
+                    </a:p>
+                  </a:txBody>
+                  <a:tcPr marL="5391" marR="5391" marT="5391" marB="0" anchor="ctr"/>
+                </a:tc>
+                <a:tc>
+                  <a:txBody>
+                    <a:bodyPr/>
+                    <a:lstStyle/>
+                    <a:p>
+                      <a:pPr algn="ctr" fontAlgn="ctr"/>
+                      <a:r>
+                        <a:rPr lang="fr-CA" sz="1200" u="none" strike="noStrike" dirty="0">
+                          <a:effectLst/>
+                        </a:rPr>
+                        <a:t>Certaines fonctionnalités du simulateur en temps réel ne pourraient pas concorder, certains modules de </a:t>
+                      </a:r>
+                      <a:r>
+                        <a:rPr lang="fr-CA" sz="1200" u="none" strike="noStrike" dirty="0" err="1">
+                          <a:effectLst/>
+                        </a:rPr>
+                        <a:t>simulink</a:t>
+                      </a:r>
+                      <a:r>
+                        <a:rPr lang="fr-CA" sz="1200" u="none" strike="noStrike" dirty="0">
+                          <a:effectLst/>
+                        </a:rPr>
+                        <a:t> ou certaines fonctionnalités de Matlab pourraient ne pas être compatibles</a:t>
+                      </a:r>
+                      <a:br>
+                        <a:rPr lang="fr-CA" sz="1200" u="none" strike="noStrike" dirty="0">
+                          <a:effectLst/>
+                        </a:rPr>
+                      </a:br>
+                      <a:endParaRPr lang="fr-CA" sz="1200" b="0" i="0" u="none" strike="noStrike" dirty="0">
+                        <a:solidFill>
+                          <a:srgbClr val="000000"/>
+                        </a:solidFill>
+                        <a:effectLst/>
+                        <a:latin typeface="Calibri" panose="020F0502020204030204" pitchFamily="34" charset="0"/>
+                      </a:endParaRPr>
+                    </a:p>
+                  </a:txBody>
+                  <a:tcPr marL="5391" marR="5391" marT="5391" marB="0" anchor="ctr"/>
+                </a:tc>
+                <a:tc>
+                  <a:txBody>
+                    <a:bodyPr/>
+                    <a:lstStyle/>
+                    <a:p>
+                      <a:pPr algn="ctr" fontAlgn="ctr"/>
+                      <a:r>
+                        <a:rPr lang="fr-CA" sz="1200" u="none" strike="noStrike" dirty="0">
+                          <a:effectLst/>
+                        </a:rPr>
+                        <a:t>Incapacité de fournir un simulateur fonctionnant explicitement comme décrit dans la documentation, besoin d'effectuer des modifications internes importantes, du côté du client, pour maintenir le fonctionnement désiré du simulateur</a:t>
+                      </a:r>
+                      <a:br>
+                        <a:rPr lang="fr-CA" sz="1200" u="none" strike="noStrike" dirty="0">
+                          <a:effectLst/>
+                        </a:rPr>
+                      </a:br>
+                      <a:endParaRPr lang="fr-CA" sz="1200" b="0" i="0" u="none" strike="noStrike" dirty="0">
+                        <a:solidFill>
+                          <a:srgbClr val="000000"/>
+                        </a:solidFill>
+                        <a:effectLst/>
+                        <a:latin typeface="Calibri" panose="020F0502020204030204" pitchFamily="34" charset="0"/>
+                      </a:endParaRPr>
+                    </a:p>
+                  </a:txBody>
+                  <a:tcPr marL="5391" marR="5391" marT="5391" marB="0" anchor="ctr"/>
+                </a:tc>
+                <a:tc>
+                  <a:txBody>
+                    <a:bodyPr/>
+                    <a:lstStyle/>
+                    <a:p>
+                      <a:pPr algn="ctr" fontAlgn="ctr"/>
+                      <a:r>
+                        <a:rPr lang="fr-CA" sz="1200" u="none" strike="noStrike" dirty="0">
+                          <a:effectLst/>
+                        </a:rPr>
+                        <a:t>15%</a:t>
+                      </a:r>
+                      <a:endParaRPr lang="fr-CA" sz="1200" b="0" i="0" u="none" strike="noStrike" dirty="0">
+                        <a:solidFill>
+                          <a:srgbClr val="000000"/>
+                        </a:solidFill>
+                        <a:effectLst/>
+                        <a:latin typeface="Calibri" panose="020F0502020204030204" pitchFamily="34" charset="0"/>
+                      </a:endParaRPr>
+                    </a:p>
+                  </a:txBody>
+                  <a:tcPr marL="5391" marR="5391" marT="5391" marB="0" anchor="ctr"/>
+                </a:tc>
+                <a:tc>
+                  <a:txBody>
+                    <a:bodyPr/>
+                    <a:lstStyle/>
+                    <a:p>
+                      <a:pPr algn="ctr" fontAlgn="ctr"/>
+                      <a:r>
+                        <a:rPr lang="fr-CA" sz="1200" u="none" strike="noStrike">
+                          <a:effectLst/>
+                        </a:rPr>
+                        <a:t>Faire des tests à partir de différentes plateformes et à partir de différents systèmes d'exploitation de manière à s'assurer l'homogénéité dans le fonctionnement de Matlab</a:t>
+                      </a:r>
+                      <a:endParaRPr lang="fr-CA" sz="1200" b="0" i="0" u="none" strike="noStrike">
+                        <a:solidFill>
+                          <a:srgbClr val="000000"/>
+                        </a:solidFill>
+                        <a:effectLst/>
+                        <a:latin typeface="Calibri" panose="020F0502020204030204" pitchFamily="34" charset="0"/>
+                      </a:endParaRPr>
+                    </a:p>
+                  </a:txBody>
+                  <a:tcPr marL="5391" marR="5391" marT="5391" marB="0" anchor="ctr"/>
+                </a:tc>
+                <a:tc>
+                  <a:txBody>
+                    <a:bodyPr/>
+                    <a:lstStyle/>
+                    <a:p>
+                      <a:pPr algn="ctr" fontAlgn="ctr"/>
+                      <a:r>
+                        <a:rPr lang="fr-CA" sz="1200" u="none" strike="noStrike">
+                          <a:effectLst/>
+                        </a:rPr>
+                        <a:t>Francis Valois</a:t>
+                      </a:r>
+                      <a:endParaRPr lang="fr-CA" sz="1200" b="0" i="0" u="none" strike="noStrike">
+                        <a:solidFill>
+                          <a:srgbClr val="000000"/>
+                        </a:solidFill>
+                        <a:effectLst/>
+                        <a:latin typeface="Calibri" panose="020F0502020204030204" pitchFamily="34" charset="0"/>
+                      </a:endParaRPr>
+                    </a:p>
+                  </a:txBody>
+                  <a:tcPr marL="5391" marR="5391" marT="5391" marB="0" anchor="ctr"/>
+                </a:tc>
+              </a:tr>
+              <a:tr h="862542">
+                <a:tc>
+                  <a:txBody>
+                    <a:bodyPr/>
+                    <a:lstStyle/>
+                    <a:p>
+                      <a:pPr algn="ctr" fontAlgn="ctr"/>
+                      <a:r>
+                        <a:rPr lang="fr-CA" sz="1200" u="none" strike="noStrike">
+                          <a:effectLst/>
+                        </a:rPr>
+                        <a:t>Disconcordance dans les versions de PSIM </a:t>
+                      </a:r>
+                      <a:endParaRPr lang="fr-CA" sz="1200" b="0" i="0" u="none" strike="noStrike">
+                        <a:solidFill>
+                          <a:srgbClr val="000000"/>
+                        </a:solidFill>
+                        <a:effectLst/>
+                        <a:latin typeface="Calibri" panose="020F0502020204030204" pitchFamily="34" charset="0"/>
+                      </a:endParaRPr>
+                    </a:p>
+                  </a:txBody>
+                  <a:tcPr marL="5391" marR="5391" marT="5391" marB="0" anchor="ctr"/>
+                </a:tc>
+                <a:tc>
+                  <a:txBody>
+                    <a:bodyPr/>
+                    <a:lstStyle/>
+                    <a:p>
+                      <a:pPr algn="ctr" fontAlgn="ctr"/>
+                      <a:r>
+                        <a:rPr lang="fr-CA" sz="1200" u="none" strike="noStrike">
+                          <a:effectLst/>
+                        </a:rPr>
+                        <a:t>3</a:t>
+                      </a:r>
+                      <a:endParaRPr lang="fr-CA" sz="1200" b="0" i="0" u="none" strike="noStrike">
+                        <a:solidFill>
+                          <a:srgbClr val="000000"/>
+                        </a:solidFill>
+                        <a:effectLst/>
+                        <a:latin typeface="Calibri" panose="020F0502020204030204" pitchFamily="34" charset="0"/>
+                      </a:endParaRPr>
+                    </a:p>
+                  </a:txBody>
+                  <a:tcPr marL="5391" marR="5391" marT="5391" marB="0" anchor="ctr"/>
+                </a:tc>
+                <a:tc>
+                  <a:txBody>
+                    <a:bodyPr/>
+                    <a:lstStyle/>
+                    <a:p>
+                      <a:pPr algn="ctr" fontAlgn="ctr"/>
+                      <a:r>
+                        <a:rPr lang="fr-CA" sz="1200" u="none" strike="noStrike">
+                          <a:effectLst/>
+                        </a:rPr>
+                        <a:t>Certaines fonctionnalités du simulateur implanté sur PSIM pourraient être différentes selon la version employée.</a:t>
+                      </a:r>
+                      <a:br>
+                        <a:rPr lang="fr-CA" sz="1200" u="none" strike="noStrike">
+                          <a:effectLst/>
+                        </a:rPr>
+                      </a:br>
+                      <a:endParaRPr lang="fr-CA" sz="1200" b="0" i="0" u="none" strike="noStrike">
+                        <a:solidFill>
+                          <a:srgbClr val="000000"/>
+                        </a:solidFill>
+                        <a:effectLst/>
+                        <a:latin typeface="Calibri" panose="020F0502020204030204" pitchFamily="34" charset="0"/>
+                      </a:endParaRPr>
+                    </a:p>
+                  </a:txBody>
+                  <a:tcPr marL="5391" marR="5391" marT="5391" marB="0" anchor="ctr"/>
+                </a:tc>
+                <a:tc>
+                  <a:txBody>
+                    <a:bodyPr/>
+                    <a:lstStyle/>
+                    <a:p>
+                      <a:pPr algn="ctr" fontAlgn="ctr"/>
+                      <a:r>
+                        <a:rPr lang="fr-CA" sz="1200" u="none" strike="noStrike">
+                          <a:effectLst/>
+                        </a:rPr>
+                        <a:t>Différence dans les résultats produits à partir du simulateur implanté sur PSIM, il se peut que les résultats ne concordent plus avec les autres simulateurs</a:t>
+                      </a:r>
+                      <a:endParaRPr lang="fr-CA" sz="1200" b="0" i="0" u="none" strike="noStrike">
+                        <a:solidFill>
+                          <a:srgbClr val="000000"/>
+                        </a:solidFill>
+                        <a:effectLst/>
+                        <a:latin typeface="Calibri" panose="020F0502020204030204" pitchFamily="34" charset="0"/>
+                      </a:endParaRPr>
+                    </a:p>
+                  </a:txBody>
+                  <a:tcPr marL="5391" marR="5391" marT="5391" marB="0" anchor="ctr"/>
+                </a:tc>
+                <a:tc>
+                  <a:txBody>
+                    <a:bodyPr/>
+                    <a:lstStyle/>
+                    <a:p>
+                      <a:pPr algn="ctr" fontAlgn="ctr"/>
+                      <a:r>
+                        <a:rPr lang="fr-CA" sz="1200" u="none" strike="noStrike">
+                          <a:effectLst/>
+                        </a:rPr>
+                        <a:t>10%</a:t>
+                      </a:r>
+                      <a:endParaRPr lang="fr-CA" sz="1200" b="0" i="0" u="none" strike="noStrike">
+                        <a:solidFill>
+                          <a:srgbClr val="000000"/>
+                        </a:solidFill>
+                        <a:effectLst/>
+                        <a:latin typeface="Calibri" panose="020F0502020204030204" pitchFamily="34" charset="0"/>
+                      </a:endParaRPr>
+                    </a:p>
+                  </a:txBody>
+                  <a:tcPr marL="5391" marR="5391" marT="5391" marB="0" anchor="ctr"/>
+                </a:tc>
+                <a:tc>
+                  <a:txBody>
+                    <a:bodyPr/>
+                    <a:lstStyle/>
+                    <a:p>
+                      <a:pPr algn="ctr" fontAlgn="ctr"/>
+                      <a:r>
+                        <a:rPr lang="fr-CA" sz="1200" u="none" strike="noStrike" dirty="0">
+                          <a:effectLst/>
+                        </a:rPr>
+                        <a:t>Tester le simulateur sur le plus de versions différentes de PSIM</a:t>
+                      </a:r>
+                      <a:endParaRPr lang="fr-CA" sz="1200" b="0" i="0" u="none" strike="noStrike" dirty="0">
+                        <a:solidFill>
+                          <a:srgbClr val="000000"/>
+                        </a:solidFill>
+                        <a:effectLst/>
+                        <a:latin typeface="Calibri" panose="020F0502020204030204" pitchFamily="34" charset="0"/>
+                      </a:endParaRPr>
+                    </a:p>
+                  </a:txBody>
+                  <a:tcPr marL="5391" marR="5391" marT="5391" marB="0" anchor="ctr"/>
+                </a:tc>
+                <a:tc>
+                  <a:txBody>
+                    <a:bodyPr/>
+                    <a:lstStyle/>
+                    <a:p>
+                      <a:pPr algn="ctr" fontAlgn="ctr"/>
+                      <a:r>
+                        <a:rPr lang="fr-CA" sz="1200" u="none" strike="noStrike" dirty="0">
+                          <a:effectLst/>
+                        </a:rPr>
+                        <a:t>Francis Valois</a:t>
+                      </a:r>
+                      <a:endParaRPr lang="fr-CA" sz="1200" b="0" i="0" u="none" strike="noStrike" dirty="0">
+                        <a:solidFill>
+                          <a:srgbClr val="000000"/>
+                        </a:solidFill>
+                        <a:effectLst/>
+                        <a:latin typeface="Calibri" panose="020F0502020204030204" pitchFamily="34" charset="0"/>
+                      </a:endParaRPr>
+                    </a:p>
+                  </a:txBody>
+                  <a:tcPr marL="5391" marR="5391" marT="5391" marB="0" anchor="ctr"/>
+                </a:tc>
+              </a:tr>
+            </a:tbl>
+          </a:graphicData>
+        </a:graphic>
+      </p:graphicFrame>
+    </p:spTree>
+    <p:extLst>
+      <p:ext uri="{BB962C8B-B14F-4D97-AF65-F5344CB8AC3E}">
+        <p14:creationId xmlns:p14="http://schemas.microsoft.com/office/powerpoint/2010/main" val="4010830961"/>
+      </p:ext>
+    </p:extLst>
+  </p:cSld>
+  <p:clrMapOvr>
+    <a:masterClrMapping/>
+  </p:clrMapOvr>
+  <p:timing>
+    <p:tnLst>
+      <p:par>
+        <p:cTn id="1" dur="indefinite" restart="never" nodeType="tmRoot"/>
+      </p:par>
+    </p:tnLst>
+  </p:timing>
+</p:sld>
+</file>
+
+<file path=ppt/slides/slide23.xml><?xml version="1.0" encoding="utf-8"?>
+<p:sld xmlns:a="http://schemas.openxmlformats.org/drawingml/2006/main" xmlns:r="http://schemas.openxmlformats.org/officeDocument/2006/relationships" xmlns:p="http://schemas.openxmlformats.org/presentationml/2006/main">
+  <p:cSld>
+    <p:spTree>
+      <p:nvGrpSpPr>
+        <p:cNvPr id="1" name=""/>
+        <p:cNvGrpSpPr/>
+        <p:nvPr/>
+      </p:nvGrpSpPr>
+      <p:grpSpPr>
+        <a:xfrm>
+          <a:off x="0" y="0"/>
+          <a:ext cx="0" cy="0"/>
+          <a:chOff x="0" y="0"/>
+          <a:chExt cx="0" cy="0"/>
+        </a:xfrm>
+      </p:grpSpPr>
+      <p:sp>
+        <p:nvSpPr>
+          <p:cNvPr id="2" name="Title 1"/>
+          <p:cNvSpPr>
+            <a:spLocks noGrp="1"/>
+          </p:cNvSpPr>
+          <p:nvPr>
+            <p:ph type="title"/>
+          </p:nvPr>
+        </p:nvSpPr>
+        <p:spPr/>
+        <p:txBody>
+          <a:bodyPr/>
+          <a:lstStyle/>
+          <a:p>
+            <a:r>
+              <a:rPr lang="en-US" dirty="0" err="1" smtClean="0"/>
+              <a:t>Registre</a:t>
+            </a:r>
+            <a:r>
+              <a:rPr lang="en-US" dirty="0" smtClean="0"/>
+              <a:t> de </a:t>
+            </a:r>
+            <a:r>
+              <a:rPr lang="en-US" dirty="0" err="1" smtClean="0"/>
+              <a:t>risques</a:t>
+            </a:r>
+            <a:r>
+              <a:rPr lang="en-US" dirty="0" smtClean="0"/>
+              <a:t> (3/4)</a:t>
+            </a:r>
+            <a:endParaRPr lang="en-US" dirty="0"/>
+          </a:p>
+        </p:txBody>
+      </p:sp>
+      <p:graphicFrame>
+        <p:nvGraphicFramePr>
+          <p:cNvPr id="3" name="Table 2"/>
+          <p:cNvGraphicFramePr>
+            <a:graphicFrameLocks noGrp="1"/>
+          </p:cNvGraphicFramePr>
+          <p:nvPr>
+            <p:extLst/>
+          </p:nvPr>
+        </p:nvGraphicFramePr>
+        <p:xfrm>
+          <a:off x="199251" y="1370320"/>
+          <a:ext cx="8837882" cy="4519840"/>
+        </p:xfrm>
+        <a:graphic>
+          <a:graphicData uri="http://schemas.openxmlformats.org/drawingml/2006/table">
+            <a:tbl>
+              <a:tblPr firstRow="1" firstCol="1" bandRow="1">
+                <a:tableStyleId>{5C22544A-7EE6-4342-B048-85BDC9FD1C3A}</a:tableStyleId>
+              </a:tblPr>
+              <a:tblGrid>
+                <a:gridCol w="928911"/>
+                <a:gridCol w="855023"/>
+                <a:gridCol w="1691183"/>
+                <a:gridCol w="1500882"/>
+                <a:gridCol w="893049"/>
+                <a:gridCol w="1730607"/>
+                <a:gridCol w="1238227"/>
+              </a:tblGrid>
+              <a:tr h="945367">
+                <a:tc>
+                  <a:txBody>
+                    <a:bodyPr/>
+                    <a:lstStyle/>
+                    <a:p>
+                      <a:pPr algn="ctr" fontAlgn="ctr"/>
+                      <a:r>
+                        <a:rPr lang="fr-CA" sz="1200" u="none" strike="noStrike" dirty="0">
+                          <a:effectLst/>
+                        </a:rPr>
+                        <a:t>Type de risque</a:t>
+                      </a:r>
+                      <a:endParaRPr lang="fr-CA" sz="1200" b="1" i="0" u="none" strike="noStrike" dirty="0">
+                        <a:solidFill>
+                          <a:srgbClr val="000000"/>
+                        </a:solidFill>
+                        <a:effectLst/>
+                        <a:latin typeface="Calibri" panose="020F0502020204030204" pitchFamily="34" charset="0"/>
+                      </a:endParaRPr>
+                    </a:p>
+                  </a:txBody>
+                  <a:tcPr marL="2208" marR="2208" marT="2208" marB="0" anchor="ctr"/>
+                </a:tc>
+                <a:tc>
+                  <a:txBody>
+                    <a:bodyPr/>
+                    <a:lstStyle/>
+                    <a:p>
+                      <a:pPr marL="0" indent="0" algn="ctr" fontAlgn="ctr">
+                        <a:tabLst>
+                          <a:tab pos="628650" algn="l"/>
+                        </a:tabLst>
+                      </a:pPr>
+                      <a:r>
+                        <a:rPr lang="fr-CA" sz="1200" u="none" strike="noStrike" dirty="0">
+                          <a:effectLst/>
+                        </a:rPr>
+                        <a:t>Niveau de priorité</a:t>
+                      </a:r>
+                      <a:br>
+                        <a:rPr lang="fr-CA" sz="1200" u="none" strike="noStrike" dirty="0">
+                          <a:effectLst/>
+                        </a:rPr>
+                      </a:br>
+                      <a:r>
+                        <a:rPr lang="fr-CA" sz="1200" u="none" strike="noStrike" dirty="0">
+                          <a:effectLst/>
+                        </a:rPr>
+                        <a:t>(1 faible, 5 élevé)</a:t>
+                      </a:r>
+                      <a:endParaRPr lang="fr-CA" sz="1200" b="1" i="0" u="none" strike="noStrike" dirty="0">
+                        <a:solidFill>
+                          <a:srgbClr val="000000"/>
+                        </a:solidFill>
+                        <a:effectLst/>
+                        <a:latin typeface="Calibri" panose="020F0502020204030204" pitchFamily="34" charset="0"/>
+                      </a:endParaRPr>
+                    </a:p>
+                  </a:txBody>
+                  <a:tcPr marL="2208" marR="2208" marT="2208" marB="0" anchor="ctr"/>
+                </a:tc>
+                <a:tc>
+                  <a:txBody>
+                    <a:bodyPr/>
+                    <a:lstStyle/>
+                    <a:p>
+                      <a:pPr algn="ctr" fontAlgn="ctr"/>
+                      <a:r>
+                        <a:rPr lang="fr-CA" sz="1200" u="none" strike="noStrike" dirty="0">
+                          <a:effectLst/>
+                        </a:rPr>
+                        <a:t>Conséquence de</a:t>
+                      </a:r>
+                      <a:br>
+                        <a:rPr lang="fr-CA" sz="1200" u="none" strike="noStrike" dirty="0">
+                          <a:effectLst/>
+                        </a:rPr>
+                      </a:br>
+                      <a:r>
+                        <a:rPr lang="fr-CA" sz="1200" u="none" strike="noStrike" dirty="0">
+                          <a:effectLst/>
+                        </a:rPr>
+                        <a:t> l'occurrence du risque</a:t>
+                      </a:r>
+                      <a:endParaRPr lang="fr-CA" sz="1200" b="1" i="0" u="none" strike="noStrike" dirty="0">
+                        <a:solidFill>
+                          <a:srgbClr val="000000"/>
+                        </a:solidFill>
+                        <a:effectLst/>
+                        <a:latin typeface="Calibri" panose="020F0502020204030204" pitchFamily="34" charset="0"/>
+                      </a:endParaRPr>
+                    </a:p>
+                  </a:txBody>
+                  <a:tcPr marL="2208" marR="2208" marT="2208" marB="0" anchor="ctr"/>
+                </a:tc>
+                <a:tc>
+                  <a:txBody>
+                    <a:bodyPr/>
+                    <a:lstStyle/>
+                    <a:p>
+                      <a:pPr algn="ctr" fontAlgn="ctr"/>
+                      <a:r>
+                        <a:rPr lang="fr-CA" sz="1200" u="none" strike="noStrike" dirty="0">
+                          <a:effectLst/>
+                        </a:rPr>
+                        <a:t>Coût en performance</a:t>
+                      </a:r>
+                      <a:br>
+                        <a:rPr lang="fr-CA" sz="1200" u="none" strike="noStrike" dirty="0">
+                          <a:effectLst/>
+                        </a:rPr>
+                      </a:br>
+                      <a:r>
+                        <a:rPr lang="fr-CA" sz="1200" u="none" strike="noStrike" dirty="0">
+                          <a:effectLst/>
+                        </a:rPr>
+                        <a:t> associé au risque</a:t>
+                      </a:r>
+                      <a:endParaRPr lang="fr-CA" sz="1200" b="1" i="0" u="none" strike="noStrike" dirty="0">
+                        <a:solidFill>
+                          <a:srgbClr val="000000"/>
+                        </a:solidFill>
+                        <a:effectLst/>
+                        <a:latin typeface="Calibri" panose="020F0502020204030204" pitchFamily="34" charset="0"/>
+                      </a:endParaRPr>
+                    </a:p>
+                  </a:txBody>
+                  <a:tcPr marL="2208" marR="2208" marT="2208" marB="0" anchor="ctr"/>
+                </a:tc>
+                <a:tc>
+                  <a:txBody>
+                    <a:bodyPr/>
+                    <a:lstStyle/>
+                    <a:p>
+                      <a:pPr algn="ctr" fontAlgn="ctr"/>
+                      <a:r>
+                        <a:rPr lang="fr-CA" sz="1200" u="none" strike="noStrike" dirty="0">
+                          <a:effectLst/>
+                        </a:rPr>
+                        <a:t>Probabilité d'occurrence</a:t>
+                      </a:r>
+                      <a:endParaRPr lang="fr-CA" sz="1200" b="1" i="0" u="none" strike="noStrike" dirty="0">
+                        <a:solidFill>
+                          <a:srgbClr val="000000"/>
+                        </a:solidFill>
+                        <a:effectLst/>
+                        <a:latin typeface="Calibri" panose="020F0502020204030204" pitchFamily="34" charset="0"/>
+                      </a:endParaRPr>
+                    </a:p>
+                  </a:txBody>
+                  <a:tcPr marL="2208" marR="2208" marT="2208" marB="0" anchor="ctr"/>
+                </a:tc>
+                <a:tc>
+                  <a:txBody>
+                    <a:bodyPr/>
+                    <a:lstStyle/>
+                    <a:p>
+                      <a:pPr algn="ctr" fontAlgn="ctr"/>
+                      <a:r>
+                        <a:rPr lang="fr-CA" sz="1200" u="none" strike="noStrike" dirty="0">
+                          <a:effectLst/>
+                        </a:rPr>
+                        <a:t>Plan de réduction</a:t>
+                      </a:r>
+                      <a:br>
+                        <a:rPr lang="fr-CA" sz="1200" u="none" strike="noStrike" dirty="0">
+                          <a:effectLst/>
+                        </a:rPr>
+                      </a:br>
+                      <a:r>
+                        <a:rPr lang="fr-CA" sz="1200" u="none" strike="noStrike" dirty="0">
+                          <a:effectLst/>
+                        </a:rPr>
+                        <a:t> du risque</a:t>
+                      </a:r>
+                      <a:endParaRPr lang="fr-CA" sz="1200" b="1" i="0" u="none" strike="noStrike" dirty="0">
+                        <a:solidFill>
+                          <a:srgbClr val="000000"/>
+                        </a:solidFill>
+                        <a:effectLst/>
+                        <a:latin typeface="Calibri" panose="020F0502020204030204" pitchFamily="34" charset="0"/>
+                      </a:endParaRPr>
+                    </a:p>
+                  </a:txBody>
+                  <a:tcPr marL="2208" marR="2208" marT="2208" marB="0" anchor="ctr"/>
+                </a:tc>
+                <a:tc>
+                  <a:txBody>
+                    <a:bodyPr/>
+                    <a:lstStyle/>
+                    <a:p>
+                      <a:pPr algn="ctr" fontAlgn="ctr"/>
+                      <a:r>
+                        <a:rPr lang="fr-CA" sz="1200" u="none" strike="noStrike" dirty="0">
+                          <a:effectLst/>
+                        </a:rPr>
+                        <a:t>Responsable du risque</a:t>
+                      </a:r>
+                      <a:endParaRPr lang="fr-CA" sz="1200" b="1" i="0" u="none" strike="noStrike" dirty="0">
+                        <a:solidFill>
+                          <a:srgbClr val="000000"/>
+                        </a:solidFill>
+                        <a:effectLst/>
+                        <a:latin typeface="Calibri" panose="020F0502020204030204" pitchFamily="34" charset="0"/>
+                      </a:endParaRPr>
+                    </a:p>
+                  </a:txBody>
+                  <a:tcPr marL="2208" marR="2208" marT="2208" marB="0" anchor="ctr"/>
+                </a:tc>
+              </a:tr>
+              <a:tr h="1509448">
+                <a:tc>
+                  <a:txBody>
+                    <a:bodyPr/>
+                    <a:lstStyle/>
+                    <a:p>
+                      <a:pPr algn="ctr" fontAlgn="ctr"/>
+                      <a:r>
+                        <a:rPr lang="fr-CA" sz="1200" b="0" i="0" u="none" strike="noStrike" dirty="0">
+                          <a:solidFill>
+                            <a:schemeClr val="bg1"/>
+                          </a:solidFill>
+                          <a:effectLst/>
+                          <a:latin typeface="+mn-lt"/>
+                        </a:rPr>
+                        <a:t>Utilisation </a:t>
+                      </a:r>
+                      <a:br>
+                        <a:rPr lang="fr-CA" sz="1200" b="0" i="0" u="none" strike="noStrike" dirty="0">
+                          <a:solidFill>
+                            <a:schemeClr val="bg1"/>
+                          </a:solidFill>
+                          <a:effectLst/>
+                          <a:latin typeface="+mn-lt"/>
+                        </a:rPr>
+                      </a:br>
+                      <a:r>
+                        <a:rPr lang="fr-CA" sz="1200" b="0" i="0" u="none" strike="noStrike" dirty="0">
+                          <a:solidFill>
+                            <a:schemeClr val="bg1"/>
+                          </a:solidFill>
+                          <a:effectLst/>
+                          <a:latin typeface="+mn-lt"/>
+                        </a:rPr>
+                        <a:t>entrainant une modification non désirée sur les simulateurs</a:t>
+                      </a:r>
+                    </a:p>
+                  </a:txBody>
+                  <a:tcPr marL="9525" marR="9525" marT="9525" marB="0" anchor="ctr"/>
+                </a:tc>
+                <a:tc>
+                  <a:txBody>
+                    <a:bodyPr/>
+                    <a:lstStyle/>
+                    <a:p>
+                      <a:pPr algn="ctr" fontAlgn="ctr"/>
+                      <a:r>
+                        <a:rPr lang="fr-CA" sz="1200" b="0" i="0" u="none" strike="noStrike" dirty="0">
+                          <a:solidFill>
+                            <a:srgbClr val="000000"/>
+                          </a:solidFill>
+                          <a:effectLst/>
+                          <a:latin typeface="+mn-lt"/>
+                        </a:rPr>
+                        <a:t>3</a:t>
+                      </a:r>
+                    </a:p>
+                  </a:txBody>
+                  <a:tcPr marL="9525" marR="9525" marT="9525" marB="0" anchor="ctr"/>
+                </a:tc>
+                <a:tc>
+                  <a:txBody>
+                    <a:bodyPr/>
+                    <a:lstStyle/>
+                    <a:p>
+                      <a:pPr algn="ctr" fontAlgn="ctr"/>
+                      <a:r>
+                        <a:rPr lang="fr-CA" sz="1200" b="0" i="0" u="none" strike="noStrike" dirty="0">
+                          <a:solidFill>
+                            <a:srgbClr val="000000"/>
+                          </a:solidFill>
+                          <a:effectLst/>
+                          <a:latin typeface="+mn-lt"/>
+                        </a:rPr>
+                        <a:t>Les simulations</a:t>
+                      </a:r>
+                      <a:br>
+                        <a:rPr lang="fr-CA" sz="1200" b="0" i="0" u="none" strike="noStrike" dirty="0">
+                          <a:solidFill>
+                            <a:srgbClr val="000000"/>
+                          </a:solidFill>
+                          <a:effectLst/>
+                          <a:latin typeface="+mn-lt"/>
+                        </a:rPr>
+                      </a:br>
+                      <a:r>
+                        <a:rPr lang="fr-CA" sz="1200" b="0" i="0" u="none" strike="noStrike" dirty="0">
+                          <a:solidFill>
+                            <a:srgbClr val="000000"/>
+                          </a:solidFill>
+                          <a:effectLst/>
+                          <a:latin typeface="+mn-lt"/>
+                        </a:rPr>
+                        <a:t>ne fonctionnent plus correctement </a:t>
+                      </a:r>
+                    </a:p>
+                  </a:txBody>
+                  <a:tcPr marL="9525" marR="9525" marT="9525" marB="0" anchor="ctr"/>
+                </a:tc>
+                <a:tc>
+                  <a:txBody>
+                    <a:bodyPr/>
+                    <a:lstStyle/>
+                    <a:p>
+                      <a:pPr algn="ctr" fontAlgn="ctr"/>
+                      <a:r>
+                        <a:rPr lang="fr-CA" sz="1200" b="0" i="0" u="none" strike="noStrike" dirty="0">
+                          <a:solidFill>
+                            <a:srgbClr val="000000"/>
+                          </a:solidFill>
+                          <a:effectLst/>
+                          <a:latin typeface="+mn-lt"/>
+                        </a:rPr>
+                        <a:t>Le simulateur ne s'</a:t>
+                      </a:r>
+                      <a:r>
+                        <a:rPr lang="fr-CA" sz="1200" b="0" i="0" u="none" strike="noStrike" dirty="0" err="1">
+                          <a:solidFill>
+                            <a:srgbClr val="000000"/>
+                          </a:solidFill>
+                          <a:effectLst/>
+                          <a:latin typeface="+mn-lt"/>
+                        </a:rPr>
+                        <a:t>amorçe</a:t>
+                      </a:r>
+                      <a:r>
+                        <a:rPr lang="fr-CA" sz="1200" b="0" i="0" u="none" strike="noStrike" dirty="0">
+                          <a:solidFill>
+                            <a:srgbClr val="000000"/>
+                          </a:solidFill>
+                          <a:effectLst/>
+                          <a:latin typeface="+mn-lt"/>
+                        </a:rPr>
+                        <a:t> plus correctement, les affichages ne sont plus fonctionnels, les données ne concordent plus</a:t>
+                      </a:r>
+                    </a:p>
+                  </a:txBody>
+                  <a:tcPr marL="9525" marR="9525" marT="9525" marB="0" anchor="ctr"/>
+                </a:tc>
+                <a:tc>
+                  <a:txBody>
+                    <a:bodyPr/>
+                    <a:lstStyle/>
+                    <a:p>
+                      <a:pPr algn="ctr" fontAlgn="ctr"/>
+                      <a:r>
+                        <a:rPr lang="fr-CA" sz="1200" b="0" i="0" u="none" strike="noStrike" dirty="0">
+                          <a:solidFill>
+                            <a:srgbClr val="000000"/>
+                          </a:solidFill>
+                          <a:effectLst/>
+                          <a:latin typeface="+mn-lt"/>
+                        </a:rPr>
+                        <a:t>20%</a:t>
+                      </a:r>
+                    </a:p>
+                  </a:txBody>
+                  <a:tcPr marL="9525" marR="9525" marT="9525" marB="0" anchor="ctr"/>
+                </a:tc>
+                <a:tc>
+                  <a:txBody>
+                    <a:bodyPr/>
+                    <a:lstStyle/>
+                    <a:p>
+                      <a:pPr algn="ctr" fontAlgn="ctr"/>
+                      <a:r>
+                        <a:rPr lang="fr-CA" sz="1200" b="0" i="0" u="none" strike="noStrike">
+                          <a:solidFill>
+                            <a:srgbClr val="000000"/>
+                          </a:solidFill>
+                          <a:effectLst/>
+                          <a:latin typeface="+mn-lt"/>
+                        </a:rPr>
+                        <a:t>Toujours garder plusieurs copies de la simulation à différentes étapes du projet et limiter l'utilisateur dans les manipulations potentiellement néfastes pour le fonctionnement du simulateur (avertissements dans la documentation)</a:t>
+                      </a:r>
+                    </a:p>
+                  </a:txBody>
+                  <a:tcPr marL="9525" marR="9525" marT="9525" marB="0" anchor="ctr"/>
+                </a:tc>
+                <a:tc>
+                  <a:txBody>
+                    <a:bodyPr/>
+                    <a:lstStyle/>
+                    <a:p>
+                      <a:pPr algn="ctr" fontAlgn="ctr"/>
+                      <a:r>
+                        <a:rPr lang="fr-CA" sz="1200" b="0" i="0" u="none" strike="noStrike">
+                          <a:solidFill>
+                            <a:srgbClr val="000000"/>
+                          </a:solidFill>
+                          <a:effectLst/>
+                          <a:latin typeface="+mn-lt"/>
+                        </a:rPr>
+                        <a:t>Daniel Thibodeau</a:t>
+                      </a:r>
+                    </a:p>
+                  </a:txBody>
+                  <a:tcPr marL="9525" marR="9525" marT="9525" marB="0" anchor="ctr"/>
+                </a:tc>
+              </a:tr>
+              <a:tr h="1370388">
+                <a:tc>
+                  <a:txBody>
+                    <a:bodyPr/>
+                    <a:lstStyle/>
+                    <a:p>
+                      <a:pPr algn="ctr" fontAlgn="ctr"/>
+                      <a:r>
+                        <a:rPr lang="fr-CA" sz="1200" b="0" i="0" u="none" strike="noStrike" dirty="0">
+                          <a:solidFill>
+                            <a:schemeClr val="bg1"/>
+                          </a:solidFill>
+                          <a:effectLst/>
+                          <a:latin typeface="+mn-lt"/>
+                        </a:rPr>
+                        <a:t>Limitation de composantes dans certaine version de PSIM</a:t>
+                      </a:r>
+                    </a:p>
+                  </a:txBody>
+                  <a:tcPr marL="9525" marR="9525" marT="9525" marB="0" anchor="ctr"/>
+                </a:tc>
+                <a:tc>
+                  <a:txBody>
+                    <a:bodyPr/>
+                    <a:lstStyle/>
+                    <a:p>
+                      <a:pPr algn="ctr" fontAlgn="ctr"/>
+                      <a:r>
+                        <a:rPr lang="fr-CA" sz="1200" b="0" i="0" u="none" strike="noStrike" dirty="0">
+                          <a:solidFill>
+                            <a:srgbClr val="000000"/>
+                          </a:solidFill>
+                          <a:effectLst/>
+                          <a:latin typeface="+mn-lt"/>
+                        </a:rPr>
+                        <a:t>3</a:t>
+                      </a:r>
+                    </a:p>
+                  </a:txBody>
+                  <a:tcPr marL="9525" marR="9525" marT="9525" marB="0" anchor="ctr"/>
+                </a:tc>
+                <a:tc>
+                  <a:txBody>
+                    <a:bodyPr/>
+                    <a:lstStyle/>
+                    <a:p>
+                      <a:pPr algn="ctr" fontAlgn="ctr"/>
+                      <a:r>
+                        <a:rPr lang="fr-CA" sz="1200" b="0" i="0" u="none" strike="noStrike">
+                          <a:solidFill>
+                            <a:srgbClr val="000000"/>
+                          </a:solidFill>
+                          <a:effectLst/>
+                          <a:latin typeface="+mn-lt"/>
+                        </a:rPr>
+                        <a:t>Impossible de simuler le projet au complet</a:t>
+                      </a:r>
+                    </a:p>
+                  </a:txBody>
+                  <a:tcPr marL="9525" marR="9525" marT="9525" marB="0" anchor="ctr"/>
+                </a:tc>
+                <a:tc>
+                  <a:txBody>
+                    <a:bodyPr/>
+                    <a:lstStyle/>
+                    <a:p>
+                      <a:pPr algn="ctr" fontAlgn="ctr"/>
+                      <a:r>
+                        <a:rPr lang="fr-CA" sz="1200" b="0" i="0" u="none" strike="noStrike">
+                          <a:solidFill>
+                            <a:srgbClr val="000000"/>
+                          </a:solidFill>
+                          <a:effectLst/>
+                          <a:latin typeface="+mn-lt"/>
+                        </a:rPr>
+                        <a:t>L'objectif de validation croisée ne pourra être atteint</a:t>
+                      </a:r>
+                    </a:p>
+                  </a:txBody>
+                  <a:tcPr marL="9525" marR="9525" marT="9525" marB="0" anchor="ctr"/>
+                </a:tc>
+                <a:tc>
+                  <a:txBody>
+                    <a:bodyPr/>
+                    <a:lstStyle/>
+                    <a:p>
+                      <a:pPr algn="ctr" fontAlgn="ctr"/>
+                      <a:r>
+                        <a:rPr lang="fr-CA" sz="1200" b="0" i="0" u="none" strike="noStrike">
+                          <a:solidFill>
+                            <a:srgbClr val="000000"/>
+                          </a:solidFill>
+                          <a:effectLst/>
+                          <a:latin typeface="+mn-lt"/>
+                        </a:rPr>
+                        <a:t>15%</a:t>
+                      </a:r>
+                    </a:p>
+                  </a:txBody>
+                  <a:tcPr marL="9525" marR="9525" marT="9525" marB="0" anchor="ctr"/>
+                </a:tc>
+                <a:tc>
+                  <a:txBody>
+                    <a:bodyPr/>
+                    <a:lstStyle/>
+                    <a:p>
+                      <a:pPr algn="ctr" fontAlgn="ctr"/>
+                      <a:r>
+                        <a:rPr lang="fr-CA" sz="1200" b="0" i="0" u="none" strike="noStrike" dirty="0">
+                          <a:solidFill>
+                            <a:srgbClr val="000000"/>
+                          </a:solidFill>
+                          <a:effectLst/>
+                          <a:latin typeface="+mn-lt"/>
+                        </a:rPr>
+                        <a:t>Vérifier la limitation de composantes dans les différentes version de PSIM et choisir la version permettant d'effectuer notre projet</a:t>
+                      </a:r>
+                    </a:p>
+                  </a:txBody>
+                  <a:tcPr marL="9525" marR="9525" marT="9525" marB="0" anchor="ctr"/>
+                </a:tc>
+                <a:tc>
+                  <a:txBody>
+                    <a:bodyPr/>
+                    <a:lstStyle/>
+                    <a:p>
+                      <a:pPr algn="ctr" fontAlgn="ctr"/>
+                      <a:r>
+                        <a:rPr lang="fr-CA" sz="1200" b="0" i="0" u="none" strike="noStrike" dirty="0">
+                          <a:solidFill>
+                            <a:srgbClr val="000000"/>
+                          </a:solidFill>
+                          <a:effectLst/>
+                          <a:latin typeface="+mn-lt"/>
+                        </a:rPr>
+                        <a:t>Francis Valois</a:t>
+                      </a:r>
+                    </a:p>
+                  </a:txBody>
+                  <a:tcPr marL="9525" marR="9525" marT="9525" marB="0" anchor="ctr"/>
+                </a:tc>
+              </a:tr>
+            </a:tbl>
+          </a:graphicData>
+        </a:graphic>
+      </p:graphicFrame>
+    </p:spTree>
+    <p:extLst>
+      <p:ext uri="{BB962C8B-B14F-4D97-AF65-F5344CB8AC3E}">
+        <p14:creationId xmlns:p14="http://schemas.microsoft.com/office/powerpoint/2010/main" val="1048113101"/>
+      </p:ext>
+    </p:extLst>
+  </p:cSld>
+  <p:clrMapOvr>
+    <a:masterClrMapping/>
+  </p:clrMapOvr>
+  <p:timing>
+    <p:tnLst>
+      <p:par>
+        <p:cTn id="1" dur="indefinite" restart="never" nodeType="tmRoot"/>
+      </p:par>
+    </p:tnLst>
+  </p:timing>
+</p:sld>
+</file>
+
+<file path=ppt/slides/slide24.xml><?xml version="1.0" encoding="utf-8"?>
+<p:sld xmlns:a="http://schemas.openxmlformats.org/drawingml/2006/main" xmlns:r="http://schemas.openxmlformats.org/officeDocument/2006/relationships" xmlns:p="http://schemas.openxmlformats.org/presentationml/2006/main">
+  <p:cSld>
+    <p:spTree>
+      <p:nvGrpSpPr>
+        <p:cNvPr id="1" name=""/>
+        <p:cNvGrpSpPr/>
+        <p:nvPr/>
+      </p:nvGrpSpPr>
+      <p:grpSpPr>
+        <a:xfrm>
+          <a:off x="0" y="0"/>
+          <a:ext cx="0" cy="0"/>
+          <a:chOff x="0" y="0"/>
+          <a:chExt cx="0" cy="0"/>
+        </a:xfrm>
+      </p:grpSpPr>
+      <p:sp>
+        <p:nvSpPr>
+          <p:cNvPr id="2" name="Title 1"/>
+          <p:cNvSpPr>
+            <a:spLocks noGrp="1"/>
+          </p:cNvSpPr>
+          <p:nvPr>
+            <p:ph type="title"/>
+          </p:nvPr>
+        </p:nvSpPr>
+        <p:spPr/>
+        <p:txBody>
+          <a:bodyPr/>
+          <a:lstStyle/>
+          <a:p>
+            <a:r>
+              <a:rPr lang="en-US" dirty="0" err="1" smtClean="0"/>
+              <a:t>Registre</a:t>
+            </a:r>
+            <a:r>
+              <a:rPr lang="en-US" dirty="0" smtClean="0"/>
+              <a:t> de </a:t>
+            </a:r>
+            <a:r>
+              <a:rPr lang="en-US" dirty="0" err="1" smtClean="0"/>
+              <a:t>risques</a:t>
+            </a:r>
+            <a:r>
+              <a:rPr lang="en-US" dirty="0" smtClean="0"/>
+              <a:t> (4/4)</a:t>
+            </a:r>
+            <a:endParaRPr lang="en-US" dirty="0"/>
+          </a:p>
+        </p:txBody>
+      </p:sp>
+      <p:graphicFrame>
+        <p:nvGraphicFramePr>
+          <p:cNvPr id="3" name="Table 2"/>
+          <p:cNvGraphicFramePr>
+            <a:graphicFrameLocks noGrp="1"/>
+          </p:cNvGraphicFramePr>
+          <p:nvPr>
+            <p:extLst/>
+          </p:nvPr>
+        </p:nvGraphicFramePr>
+        <p:xfrm>
+          <a:off x="199251" y="1370320"/>
+          <a:ext cx="8837882" cy="4439137"/>
+        </p:xfrm>
+        <a:graphic>
+          <a:graphicData uri="http://schemas.openxmlformats.org/drawingml/2006/table">
+            <a:tbl>
+              <a:tblPr firstRow="1" firstCol="1" bandRow="1">
+                <a:tableStyleId>{5C22544A-7EE6-4342-B048-85BDC9FD1C3A}</a:tableStyleId>
+              </a:tblPr>
+              <a:tblGrid>
+                <a:gridCol w="1225788"/>
+                <a:gridCol w="997527"/>
+                <a:gridCol w="1251802"/>
+                <a:gridCol w="1500882"/>
+                <a:gridCol w="893049"/>
+                <a:gridCol w="1730607"/>
+                <a:gridCol w="1238227"/>
+              </a:tblGrid>
+              <a:tr h="945367">
+                <a:tc>
+                  <a:txBody>
+                    <a:bodyPr/>
+                    <a:lstStyle/>
+                    <a:p>
+                      <a:pPr algn="ctr" fontAlgn="ctr"/>
+                      <a:r>
+                        <a:rPr lang="fr-CA" sz="1200" u="none" strike="noStrike" dirty="0">
+                          <a:effectLst/>
+                        </a:rPr>
+                        <a:t>Type de risque</a:t>
+                      </a:r>
+                      <a:endParaRPr lang="fr-CA" sz="1200" b="1" i="0" u="none" strike="noStrike" dirty="0">
+                        <a:solidFill>
+                          <a:srgbClr val="000000"/>
+                        </a:solidFill>
+                        <a:effectLst/>
+                        <a:latin typeface="Calibri" panose="020F0502020204030204" pitchFamily="34" charset="0"/>
+                      </a:endParaRPr>
+                    </a:p>
+                  </a:txBody>
+                  <a:tcPr marL="2208" marR="2208" marT="2208" marB="0" anchor="ctr"/>
+                </a:tc>
+                <a:tc>
+                  <a:txBody>
+                    <a:bodyPr/>
+                    <a:lstStyle/>
+                    <a:p>
+                      <a:pPr marL="0" indent="0" algn="ctr" fontAlgn="ctr">
+                        <a:tabLst>
+                          <a:tab pos="628650" algn="l"/>
+                        </a:tabLst>
+                      </a:pPr>
+                      <a:r>
+                        <a:rPr lang="fr-CA" sz="1200" u="none" strike="noStrike" dirty="0">
+                          <a:effectLst/>
+                        </a:rPr>
+                        <a:t>Niveau de priorité</a:t>
+                      </a:r>
+                      <a:br>
+                        <a:rPr lang="fr-CA" sz="1200" u="none" strike="noStrike" dirty="0">
+                          <a:effectLst/>
+                        </a:rPr>
+                      </a:br>
+                      <a:r>
+                        <a:rPr lang="fr-CA" sz="1200" u="none" strike="noStrike" dirty="0">
+                          <a:effectLst/>
+                        </a:rPr>
+                        <a:t>(1 faible, 5 élevé)</a:t>
+                      </a:r>
+                      <a:endParaRPr lang="fr-CA" sz="1200" b="1" i="0" u="none" strike="noStrike" dirty="0">
+                        <a:solidFill>
+                          <a:srgbClr val="000000"/>
+                        </a:solidFill>
+                        <a:effectLst/>
+                        <a:latin typeface="Calibri" panose="020F0502020204030204" pitchFamily="34" charset="0"/>
+                      </a:endParaRPr>
+                    </a:p>
+                  </a:txBody>
+                  <a:tcPr marL="2208" marR="2208" marT="2208" marB="0" anchor="ctr"/>
+                </a:tc>
+                <a:tc>
+                  <a:txBody>
+                    <a:bodyPr/>
+                    <a:lstStyle/>
+                    <a:p>
+                      <a:pPr algn="ctr" fontAlgn="ctr"/>
+                      <a:r>
+                        <a:rPr lang="fr-CA" sz="1200" u="none" strike="noStrike" dirty="0">
+                          <a:effectLst/>
+                        </a:rPr>
+                        <a:t>Conséquence de</a:t>
+                      </a:r>
+                      <a:br>
+                        <a:rPr lang="fr-CA" sz="1200" u="none" strike="noStrike" dirty="0">
+                          <a:effectLst/>
+                        </a:rPr>
+                      </a:br>
+                      <a:r>
+                        <a:rPr lang="fr-CA" sz="1200" u="none" strike="noStrike" dirty="0">
+                          <a:effectLst/>
+                        </a:rPr>
+                        <a:t> l'occurrence du risque</a:t>
+                      </a:r>
+                      <a:endParaRPr lang="fr-CA" sz="1200" b="1" i="0" u="none" strike="noStrike" dirty="0">
+                        <a:solidFill>
+                          <a:srgbClr val="000000"/>
+                        </a:solidFill>
+                        <a:effectLst/>
+                        <a:latin typeface="Calibri" panose="020F0502020204030204" pitchFamily="34" charset="0"/>
+                      </a:endParaRPr>
+                    </a:p>
+                  </a:txBody>
+                  <a:tcPr marL="2208" marR="2208" marT="2208" marB="0" anchor="ctr"/>
+                </a:tc>
+                <a:tc>
+                  <a:txBody>
+                    <a:bodyPr/>
+                    <a:lstStyle/>
+                    <a:p>
+                      <a:pPr algn="ctr" fontAlgn="ctr"/>
+                      <a:r>
+                        <a:rPr lang="fr-CA" sz="1200" u="none" strike="noStrike" dirty="0">
+                          <a:effectLst/>
+                        </a:rPr>
+                        <a:t>Coût en performance</a:t>
+                      </a:r>
+                      <a:br>
+                        <a:rPr lang="fr-CA" sz="1200" u="none" strike="noStrike" dirty="0">
+                          <a:effectLst/>
+                        </a:rPr>
+                      </a:br>
+                      <a:r>
+                        <a:rPr lang="fr-CA" sz="1200" u="none" strike="noStrike" dirty="0">
+                          <a:effectLst/>
+                        </a:rPr>
+                        <a:t> associé au risque</a:t>
+                      </a:r>
+                      <a:endParaRPr lang="fr-CA" sz="1200" b="1" i="0" u="none" strike="noStrike" dirty="0">
+                        <a:solidFill>
+                          <a:srgbClr val="000000"/>
+                        </a:solidFill>
+                        <a:effectLst/>
+                        <a:latin typeface="Calibri" panose="020F0502020204030204" pitchFamily="34" charset="0"/>
+                      </a:endParaRPr>
+                    </a:p>
+                  </a:txBody>
+                  <a:tcPr marL="2208" marR="2208" marT="2208" marB="0" anchor="ctr"/>
+                </a:tc>
+                <a:tc>
+                  <a:txBody>
+                    <a:bodyPr/>
+                    <a:lstStyle/>
+                    <a:p>
+                      <a:pPr algn="ctr" fontAlgn="ctr"/>
+                      <a:r>
+                        <a:rPr lang="fr-CA" sz="1200" u="none" strike="noStrike" dirty="0">
+                          <a:effectLst/>
+                        </a:rPr>
+                        <a:t>Probabilité d'occurrence</a:t>
+                      </a:r>
+                      <a:endParaRPr lang="fr-CA" sz="1200" b="1" i="0" u="none" strike="noStrike" dirty="0">
+                        <a:solidFill>
+                          <a:srgbClr val="000000"/>
+                        </a:solidFill>
+                        <a:effectLst/>
+                        <a:latin typeface="Calibri" panose="020F0502020204030204" pitchFamily="34" charset="0"/>
+                      </a:endParaRPr>
+                    </a:p>
+                  </a:txBody>
+                  <a:tcPr marL="2208" marR="2208" marT="2208" marB="0" anchor="ctr"/>
+                </a:tc>
+                <a:tc>
+                  <a:txBody>
+                    <a:bodyPr/>
+                    <a:lstStyle/>
+                    <a:p>
+                      <a:pPr algn="ctr" fontAlgn="ctr"/>
+                      <a:r>
+                        <a:rPr lang="fr-CA" sz="1200" u="none" strike="noStrike" dirty="0">
+                          <a:effectLst/>
+                        </a:rPr>
+                        <a:t>Plan de réduction</a:t>
+                      </a:r>
+                      <a:br>
+                        <a:rPr lang="fr-CA" sz="1200" u="none" strike="noStrike" dirty="0">
+                          <a:effectLst/>
+                        </a:rPr>
+                      </a:br>
+                      <a:r>
+                        <a:rPr lang="fr-CA" sz="1200" u="none" strike="noStrike" dirty="0">
+                          <a:effectLst/>
+                        </a:rPr>
+                        <a:t> du risque</a:t>
+                      </a:r>
+                      <a:endParaRPr lang="fr-CA" sz="1200" b="1" i="0" u="none" strike="noStrike" dirty="0">
+                        <a:solidFill>
+                          <a:srgbClr val="000000"/>
+                        </a:solidFill>
+                        <a:effectLst/>
+                        <a:latin typeface="Calibri" panose="020F0502020204030204" pitchFamily="34" charset="0"/>
+                      </a:endParaRPr>
+                    </a:p>
+                  </a:txBody>
+                  <a:tcPr marL="2208" marR="2208" marT="2208" marB="0" anchor="ctr"/>
+                </a:tc>
+                <a:tc>
+                  <a:txBody>
+                    <a:bodyPr/>
+                    <a:lstStyle/>
+                    <a:p>
+                      <a:pPr algn="ctr" fontAlgn="ctr"/>
+                      <a:r>
+                        <a:rPr lang="fr-CA" sz="1200" u="none" strike="noStrike" dirty="0">
+                          <a:effectLst/>
+                        </a:rPr>
+                        <a:t>Responsable du risque</a:t>
+                      </a:r>
+                      <a:endParaRPr lang="fr-CA" sz="1200" b="1" i="0" u="none" strike="noStrike" dirty="0">
+                        <a:solidFill>
+                          <a:srgbClr val="000000"/>
+                        </a:solidFill>
+                        <a:effectLst/>
+                        <a:latin typeface="Calibri" panose="020F0502020204030204" pitchFamily="34" charset="0"/>
+                      </a:endParaRPr>
+                    </a:p>
+                  </a:txBody>
+                  <a:tcPr marL="2208" marR="2208" marT="2208" marB="0" anchor="ctr"/>
+                </a:tc>
+              </a:tr>
+              <a:tr h="1509448">
+                <a:tc>
+                  <a:txBody>
+                    <a:bodyPr/>
+                    <a:lstStyle/>
+                    <a:p>
+                      <a:pPr algn="ctr" fontAlgn="ctr"/>
+                      <a:r>
+                        <a:rPr lang="fr-CA" sz="1200" b="0" i="0" u="none" strike="noStrike" dirty="0">
+                          <a:solidFill>
+                            <a:schemeClr val="bg1"/>
+                          </a:solidFill>
+                          <a:effectLst/>
+                          <a:latin typeface="+mn-lt"/>
+                        </a:rPr>
+                        <a:t>Difficulté d'implantation complète du simulateur sur le système d'OPAL-RT dû à une limitation du nombre de dispositifs de commutation</a:t>
+                      </a:r>
+                    </a:p>
+                  </a:txBody>
+                  <a:tcPr marL="9525" marR="9525" marT="9525" marB="0" anchor="ctr"/>
+                </a:tc>
+                <a:tc>
+                  <a:txBody>
+                    <a:bodyPr/>
+                    <a:lstStyle/>
+                    <a:p>
+                      <a:pPr algn="ctr" fontAlgn="ctr"/>
+                      <a:r>
+                        <a:rPr lang="fr-CA" sz="1200" b="0" i="0" u="none" strike="noStrike" dirty="0">
+                          <a:solidFill>
+                            <a:srgbClr val="000000"/>
+                          </a:solidFill>
+                          <a:effectLst/>
+                          <a:latin typeface="+mn-lt"/>
+                        </a:rPr>
+                        <a:t>3</a:t>
+                      </a:r>
+                    </a:p>
+                  </a:txBody>
+                  <a:tcPr marL="9525" marR="9525" marT="9525" marB="0" anchor="ctr"/>
+                </a:tc>
+                <a:tc>
+                  <a:txBody>
+                    <a:bodyPr/>
+                    <a:lstStyle/>
+                    <a:p>
+                      <a:pPr algn="ctr" fontAlgn="ctr"/>
+                      <a:r>
+                        <a:rPr lang="fr-CA" sz="1200" b="0" i="0" u="none" strike="noStrike" dirty="0">
+                          <a:solidFill>
+                            <a:srgbClr val="000000"/>
+                          </a:solidFill>
+                          <a:effectLst/>
+                          <a:latin typeface="+mn-lt"/>
+                        </a:rPr>
+                        <a:t>Il devient impossible d'implanter le simulateur complet dans OPAL-RT</a:t>
+                      </a:r>
+                    </a:p>
+                  </a:txBody>
+                  <a:tcPr marL="9525" marR="9525" marT="9525" marB="0" anchor="ctr"/>
+                </a:tc>
+                <a:tc>
+                  <a:txBody>
+                    <a:bodyPr/>
+                    <a:lstStyle/>
+                    <a:p>
+                      <a:pPr algn="ctr" fontAlgn="ctr"/>
+                      <a:r>
+                        <a:rPr lang="fr-CA" sz="1200" b="0" i="0" u="none" strike="noStrike" dirty="0">
+                          <a:solidFill>
+                            <a:srgbClr val="000000"/>
+                          </a:solidFill>
+                          <a:effectLst/>
+                          <a:latin typeface="+mn-lt"/>
+                        </a:rPr>
+                        <a:t>L'objectif de validation croisée ne pourra être atteint</a:t>
+                      </a:r>
+                    </a:p>
+                  </a:txBody>
+                  <a:tcPr marL="9525" marR="9525" marT="9525" marB="0" anchor="ctr"/>
+                </a:tc>
+                <a:tc>
+                  <a:txBody>
+                    <a:bodyPr/>
+                    <a:lstStyle/>
+                    <a:p>
+                      <a:pPr algn="ctr" fontAlgn="ctr"/>
+                      <a:r>
+                        <a:rPr lang="fr-CA" sz="1200" b="0" i="0" u="none" strike="noStrike">
+                          <a:solidFill>
+                            <a:srgbClr val="000000"/>
+                          </a:solidFill>
+                          <a:effectLst/>
+                          <a:latin typeface="+mn-lt"/>
+                        </a:rPr>
+                        <a:t>20%</a:t>
+                      </a:r>
+                    </a:p>
+                  </a:txBody>
+                  <a:tcPr marL="9525" marR="9525" marT="9525" marB="0" anchor="ctr"/>
+                </a:tc>
+                <a:tc>
+                  <a:txBody>
+                    <a:bodyPr/>
+                    <a:lstStyle/>
+                    <a:p>
+                      <a:pPr algn="ctr" fontAlgn="ctr"/>
+                      <a:r>
+                        <a:rPr lang="fr-CA" sz="1200" b="0" i="0" u="none" strike="noStrike">
+                          <a:solidFill>
+                            <a:srgbClr val="000000"/>
+                          </a:solidFill>
+                          <a:effectLst/>
+                          <a:latin typeface="+mn-lt"/>
+                        </a:rPr>
+                        <a:t>Se familiariser avec le simulateur d'OPAL-RT et trouver une méthode de contournement si ce problème est réellement présent</a:t>
+                      </a:r>
+                    </a:p>
+                  </a:txBody>
+                  <a:tcPr marL="9525" marR="9525" marT="9525" marB="0" anchor="ctr"/>
+                </a:tc>
+                <a:tc>
+                  <a:txBody>
+                    <a:bodyPr/>
+                    <a:lstStyle/>
+                    <a:p>
+                      <a:pPr algn="ctr" fontAlgn="ctr"/>
+                      <a:r>
+                        <a:rPr lang="fr-CA" sz="1200" b="0" i="0" u="none" strike="noStrike">
+                          <a:solidFill>
+                            <a:srgbClr val="000000"/>
+                          </a:solidFill>
+                          <a:effectLst/>
+                          <a:latin typeface="+mn-lt"/>
+                        </a:rPr>
+                        <a:t>Gabriel Boivin</a:t>
+                      </a:r>
+                    </a:p>
+                  </a:txBody>
+                  <a:tcPr marL="9525" marR="9525" marT="9525" marB="0" anchor="ctr"/>
+                </a:tc>
+              </a:tr>
+              <a:tr h="1370388">
+                <a:tc>
+                  <a:txBody>
+                    <a:bodyPr/>
+                    <a:lstStyle/>
+                    <a:p>
+                      <a:pPr algn="ctr" fontAlgn="ctr"/>
+                      <a:r>
+                        <a:rPr lang="fr-CA" sz="1200" b="0" i="0" u="none" strike="noStrike" dirty="0">
+                          <a:solidFill>
+                            <a:schemeClr val="bg1"/>
+                          </a:solidFill>
+                          <a:effectLst/>
+                          <a:latin typeface="+mn-lt"/>
+                        </a:rPr>
+                        <a:t>Difficulté d'implantation complète du simulateur sur le système d'OPAL-RT dû à une incompatibilité entre SPS et OPAL-RT</a:t>
+                      </a:r>
+                    </a:p>
+                  </a:txBody>
+                  <a:tcPr marL="9525" marR="9525" marT="9525" marB="0" anchor="ctr"/>
+                </a:tc>
+                <a:tc>
+                  <a:txBody>
+                    <a:bodyPr/>
+                    <a:lstStyle/>
+                    <a:p>
+                      <a:pPr algn="ctr" fontAlgn="ctr"/>
+                      <a:r>
+                        <a:rPr lang="fr-CA" sz="1200" b="0" i="0" u="none" strike="noStrike">
+                          <a:solidFill>
+                            <a:srgbClr val="000000"/>
+                          </a:solidFill>
+                          <a:effectLst/>
+                          <a:latin typeface="+mn-lt"/>
+                        </a:rPr>
+                        <a:t>5</a:t>
+                      </a:r>
+                    </a:p>
+                  </a:txBody>
+                  <a:tcPr marL="9525" marR="9525" marT="9525" marB="0" anchor="ctr"/>
+                </a:tc>
+                <a:tc>
+                  <a:txBody>
+                    <a:bodyPr/>
+                    <a:lstStyle/>
+                    <a:p>
+                      <a:pPr algn="ctr" fontAlgn="ctr"/>
+                      <a:r>
+                        <a:rPr lang="fr-CA" sz="1200" b="0" i="0" u="none" strike="noStrike">
+                          <a:solidFill>
+                            <a:srgbClr val="000000"/>
+                          </a:solidFill>
+                          <a:effectLst/>
+                          <a:latin typeface="+mn-lt"/>
+                        </a:rPr>
+                        <a:t>Il devient impossible d'implanter le simulateur complet dans OPAL-RT</a:t>
+                      </a:r>
+                    </a:p>
+                  </a:txBody>
+                  <a:tcPr marL="9525" marR="9525" marT="9525" marB="0" anchor="ctr"/>
+                </a:tc>
+                <a:tc>
+                  <a:txBody>
+                    <a:bodyPr/>
+                    <a:lstStyle/>
+                    <a:p>
+                      <a:pPr algn="ctr" fontAlgn="ctr"/>
+                      <a:r>
+                        <a:rPr lang="fr-CA" sz="1200" b="0" i="0" u="none" strike="noStrike" dirty="0">
+                          <a:solidFill>
+                            <a:srgbClr val="000000"/>
+                          </a:solidFill>
+                          <a:effectLst/>
+                          <a:latin typeface="+mn-lt"/>
+                        </a:rPr>
+                        <a:t>L'objectif de validation croisée ne pourra être atteint</a:t>
+                      </a:r>
+                    </a:p>
+                  </a:txBody>
+                  <a:tcPr marL="9525" marR="9525" marT="9525" marB="0" anchor="ctr"/>
+                </a:tc>
+                <a:tc>
+                  <a:txBody>
+                    <a:bodyPr/>
+                    <a:lstStyle/>
+                    <a:p>
+                      <a:pPr algn="ctr" fontAlgn="ctr"/>
+                      <a:r>
+                        <a:rPr lang="fr-CA" sz="1200" b="0" i="0" u="none" strike="noStrike" dirty="0">
+                          <a:solidFill>
+                            <a:srgbClr val="000000"/>
+                          </a:solidFill>
+                          <a:effectLst/>
+                          <a:latin typeface="+mn-lt"/>
+                        </a:rPr>
+                        <a:t>10%</a:t>
+                      </a:r>
+                    </a:p>
+                  </a:txBody>
+                  <a:tcPr marL="9525" marR="9525" marT="9525" marB="0" anchor="ctr"/>
+                </a:tc>
+                <a:tc>
+                  <a:txBody>
+                    <a:bodyPr/>
+                    <a:lstStyle/>
+                    <a:p>
+                      <a:pPr algn="ctr" fontAlgn="ctr"/>
+                      <a:r>
+                        <a:rPr lang="fr-CA" sz="1200" b="0" i="0" u="none" strike="noStrike" dirty="0">
+                          <a:solidFill>
+                            <a:srgbClr val="000000"/>
+                          </a:solidFill>
+                          <a:effectLst/>
+                          <a:latin typeface="+mn-lt"/>
+                        </a:rPr>
+                        <a:t>Se familiariser avec le simulateur d'OPAL-RT et vérifier quelles composantes sont utilisables dans OPAL-RT</a:t>
+                      </a:r>
+                    </a:p>
+                  </a:txBody>
+                  <a:tcPr marL="9525" marR="9525" marT="9525" marB="0" anchor="ctr"/>
+                </a:tc>
+                <a:tc>
+                  <a:txBody>
+                    <a:bodyPr/>
+                    <a:lstStyle/>
+                    <a:p>
+                      <a:pPr algn="ctr" fontAlgn="ctr"/>
+                      <a:r>
+                        <a:rPr lang="fr-CA" sz="1200" b="0" i="0" u="none" strike="noStrike" dirty="0">
+                          <a:solidFill>
+                            <a:srgbClr val="000000"/>
+                          </a:solidFill>
+                          <a:effectLst/>
+                          <a:latin typeface="+mn-lt"/>
+                        </a:rPr>
+                        <a:t>Gabriel Boivin</a:t>
+                      </a:r>
+                    </a:p>
+                  </a:txBody>
+                  <a:tcPr marL="9525" marR="9525" marT="9525" marB="0" anchor="ctr"/>
+                </a:tc>
+              </a:tr>
+            </a:tbl>
+          </a:graphicData>
+        </a:graphic>
+      </p:graphicFrame>
+    </p:spTree>
+    <p:extLst>
+      <p:ext uri="{BB962C8B-B14F-4D97-AF65-F5344CB8AC3E}">
+        <p14:creationId xmlns:p14="http://schemas.microsoft.com/office/powerpoint/2010/main" val="2144816589"/>
+      </p:ext>
+    </p:extLst>
+  </p:cSld>
+  <p:clrMapOvr>
+    <a:masterClrMapping/>
+  </p:clrMapOvr>
+  <p:timing>
+    <p:tnLst>
+      <p:par>
+        <p:cTn id="1" dur="indefinite" restart="never" nodeType="tmRoot"/>
+      </p:par>
+    </p:tnLst>
+  </p:timing>
+</p:sld>
+</file>
+
+<file path=ppt/slides/slide25.xml><?xml version="1.0" encoding="utf-8"?>
+<p:sld xmlns:a="http://schemas.openxmlformats.org/drawingml/2006/main" xmlns:r="http://schemas.openxmlformats.org/officeDocument/2006/relationships" xmlns:p="http://schemas.openxmlformats.org/presentationml/2006/main">
+  <p:cSld>
+    <p:spTree>
+      <p:nvGrpSpPr>
+        <p:cNvPr id="1" name=""/>
+        <p:cNvGrpSpPr/>
+        <p:nvPr/>
+      </p:nvGrpSpPr>
+      <p:grpSpPr>
+        <a:xfrm>
+          <a:off x="0" y="0"/>
+          <a:ext cx="0" cy="0"/>
+          <a:chOff x="0" y="0"/>
+          <a:chExt cx="0" cy="0"/>
+        </a:xfrm>
+      </p:grpSpPr>
+      <p:sp>
+        <p:nvSpPr>
+          <p:cNvPr id="2" name="Title 1"/>
+          <p:cNvSpPr>
+            <a:spLocks noGrp="1"/>
+          </p:cNvSpPr>
+          <p:nvPr>
+            <p:ph type="title"/>
+          </p:nvPr>
+        </p:nvSpPr>
+        <p:spPr/>
+        <p:txBody>
+          <a:bodyPr/>
+          <a:lstStyle/>
+          <a:p>
+            <a:r>
+              <a:rPr lang="en-US" dirty="0" smtClean="0"/>
+              <a:t>Gantt (1/2)</a:t>
+            </a:r>
+            <a:endParaRPr lang="en-US" dirty="0"/>
+          </a:p>
+        </p:txBody>
+      </p:sp>
+      <p:graphicFrame>
+        <p:nvGraphicFramePr>
+          <p:cNvPr id="5" name="Object 4"/>
+          <p:cNvGraphicFramePr>
+            <a:graphicFrameLocks noChangeAspect="1"/>
+          </p:cNvGraphicFramePr>
+          <p:nvPr>
+            <p:extLst/>
+          </p:nvPr>
+        </p:nvGraphicFramePr>
+        <p:xfrm>
+          <a:off x="1351149" y="1353127"/>
+          <a:ext cx="6819074" cy="5269190"/>
+        </p:xfrm>
+        <a:graphic>
+          <a:graphicData uri="http://schemas.openxmlformats.org/presentationml/2006/ole">
+            <mc:AlternateContent xmlns:mc="http://schemas.openxmlformats.org/markup-compatibility/2006">
+              <mc:Choice xmlns:v="urn:schemas-microsoft-com:vml" Requires="v">
+                <p:oleObj spid="_x0000_s1026" name="Acrobat Document" r:id="rId3" imgW="15087600" imgH="11658600" progId="Acrobat.Document.11">
+                  <p:embed/>
+                </p:oleObj>
+              </mc:Choice>
+              <mc:Fallback>
+                <p:oleObj name="Acrobat Document" r:id="rId3" imgW="15087600" imgH="11658600" progId="Acrobat.Document.11">
+                  <p:embed/>
+                  <p:pic>
+                    <p:nvPicPr>
+                      <p:cNvPr id="0" name=""/>
+                      <p:cNvPicPr/>
+                      <p:nvPr/>
+                    </p:nvPicPr>
+                    <p:blipFill>
+                      <a:blip r:embed="rId4"/>
+                      <a:stretch>
+                        <a:fillRect/>
+                      </a:stretch>
+                    </p:blipFill>
+                    <p:spPr>
+                      <a:xfrm>
+                        <a:off x="1351149" y="1353127"/>
+                        <a:ext cx="6819074" cy="5269190"/>
+                      </a:xfrm>
+                      <a:prstGeom prst="rect">
+                        <a:avLst/>
+                      </a:prstGeom>
+                    </p:spPr>
+                  </p:pic>
+                </p:oleObj>
+              </mc:Fallback>
+            </mc:AlternateContent>
+          </a:graphicData>
+        </a:graphic>
+      </p:graphicFrame>
+    </p:spTree>
+    <p:extLst>
+      <p:ext uri="{BB962C8B-B14F-4D97-AF65-F5344CB8AC3E}">
+        <p14:creationId xmlns:p14="http://schemas.microsoft.com/office/powerpoint/2010/main" val="2526144640"/>
+      </p:ext>
+    </p:extLst>
+  </p:cSld>
+  <p:clrMapOvr>
+    <a:masterClrMapping/>
+  </p:clrMapOvr>
+  <p:timing>
+    <p:tnLst>
+      <p:par>
+        <p:cTn id="1" dur="indefinite" restart="never" nodeType="tmRoot"/>
+      </p:par>
+    </p:tnLst>
+  </p:timing>
+</p:sld>
+</file>
+
+<file path=ppt/slides/slide26.xml><?xml version="1.0" encoding="utf-8"?>
+<p:sld xmlns:a="http://schemas.openxmlformats.org/drawingml/2006/main" xmlns:r="http://schemas.openxmlformats.org/officeDocument/2006/relationships" xmlns:p="http://schemas.openxmlformats.org/presentationml/2006/main">
+  <p:cSld>
+    <p:spTree>
+      <p:nvGrpSpPr>
+        <p:cNvPr id="1" name=""/>
+        <p:cNvGrpSpPr/>
+        <p:nvPr/>
+      </p:nvGrpSpPr>
+      <p:grpSpPr>
+        <a:xfrm>
+          <a:off x="0" y="0"/>
+          <a:ext cx="0" cy="0"/>
+          <a:chOff x="0" y="0"/>
+          <a:chExt cx="0" cy="0"/>
+        </a:xfrm>
+      </p:grpSpPr>
+      <p:sp>
+        <p:nvSpPr>
+          <p:cNvPr id="2" name="Title 1"/>
+          <p:cNvSpPr>
+            <a:spLocks noGrp="1"/>
+          </p:cNvSpPr>
+          <p:nvPr>
+            <p:ph type="title"/>
+          </p:nvPr>
+        </p:nvSpPr>
+        <p:spPr/>
+        <p:txBody>
+          <a:bodyPr/>
+          <a:lstStyle/>
+          <a:p>
+            <a:r>
+              <a:rPr lang="en-US" dirty="0" smtClean="0"/>
+              <a:t>Gantt (2/2)</a:t>
+            </a:r>
+            <a:endParaRPr lang="en-US" dirty="0"/>
+          </a:p>
+        </p:txBody>
+      </p:sp>
+      <p:graphicFrame>
+        <p:nvGraphicFramePr>
+          <p:cNvPr id="3" name="Object 2"/>
+          <p:cNvGraphicFramePr>
+            <a:graphicFrameLocks noChangeAspect="1"/>
+          </p:cNvGraphicFramePr>
+          <p:nvPr>
+            <p:extLst/>
+          </p:nvPr>
+        </p:nvGraphicFramePr>
+        <p:xfrm>
+          <a:off x="1513795" y="1270000"/>
+          <a:ext cx="6904491" cy="5335194"/>
+        </p:xfrm>
+        <a:graphic>
+          <a:graphicData uri="http://schemas.openxmlformats.org/presentationml/2006/ole">
+            <mc:AlternateContent xmlns:mc="http://schemas.openxmlformats.org/markup-compatibility/2006">
+              <mc:Choice xmlns:v="urn:schemas-microsoft-com:vml" Requires="v">
+                <p:oleObj spid="_x0000_s2050" name="Acrobat Document" r:id="rId3" imgW="15087600" imgH="11658600" progId="Acrobat.Document.11">
+                  <p:embed/>
+                </p:oleObj>
+              </mc:Choice>
+              <mc:Fallback>
+                <p:oleObj name="Acrobat Document" r:id="rId3" imgW="15087600" imgH="11658600" progId="Acrobat.Document.11">
+                  <p:embed/>
+                  <p:pic>
+                    <p:nvPicPr>
+                      <p:cNvPr id="0" name=""/>
+                      <p:cNvPicPr/>
+                      <p:nvPr/>
+                    </p:nvPicPr>
+                    <p:blipFill>
+                      <a:blip r:embed="rId4"/>
+                      <a:stretch>
+                        <a:fillRect/>
+                      </a:stretch>
+                    </p:blipFill>
+                    <p:spPr>
+                      <a:xfrm>
+                        <a:off x="1513795" y="1270000"/>
+                        <a:ext cx="6904491" cy="5335194"/>
+                      </a:xfrm>
+                      <a:prstGeom prst="rect">
+                        <a:avLst/>
+                      </a:prstGeom>
+                    </p:spPr>
+                  </p:pic>
+                </p:oleObj>
+              </mc:Fallback>
+            </mc:AlternateContent>
+          </a:graphicData>
+        </a:graphic>
+      </p:graphicFrame>
+    </p:spTree>
+    <p:extLst>
+      <p:ext uri="{BB962C8B-B14F-4D97-AF65-F5344CB8AC3E}">
+        <p14:creationId xmlns:p14="http://schemas.microsoft.com/office/powerpoint/2010/main" val="3578765906"/>
+      </p:ext>
+    </p:extLst>
+  </p:cSld>
+  <p:clrMapOvr>
+    <a:masterClrMapping/>
+  </p:clrMapOvr>
+  <p:timing>
+    <p:tnLst>
+      <p:par>
+        <p:cTn id="1" dur="indefinite" restart="never" nodeType="tmRoot"/>
+      </p:par>
+    </p:tnLst>
+  </p:timing>
+</p:sld>
+</file>
+
+<file path=ppt/slides/slide27.xml><?xml version="1.0" encoding="utf-8"?>
+<p:sld xmlns:a="http://schemas.openxmlformats.org/drawingml/2006/main" xmlns:r="http://schemas.openxmlformats.org/officeDocument/2006/relationships" xmlns:p="http://schemas.openxmlformats.org/presentationml/2006/main">
+  <p:cSld>
+    <p:spTree>
+      <p:nvGrpSpPr>
+        <p:cNvPr id="1" name=""/>
+        <p:cNvGrpSpPr/>
+        <p:nvPr/>
+      </p:nvGrpSpPr>
+      <p:grpSpPr>
+        <a:xfrm>
+          <a:off x="0" y="0"/>
+          <a:ext cx="0" cy="0"/>
+          <a:chOff x="0" y="0"/>
+          <a:chExt cx="0" cy="0"/>
+        </a:xfrm>
+      </p:grpSpPr>
+      <p:sp>
+        <p:nvSpPr>
+          <p:cNvPr id="2" name="Title 1"/>
+          <p:cNvSpPr>
+            <a:spLocks noGrp="1"/>
+          </p:cNvSpPr>
+          <p:nvPr>
+            <p:ph type="title"/>
+          </p:nvPr>
+        </p:nvSpPr>
+        <p:spPr/>
+        <p:txBody>
+          <a:bodyPr/>
+          <a:lstStyle/>
+          <a:p>
+            <a:r>
+              <a:rPr lang="en-US" dirty="0" smtClean="0"/>
+              <a:t>WBS (1/3)</a:t>
+            </a:r>
+            <a:endParaRPr lang="en-US" dirty="0"/>
+          </a:p>
+        </p:txBody>
+      </p:sp>
+      <p:pic>
+        <p:nvPicPr>
+          <p:cNvPr id="4" name="Picture 3"/>
+          <p:cNvPicPr>
+            <a:picLocks noChangeAspect="1"/>
+          </p:cNvPicPr>
+          <p:nvPr/>
+        </p:nvPicPr>
+        <p:blipFill>
+          <a:blip r:embed="rId2">
+            <a:extLst>
+              <a:ext uri="{28A0092B-C50C-407E-A947-70E740481C1C}">
+                <a14:useLocalDpi xmlns:a14="http://schemas.microsoft.com/office/drawing/2010/main" val="0"/>
+              </a:ext>
+            </a:extLst>
+          </a:blip>
+          <a:stretch>
+            <a:fillRect/>
+          </a:stretch>
+        </p:blipFill>
+        <p:spPr>
+          <a:xfrm>
+            <a:off x="58058" y="1736542"/>
+            <a:ext cx="9013369" cy="3051771"/>
+          </a:xfrm>
+          <a:prstGeom prst="rect">
+            <a:avLst/>
+          </a:prstGeom>
+        </p:spPr>
+      </p:pic>
+    </p:spTree>
+    <p:extLst>
+      <p:ext uri="{BB962C8B-B14F-4D97-AF65-F5344CB8AC3E}">
+        <p14:creationId xmlns:p14="http://schemas.microsoft.com/office/powerpoint/2010/main" val="2822206796"/>
+      </p:ext>
+    </p:extLst>
+  </p:cSld>
+  <p:clrMapOvr>
+    <a:masterClrMapping/>
+  </p:clrMapOvr>
+  <p:timing>
+    <p:tnLst>
+      <p:par>
+        <p:cTn id="1" dur="indefinite" restart="never" nodeType="tmRoot"/>
+      </p:par>
+    </p:tnLst>
+  </p:timing>
+</p:sld>
+</file>
+
+<file path=ppt/slides/slide28.xml><?xml version="1.0" encoding="utf-8"?>
+<p:sld xmlns:a="http://schemas.openxmlformats.org/drawingml/2006/main" xmlns:r="http://schemas.openxmlformats.org/officeDocument/2006/relationships" xmlns:p="http://schemas.openxmlformats.org/presentationml/2006/main">
+  <p:cSld>
+    <p:spTree>
+      <p:nvGrpSpPr>
+        <p:cNvPr id="1" name=""/>
+        <p:cNvGrpSpPr/>
+        <p:nvPr/>
+      </p:nvGrpSpPr>
+      <p:grpSpPr>
+        <a:xfrm>
+          <a:off x="0" y="0"/>
+          <a:ext cx="0" cy="0"/>
+          <a:chOff x="0" y="0"/>
+          <a:chExt cx="0" cy="0"/>
+        </a:xfrm>
+      </p:grpSpPr>
+      <p:sp>
+        <p:nvSpPr>
+          <p:cNvPr id="2" name="Title 1"/>
+          <p:cNvSpPr>
+            <a:spLocks noGrp="1"/>
+          </p:cNvSpPr>
+          <p:nvPr>
+            <p:ph type="title"/>
+          </p:nvPr>
+        </p:nvSpPr>
+        <p:spPr/>
+        <p:txBody>
+          <a:bodyPr/>
+          <a:lstStyle/>
+          <a:p>
+            <a:r>
+              <a:rPr lang="en-US" dirty="0" smtClean="0"/>
+              <a:t>WBS (2/3)</a:t>
+            </a:r>
+            <a:endParaRPr lang="en-US" dirty="0"/>
+          </a:p>
+        </p:txBody>
+      </p:sp>
+      <p:pic>
+        <p:nvPicPr>
+          <p:cNvPr id="4" name="Picture 3"/>
+          <p:cNvPicPr>
+            <a:picLocks noChangeAspect="1"/>
+          </p:cNvPicPr>
+          <p:nvPr/>
+        </p:nvPicPr>
+        <p:blipFill>
+          <a:blip r:embed="rId2">
+            <a:extLst>
+              <a:ext uri="{28A0092B-C50C-407E-A947-70E740481C1C}">
+                <a14:useLocalDpi xmlns:a14="http://schemas.microsoft.com/office/drawing/2010/main" val="0"/>
+              </a:ext>
+            </a:extLst>
+          </a:blip>
+          <a:stretch>
+            <a:fillRect/>
+          </a:stretch>
+        </p:blipFill>
+        <p:spPr>
+          <a:xfrm>
+            <a:off x="268045" y="1388199"/>
+            <a:ext cx="8745715" cy="4969058"/>
+          </a:xfrm>
+          <a:prstGeom prst="rect">
+            <a:avLst/>
+          </a:prstGeom>
+        </p:spPr>
+      </p:pic>
+    </p:spTree>
+    <p:extLst>
+      <p:ext uri="{BB962C8B-B14F-4D97-AF65-F5344CB8AC3E}">
+        <p14:creationId xmlns:p14="http://schemas.microsoft.com/office/powerpoint/2010/main" val="2777507175"/>
+      </p:ext>
+    </p:extLst>
+  </p:cSld>
+  <p:clrMapOvr>
+    <a:masterClrMapping/>
+  </p:clrMapOvr>
+  <p:timing>
+    <p:tnLst>
+      <p:par>
+        <p:cTn id="1" dur="indefinite" restart="never" nodeType="tmRoot"/>
+      </p:par>
+    </p:tnLst>
+  </p:timing>
+</p:sld>
+</file>
+
+<file path=ppt/slides/slide29.xml><?xml version="1.0" encoding="utf-8"?>
+<p:sld xmlns:a="http://schemas.openxmlformats.org/drawingml/2006/main" xmlns:r="http://schemas.openxmlformats.org/officeDocument/2006/relationships" xmlns:p="http://schemas.openxmlformats.org/presentationml/2006/main">
+  <p:cSld>
+    <p:spTree>
+      <p:nvGrpSpPr>
+        <p:cNvPr id="1" name=""/>
+        <p:cNvGrpSpPr/>
+        <p:nvPr/>
+      </p:nvGrpSpPr>
+      <p:grpSpPr>
+        <a:xfrm>
+          <a:off x="0" y="0"/>
+          <a:ext cx="0" cy="0"/>
+          <a:chOff x="0" y="0"/>
+          <a:chExt cx="0" cy="0"/>
+        </a:xfrm>
+      </p:grpSpPr>
+      <p:sp>
+        <p:nvSpPr>
+          <p:cNvPr id="2" name="Title 1"/>
+          <p:cNvSpPr>
+            <a:spLocks noGrp="1"/>
+          </p:cNvSpPr>
+          <p:nvPr>
+            <p:ph type="title"/>
+          </p:nvPr>
+        </p:nvSpPr>
+        <p:spPr/>
+        <p:txBody>
+          <a:bodyPr/>
+          <a:lstStyle/>
+          <a:p>
+            <a:r>
+              <a:rPr lang="en-US" dirty="0" smtClean="0"/>
+              <a:t>WBS (3/3)</a:t>
+            </a:r>
+            <a:endParaRPr lang="en-US" dirty="0"/>
+          </a:p>
+        </p:txBody>
+      </p:sp>
+      <p:pic>
+        <p:nvPicPr>
+          <p:cNvPr id="4" name="Picture 3"/>
+          <p:cNvPicPr>
+            <a:picLocks noChangeAspect="1"/>
+          </p:cNvPicPr>
+          <p:nvPr/>
+        </p:nvPicPr>
+        <p:blipFill>
+          <a:blip r:embed="rId2">
+            <a:extLst>
+              <a:ext uri="{28A0092B-C50C-407E-A947-70E740481C1C}">
+                <a14:useLocalDpi xmlns:a14="http://schemas.microsoft.com/office/drawing/2010/main" val="0"/>
+              </a:ext>
+            </a:extLst>
+          </a:blip>
+          <a:stretch>
+            <a:fillRect/>
+          </a:stretch>
+        </p:blipFill>
+        <p:spPr>
+          <a:xfrm>
+            <a:off x="268045" y="2427879"/>
+            <a:ext cx="8745715" cy="2889698"/>
+          </a:xfrm>
+          <a:prstGeom prst="rect">
+            <a:avLst/>
+          </a:prstGeom>
+        </p:spPr>
+      </p:pic>
+    </p:spTree>
+    <p:extLst>
+      <p:ext uri="{BB962C8B-B14F-4D97-AF65-F5344CB8AC3E}">
+        <p14:creationId xmlns:p14="http://schemas.microsoft.com/office/powerpoint/2010/main" val="317580944"/>
       </p:ext>
     </p:extLst>
   </p:cSld>
@@ -11595,7 +16236,7 @@
   <a:extraClrSchemeLst/>
   <a:extLst>
     <a:ext uri="{05A4C25C-085E-4340-85A3-A5531E510DB2}">
-      <thm15:themeFamily xmlns="" xmlns:thm15="http://schemas.microsoft.com/office/thememl/2012/main" name="Facet" id="{C0C680CD-088A-49FC-A102-D699147F32B2}" vid="{CFBC31BA-B70F-4F30-BCAA-4F3011E16C4D}"/>
+      <thm15:themeFamily xmlns:thm15="http://schemas.microsoft.com/office/thememl/2012/main" name="Facet" id="{C0C680CD-088A-49FC-A102-D699147F32B2}" vid="{CFBC31BA-B70F-4F30-BCAA-4F3011E16C4D}"/>
     </a:ext>
   </a:extLst>
 </a:theme>

</xml_diff>